<commit_message>
Compatible with VirtualBox & example Puppet file
</commit_message>
<xml_diff>
--- a/Vagrant.pptx
+++ b/Vagrant.pptx
@@ -4,17 +4,25 @@
   <p:sldMasterIdLst>
     <p:sldMasterId id="2147483648" r:id="rId1"/>
   </p:sldMasterIdLst>
+  <p:notesMasterIdLst>
+    <p:notesMasterId r:id="rId17"/>
+  </p:notesMasterIdLst>
   <p:sldIdLst>
     <p:sldId id="265" r:id="rId2"/>
-    <p:sldId id="258" r:id="rId3"/>
-    <p:sldId id="259" r:id="rId4"/>
-    <p:sldId id="257" r:id="rId5"/>
-    <p:sldId id="260" r:id="rId6"/>
-    <p:sldId id="261" r:id="rId7"/>
-    <p:sldId id="262" r:id="rId8"/>
-    <p:sldId id="263" r:id="rId9"/>
-    <p:sldId id="266" r:id="rId10"/>
-    <p:sldId id="267" r:id="rId11"/>
+    <p:sldId id="268" r:id="rId3"/>
+    <p:sldId id="258" r:id="rId4"/>
+    <p:sldId id="259" r:id="rId5"/>
+    <p:sldId id="257" r:id="rId6"/>
+    <p:sldId id="260" r:id="rId7"/>
+    <p:sldId id="261" r:id="rId8"/>
+    <p:sldId id="262" r:id="rId9"/>
+    <p:sldId id="263" r:id="rId10"/>
+    <p:sldId id="269" r:id="rId11"/>
+    <p:sldId id="270" r:id="rId12"/>
+    <p:sldId id="273" r:id="rId13"/>
+    <p:sldId id="271" r:id="rId14"/>
+    <p:sldId id="272" r:id="rId15"/>
+    <p:sldId id="267" r:id="rId16"/>
   </p:sldIdLst>
   <p:sldSz cx="9144000" cy="5143500" type="screen16x9"/>
   <p:notesSz cx="6858000" cy="9144000"/>
@@ -116,6 +124,646 @@
 </p:presentation>
 </file>
 
+<file path=ppt/notesMasters/notesMaster1.xml><?xml version="1.0" encoding="utf-8"?>
+<p:notesMaster xmlns:a="http://schemas.openxmlformats.org/drawingml/2006/main" xmlns:r="http://schemas.openxmlformats.org/officeDocument/2006/relationships" xmlns:p="http://schemas.openxmlformats.org/presentationml/2006/main">
+  <p:cSld>
+    <p:bg>
+      <p:bgRef idx="1001">
+        <a:schemeClr val="bg1"/>
+      </p:bgRef>
+    </p:bg>
+    <p:spTree>
+      <p:nvGrpSpPr>
+        <p:cNvPr id="1" name=""/>
+        <p:cNvGrpSpPr/>
+        <p:nvPr/>
+      </p:nvGrpSpPr>
+      <p:grpSpPr>
+        <a:xfrm>
+          <a:off x="0" y="0"/>
+          <a:ext cx="0" cy="0"/>
+          <a:chOff x="0" y="0"/>
+          <a:chExt cx="0" cy="0"/>
+        </a:xfrm>
+      </p:grpSpPr>
+      <p:sp>
+        <p:nvSpPr>
+          <p:cNvPr id="2" name="Header Placeholder 1"/>
+          <p:cNvSpPr>
+            <a:spLocks noGrp="1"/>
+          </p:cNvSpPr>
+          <p:nvPr>
+            <p:ph type="hdr" sz="quarter"/>
+          </p:nvPr>
+        </p:nvSpPr>
+        <p:spPr>
+          <a:xfrm>
+            <a:off x="0" y="0"/>
+            <a:ext cx="2971800" cy="457200"/>
+          </a:xfrm>
+          <a:prstGeom prst="rect">
+            <a:avLst/>
+          </a:prstGeom>
+        </p:spPr>
+        <p:txBody>
+          <a:bodyPr vert="horz" lIns="91440" tIns="45720" rIns="91440" bIns="45720" rtlCol="0"/>
+          <a:lstStyle>
+            <a:lvl1pPr algn="l">
+              <a:defRPr sz="1200"/>
+            </a:lvl1pPr>
+          </a:lstStyle>
+          <a:p>
+            <a:endParaRPr lang="en-US"/>
+          </a:p>
+        </p:txBody>
+      </p:sp>
+      <p:sp>
+        <p:nvSpPr>
+          <p:cNvPr id="3" name="Date Placeholder 2"/>
+          <p:cNvSpPr>
+            <a:spLocks noGrp="1"/>
+          </p:cNvSpPr>
+          <p:nvPr>
+            <p:ph type="dt" idx="1"/>
+          </p:nvPr>
+        </p:nvSpPr>
+        <p:spPr>
+          <a:xfrm>
+            <a:off x="3884613" y="0"/>
+            <a:ext cx="2971800" cy="457200"/>
+          </a:xfrm>
+          <a:prstGeom prst="rect">
+            <a:avLst/>
+          </a:prstGeom>
+        </p:spPr>
+        <p:txBody>
+          <a:bodyPr vert="horz" lIns="91440" tIns="45720" rIns="91440" bIns="45720" rtlCol="0"/>
+          <a:lstStyle>
+            <a:lvl1pPr algn="r">
+              <a:defRPr sz="1200"/>
+            </a:lvl1pPr>
+          </a:lstStyle>
+          <a:p>
+            <a:fld id="{B00F5C8E-F62F-C949-B810-B238A690792F}" type="datetimeFigureOut">
+              <a:rPr lang="en-US" smtClean="0"/>
+              <a:t>7/9/13</a:t>
+            </a:fld>
+            <a:endParaRPr lang="en-US"/>
+          </a:p>
+        </p:txBody>
+      </p:sp>
+      <p:sp>
+        <p:nvSpPr>
+          <p:cNvPr id="4" name="Slide Image Placeholder 3"/>
+          <p:cNvSpPr>
+            <a:spLocks noGrp="1" noRot="1" noChangeAspect="1"/>
+          </p:cNvSpPr>
+          <p:nvPr>
+            <p:ph type="sldImg" idx="2"/>
+          </p:nvPr>
+        </p:nvSpPr>
+        <p:spPr>
+          <a:xfrm>
+            <a:off x="381000" y="685800"/>
+            <a:ext cx="6096000" cy="3429000"/>
+          </a:xfrm>
+          <a:prstGeom prst="rect">
+            <a:avLst/>
+          </a:prstGeom>
+          <a:noFill/>
+          <a:ln w="12700">
+            <a:solidFill>
+              <a:prstClr val="black"/>
+            </a:solidFill>
+          </a:ln>
+        </p:spPr>
+        <p:txBody>
+          <a:bodyPr vert="horz" lIns="91440" tIns="45720" rIns="91440" bIns="45720" rtlCol="0" anchor="ctr"/>
+          <a:lstStyle/>
+          <a:p>
+            <a:endParaRPr lang="en-US"/>
+          </a:p>
+        </p:txBody>
+      </p:sp>
+      <p:sp>
+        <p:nvSpPr>
+          <p:cNvPr id="5" name="Notes Placeholder 4"/>
+          <p:cNvSpPr>
+            <a:spLocks noGrp="1"/>
+          </p:cNvSpPr>
+          <p:nvPr>
+            <p:ph type="body" sz="quarter" idx="3"/>
+          </p:nvPr>
+        </p:nvSpPr>
+        <p:spPr>
+          <a:xfrm>
+            <a:off x="685800" y="4343400"/>
+            <a:ext cx="5486400" cy="4114800"/>
+          </a:xfrm>
+          <a:prstGeom prst="rect">
+            <a:avLst/>
+          </a:prstGeom>
+        </p:spPr>
+        <p:txBody>
+          <a:bodyPr vert="horz" lIns="91440" tIns="45720" rIns="91440" bIns="45720" rtlCol="0"/>
+          <a:lstStyle/>
+          <a:p>
+            <a:pPr lvl="0"/>
+            <a:r>
+              <a:rPr lang="en-US" smtClean="0"/>
+              <a:t>Click to edit Master text styles</a:t>
+            </a:r>
+          </a:p>
+          <a:p>
+            <a:pPr lvl="1"/>
+            <a:r>
+              <a:rPr lang="en-US" smtClean="0"/>
+              <a:t>Second level</a:t>
+            </a:r>
+          </a:p>
+          <a:p>
+            <a:pPr lvl="2"/>
+            <a:r>
+              <a:rPr lang="en-US" smtClean="0"/>
+              <a:t>Third level</a:t>
+            </a:r>
+          </a:p>
+          <a:p>
+            <a:pPr lvl="3"/>
+            <a:r>
+              <a:rPr lang="en-US" smtClean="0"/>
+              <a:t>Fourth level</a:t>
+            </a:r>
+          </a:p>
+          <a:p>
+            <a:pPr lvl="4"/>
+            <a:r>
+              <a:rPr lang="en-US" smtClean="0"/>
+              <a:t>Fifth level</a:t>
+            </a:r>
+            <a:endParaRPr lang="en-US"/>
+          </a:p>
+        </p:txBody>
+      </p:sp>
+      <p:sp>
+        <p:nvSpPr>
+          <p:cNvPr id="6" name="Footer Placeholder 5"/>
+          <p:cNvSpPr>
+            <a:spLocks noGrp="1"/>
+          </p:cNvSpPr>
+          <p:nvPr>
+            <p:ph type="ftr" sz="quarter" idx="4"/>
+          </p:nvPr>
+        </p:nvSpPr>
+        <p:spPr>
+          <a:xfrm>
+            <a:off x="0" y="8685213"/>
+            <a:ext cx="2971800" cy="457200"/>
+          </a:xfrm>
+          <a:prstGeom prst="rect">
+            <a:avLst/>
+          </a:prstGeom>
+        </p:spPr>
+        <p:txBody>
+          <a:bodyPr vert="horz" lIns="91440" tIns="45720" rIns="91440" bIns="45720" rtlCol="0" anchor="b"/>
+          <a:lstStyle>
+            <a:lvl1pPr algn="l">
+              <a:defRPr sz="1200"/>
+            </a:lvl1pPr>
+          </a:lstStyle>
+          <a:p>
+            <a:endParaRPr lang="en-US"/>
+          </a:p>
+        </p:txBody>
+      </p:sp>
+      <p:sp>
+        <p:nvSpPr>
+          <p:cNvPr id="7" name="Slide Number Placeholder 6"/>
+          <p:cNvSpPr>
+            <a:spLocks noGrp="1"/>
+          </p:cNvSpPr>
+          <p:nvPr>
+            <p:ph type="sldNum" sz="quarter" idx="5"/>
+          </p:nvPr>
+        </p:nvSpPr>
+        <p:spPr>
+          <a:xfrm>
+            <a:off x="3884613" y="8685213"/>
+            <a:ext cx="2971800" cy="457200"/>
+          </a:xfrm>
+          <a:prstGeom prst="rect">
+            <a:avLst/>
+          </a:prstGeom>
+        </p:spPr>
+        <p:txBody>
+          <a:bodyPr vert="horz" lIns="91440" tIns="45720" rIns="91440" bIns="45720" rtlCol="0" anchor="b"/>
+          <a:lstStyle>
+            <a:lvl1pPr algn="r">
+              <a:defRPr sz="1200"/>
+            </a:lvl1pPr>
+          </a:lstStyle>
+          <a:p>
+            <a:fld id="{8D55EAEB-36BD-FF4D-B4A1-0D75FFEDD0E3}" type="slidenum">
+              <a:rPr lang="en-US" smtClean="0"/>
+              <a:t>‹#›</a:t>
+            </a:fld>
+            <a:endParaRPr lang="en-US"/>
+          </a:p>
+        </p:txBody>
+      </p:sp>
+    </p:spTree>
+    <p:extLst>
+      <p:ext uri="{BB962C8B-B14F-4D97-AF65-F5344CB8AC3E}">
+        <p14:creationId xmlns:p14="http://schemas.microsoft.com/office/powerpoint/2010/main" val="2848661362"/>
+      </p:ext>
+    </p:extLst>
+  </p:cSld>
+  <p:clrMap bg1="lt1" tx1="dk1" bg2="lt2" tx2="dk2" accent1="accent1" accent2="accent2" accent3="accent3" accent4="accent4" accent5="accent5" accent6="accent6" hlink="hlink" folHlink="folHlink"/>
+  <p:notesStyle>
+    <a:lvl1pPr marL="0" algn="l" defTabSz="457200" rtl="0" eaLnBrk="1" latinLnBrk="0" hangingPunct="1">
+      <a:defRPr sz="1200" kern="1200">
+        <a:solidFill>
+          <a:schemeClr val="tx1"/>
+        </a:solidFill>
+        <a:latin typeface="+mn-lt"/>
+        <a:ea typeface="+mn-ea"/>
+        <a:cs typeface="+mn-cs"/>
+      </a:defRPr>
+    </a:lvl1pPr>
+    <a:lvl2pPr marL="457200" algn="l" defTabSz="457200" rtl="0" eaLnBrk="1" latinLnBrk="0" hangingPunct="1">
+      <a:defRPr sz="1200" kern="1200">
+        <a:solidFill>
+          <a:schemeClr val="tx1"/>
+        </a:solidFill>
+        <a:latin typeface="+mn-lt"/>
+        <a:ea typeface="+mn-ea"/>
+        <a:cs typeface="+mn-cs"/>
+      </a:defRPr>
+    </a:lvl2pPr>
+    <a:lvl3pPr marL="914400" algn="l" defTabSz="457200" rtl="0" eaLnBrk="1" latinLnBrk="0" hangingPunct="1">
+      <a:defRPr sz="1200" kern="1200">
+        <a:solidFill>
+          <a:schemeClr val="tx1"/>
+        </a:solidFill>
+        <a:latin typeface="+mn-lt"/>
+        <a:ea typeface="+mn-ea"/>
+        <a:cs typeface="+mn-cs"/>
+      </a:defRPr>
+    </a:lvl3pPr>
+    <a:lvl4pPr marL="1371600" algn="l" defTabSz="457200" rtl="0" eaLnBrk="1" latinLnBrk="0" hangingPunct="1">
+      <a:defRPr sz="1200" kern="1200">
+        <a:solidFill>
+          <a:schemeClr val="tx1"/>
+        </a:solidFill>
+        <a:latin typeface="+mn-lt"/>
+        <a:ea typeface="+mn-ea"/>
+        <a:cs typeface="+mn-cs"/>
+      </a:defRPr>
+    </a:lvl4pPr>
+    <a:lvl5pPr marL="1828800" algn="l" defTabSz="457200" rtl="0" eaLnBrk="1" latinLnBrk="0" hangingPunct="1">
+      <a:defRPr sz="1200" kern="1200">
+        <a:solidFill>
+          <a:schemeClr val="tx1"/>
+        </a:solidFill>
+        <a:latin typeface="+mn-lt"/>
+        <a:ea typeface="+mn-ea"/>
+        <a:cs typeface="+mn-cs"/>
+      </a:defRPr>
+    </a:lvl5pPr>
+    <a:lvl6pPr marL="2286000" algn="l" defTabSz="457200" rtl="0" eaLnBrk="1" latinLnBrk="0" hangingPunct="1">
+      <a:defRPr sz="1200" kern="1200">
+        <a:solidFill>
+          <a:schemeClr val="tx1"/>
+        </a:solidFill>
+        <a:latin typeface="+mn-lt"/>
+        <a:ea typeface="+mn-ea"/>
+        <a:cs typeface="+mn-cs"/>
+      </a:defRPr>
+    </a:lvl6pPr>
+    <a:lvl7pPr marL="2743200" algn="l" defTabSz="457200" rtl="0" eaLnBrk="1" latinLnBrk="0" hangingPunct="1">
+      <a:defRPr sz="1200" kern="1200">
+        <a:solidFill>
+          <a:schemeClr val="tx1"/>
+        </a:solidFill>
+        <a:latin typeface="+mn-lt"/>
+        <a:ea typeface="+mn-ea"/>
+        <a:cs typeface="+mn-cs"/>
+      </a:defRPr>
+    </a:lvl7pPr>
+    <a:lvl8pPr marL="3200400" algn="l" defTabSz="457200" rtl="0" eaLnBrk="1" latinLnBrk="0" hangingPunct="1">
+      <a:defRPr sz="1200" kern="1200">
+        <a:solidFill>
+          <a:schemeClr val="tx1"/>
+        </a:solidFill>
+        <a:latin typeface="+mn-lt"/>
+        <a:ea typeface="+mn-ea"/>
+        <a:cs typeface="+mn-cs"/>
+      </a:defRPr>
+    </a:lvl8pPr>
+    <a:lvl9pPr marL="3657600" algn="l" defTabSz="457200" rtl="0" eaLnBrk="1" latinLnBrk="0" hangingPunct="1">
+      <a:defRPr sz="1200" kern="1200">
+        <a:solidFill>
+          <a:schemeClr val="tx1"/>
+        </a:solidFill>
+        <a:latin typeface="+mn-lt"/>
+        <a:ea typeface="+mn-ea"/>
+        <a:cs typeface="+mn-cs"/>
+      </a:defRPr>
+    </a:lvl9pPr>
+  </p:notesStyle>
+</p:notesMaster>
+</file>
+
+<file path=ppt/notesSlides/notesSlide1.xml><?xml version="1.0" encoding="utf-8"?>
+<p:notes xmlns:a="http://schemas.openxmlformats.org/drawingml/2006/main" xmlns:r="http://schemas.openxmlformats.org/officeDocument/2006/relationships" xmlns:p="http://schemas.openxmlformats.org/presentationml/2006/main">
+  <p:cSld>
+    <p:spTree>
+      <p:nvGrpSpPr>
+        <p:cNvPr id="1" name=""/>
+        <p:cNvGrpSpPr/>
+        <p:nvPr/>
+      </p:nvGrpSpPr>
+      <p:grpSpPr>
+        <a:xfrm>
+          <a:off x="0" y="0"/>
+          <a:ext cx="0" cy="0"/>
+          <a:chOff x="0" y="0"/>
+          <a:chExt cx="0" cy="0"/>
+        </a:xfrm>
+      </p:grpSpPr>
+      <p:sp>
+        <p:nvSpPr>
+          <p:cNvPr id="2" name="Slide Image Placeholder 1"/>
+          <p:cNvSpPr>
+            <a:spLocks noGrp="1" noRot="1" noChangeAspect="1"/>
+          </p:cNvSpPr>
+          <p:nvPr>
+            <p:ph type="sldImg"/>
+          </p:nvPr>
+        </p:nvSpPr>
+        <p:spPr/>
+      </p:sp>
+      <p:sp>
+        <p:nvSpPr>
+          <p:cNvPr id="3" name="Notes Placeholder 2"/>
+          <p:cNvSpPr>
+            <a:spLocks noGrp="1"/>
+          </p:cNvSpPr>
+          <p:nvPr>
+            <p:ph type="body" idx="1"/>
+          </p:nvPr>
+        </p:nvSpPr>
+        <p:spPr/>
+        <p:txBody>
+          <a:bodyPr/>
+          <a:lstStyle/>
+          <a:p>
+            <a:endParaRPr lang="en-US" dirty="0"/>
+          </a:p>
+        </p:txBody>
+      </p:sp>
+      <p:sp>
+        <p:nvSpPr>
+          <p:cNvPr id="4" name="Slide Number Placeholder 3"/>
+          <p:cNvSpPr>
+            <a:spLocks noGrp="1"/>
+          </p:cNvSpPr>
+          <p:nvPr>
+            <p:ph type="sldNum" sz="quarter" idx="10"/>
+          </p:nvPr>
+        </p:nvSpPr>
+        <p:spPr/>
+        <p:txBody>
+          <a:bodyPr/>
+          <a:lstStyle/>
+          <a:p>
+            <a:fld id="{8D55EAEB-36BD-FF4D-B4A1-0D75FFEDD0E3}" type="slidenum">
+              <a:rPr lang="en-US" smtClean="0"/>
+              <a:t>5</a:t>
+            </a:fld>
+            <a:endParaRPr lang="en-US"/>
+          </a:p>
+        </p:txBody>
+      </p:sp>
+    </p:spTree>
+    <p:extLst>
+      <p:ext uri="{BB962C8B-B14F-4D97-AF65-F5344CB8AC3E}">
+        <p14:creationId xmlns:p14="http://schemas.microsoft.com/office/powerpoint/2010/main" val="3084299111"/>
+      </p:ext>
+    </p:extLst>
+  </p:cSld>
+  <p:clrMapOvr>
+    <a:masterClrMapping/>
+  </p:clrMapOvr>
+</p:notes>
+</file>
+
+<file path=ppt/notesSlides/notesSlide2.xml><?xml version="1.0" encoding="utf-8"?>
+<p:notes xmlns:a="http://schemas.openxmlformats.org/drawingml/2006/main" xmlns:r="http://schemas.openxmlformats.org/officeDocument/2006/relationships" xmlns:p="http://schemas.openxmlformats.org/presentationml/2006/main">
+  <p:cSld>
+    <p:spTree>
+      <p:nvGrpSpPr>
+        <p:cNvPr id="1" name=""/>
+        <p:cNvGrpSpPr/>
+        <p:nvPr/>
+      </p:nvGrpSpPr>
+      <p:grpSpPr>
+        <a:xfrm>
+          <a:off x="0" y="0"/>
+          <a:ext cx="0" cy="0"/>
+          <a:chOff x="0" y="0"/>
+          <a:chExt cx="0" cy="0"/>
+        </a:xfrm>
+      </p:grpSpPr>
+      <p:sp>
+        <p:nvSpPr>
+          <p:cNvPr id="2" name="Slide Image Placeholder 1"/>
+          <p:cNvSpPr>
+            <a:spLocks noGrp="1" noRot="1" noChangeAspect="1"/>
+          </p:cNvSpPr>
+          <p:nvPr>
+            <p:ph type="sldImg"/>
+          </p:nvPr>
+        </p:nvSpPr>
+        <p:spPr/>
+      </p:sp>
+      <p:sp>
+        <p:nvSpPr>
+          <p:cNvPr id="3" name="Notes Placeholder 2"/>
+          <p:cNvSpPr>
+            <a:spLocks noGrp="1"/>
+          </p:cNvSpPr>
+          <p:nvPr>
+            <p:ph type="body" idx="1"/>
+          </p:nvPr>
+        </p:nvSpPr>
+        <p:spPr/>
+        <p:txBody>
+          <a:bodyPr/>
+          <a:lstStyle/>
+          <a:p>
+            <a:pPr marL="0" marR="0" indent="0" algn="l" defTabSz="457200" rtl="0" eaLnBrk="1" fontAlgn="auto" latinLnBrk="0" hangingPunct="1">
+              <a:lnSpc>
+                <a:spcPct val="100000"/>
+              </a:lnSpc>
+              <a:spcBef>
+                <a:spcPts val="0"/>
+              </a:spcBef>
+              <a:spcAft>
+                <a:spcPts val="0"/>
+              </a:spcAft>
+              <a:buClrTx/>
+              <a:buSzTx/>
+              <a:buFontTx/>
+              <a:buNone/>
+              <a:tabLst/>
+              <a:defRPr/>
+            </a:pPr>
+            <a:r>
+              <a:rPr lang="en-US" dirty="0" smtClean="0"/>
+              <a:t>Alternatively…</a:t>
+            </a:r>
+          </a:p>
+          <a:p>
+            <a:pPr marL="0" marR="0" indent="0" algn="l" defTabSz="457200" rtl="0" eaLnBrk="1" fontAlgn="auto" latinLnBrk="0" hangingPunct="1">
+              <a:lnSpc>
+                <a:spcPct val="100000"/>
+              </a:lnSpc>
+              <a:spcBef>
+                <a:spcPts val="0"/>
+              </a:spcBef>
+              <a:spcAft>
+                <a:spcPts val="0"/>
+              </a:spcAft>
+              <a:buClrTx/>
+              <a:buSzTx/>
+              <a:buFontTx/>
+              <a:buNone/>
+              <a:tabLst/>
+              <a:defRPr/>
+            </a:pPr>
+            <a:r>
+              <a:rPr lang="en-US" dirty="0" smtClean="0"/>
+              <a:t>For Fusion: </a:t>
+            </a:r>
+          </a:p>
+          <a:p>
+            <a:pPr marL="0" marR="0" indent="0" algn="l" defTabSz="457200" rtl="0" eaLnBrk="1" fontAlgn="auto" latinLnBrk="0" hangingPunct="1">
+              <a:lnSpc>
+                <a:spcPct val="100000"/>
+              </a:lnSpc>
+              <a:spcBef>
+                <a:spcPts val="0"/>
+              </a:spcBef>
+              <a:spcAft>
+                <a:spcPts val="0"/>
+              </a:spcAft>
+              <a:buClrTx/>
+              <a:buSzTx/>
+              <a:buFontTx/>
+              <a:buNone/>
+              <a:tabLst/>
+              <a:defRPr/>
+            </a:pPr>
+            <a:r>
+              <a:rPr lang="en-US" dirty="0" smtClean="0"/>
+              <a:t>vagrant </a:t>
+            </a:r>
+            <a:r>
+              <a:rPr lang="en-US" dirty="0" err="1" smtClean="0"/>
+              <a:t>init</a:t>
+            </a:r>
+            <a:r>
+              <a:rPr lang="en-US" baseline="0" dirty="0" smtClean="0"/>
+              <a:t> precise64 </a:t>
+            </a:r>
+            <a:r>
+              <a:rPr lang="en-US" dirty="0" smtClean="0">
+                <a:hlinkClick r:id="rId3"/>
+              </a:rPr>
+              <a:t>http://files.vagrantup.com/precise64_vmware.box</a:t>
+            </a:r>
+            <a:endParaRPr lang="en-US" dirty="0" smtClean="0"/>
+          </a:p>
+          <a:p>
+            <a:endParaRPr lang="en-US" dirty="0" smtClean="0"/>
+          </a:p>
+          <a:p>
+            <a:r>
+              <a:rPr lang="en-US" dirty="0" smtClean="0"/>
+              <a:t>For </a:t>
+            </a:r>
+            <a:r>
+              <a:rPr lang="en-US" dirty="0" err="1" smtClean="0"/>
+              <a:t>VirtualBox</a:t>
+            </a:r>
+            <a:r>
+              <a:rPr lang="en-US" dirty="0" smtClean="0"/>
+              <a:t>:</a:t>
+            </a:r>
+          </a:p>
+          <a:p>
+            <a:r>
+              <a:rPr lang="en-US" dirty="0" smtClean="0"/>
+              <a:t>vagrant </a:t>
+            </a:r>
+            <a:r>
+              <a:rPr lang="en-US" dirty="0" err="1" smtClean="0"/>
+              <a:t>init</a:t>
+            </a:r>
+            <a:r>
+              <a:rPr lang="en-US" dirty="0" smtClean="0"/>
+              <a:t> precise64 </a:t>
+            </a:r>
+            <a:r>
+              <a:rPr lang="en-US" dirty="0" smtClean="0">
+                <a:hlinkClick r:id="rId4"/>
+              </a:rPr>
+              <a:t>http://files.vagrantup.com/precise64.box</a:t>
+            </a:r>
+            <a:endParaRPr lang="en-US" dirty="0" smtClean="0"/>
+          </a:p>
+          <a:p>
+            <a:endParaRPr lang="en-US" dirty="0"/>
+          </a:p>
+        </p:txBody>
+      </p:sp>
+      <p:sp>
+        <p:nvSpPr>
+          <p:cNvPr id="4" name="Slide Number Placeholder 3"/>
+          <p:cNvSpPr>
+            <a:spLocks noGrp="1"/>
+          </p:cNvSpPr>
+          <p:nvPr>
+            <p:ph type="sldNum" sz="quarter" idx="10"/>
+          </p:nvPr>
+        </p:nvSpPr>
+        <p:spPr/>
+        <p:txBody>
+          <a:bodyPr/>
+          <a:lstStyle/>
+          <a:p>
+            <a:fld id="{8D55EAEB-36BD-FF4D-B4A1-0D75FFEDD0E3}" type="slidenum">
+              <a:rPr lang="en-US" smtClean="0"/>
+              <a:t>6</a:t>
+            </a:fld>
+            <a:endParaRPr lang="en-US"/>
+          </a:p>
+        </p:txBody>
+      </p:sp>
+    </p:spTree>
+    <p:extLst>
+      <p:ext uri="{BB962C8B-B14F-4D97-AF65-F5344CB8AC3E}">
+        <p14:creationId xmlns:p14="http://schemas.microsoft.com/office/powerpoint/2010/main" val="2624913008"/>
+      </p:ext>
+    </p:extLst>
+  </p:cSld>
+  <p:clrMapOvr>
+    <a:masterClrMapping/>
+  </p:clrMapOvr>
+</p:notes>
+</file>
+
 <file path=ppt/slideLayouts/slideLayout1.xml><?xml version="1.0" encoding="utf-8"?>
 <p:sldLayout xmlns:a="http://schemas.openxmlformats.org/drawingml/2006/main" xmlns:r="http://schemas.openxmlformats.org/officeDocument/2006/relationships" xmlns:p="http://schemas.openxmlformats.org/presentationml/2006/main" type="title" preserve="1">
   <p:cSld name="Title Slide">
@@ -297,7 +945,7 @@
           <a:p>
             <a:fld id="{CEB1479B-2454-8E48-9041-E1255446920F}" type="datetimeFigureOut">
               <a:rPr lang="en-US" smtClean="0"/>
-              <a:t>7/8/13</a:t>
+              <a:t>7/9/13</a:t>
             </a:fld>
             <a:endParaRPr lang="en-US"/>
           </a:p>
@@ -467,7 +1115,7 @@
           <a:p>
             <a:fld id="{CEB1479B-2454-8E48-9041-E1255446920F}" type="datetimeFigureOut">
               <a:rPr lang="en-US" smtClean="0"/>
-              <a:t>7/8/13</a:t>
+              <a:t>7/9/13</a:t>
             </a:fld>
             <a:endParaRPr lang="en-US"/>
           </a:p>
@@ -647,7 +1295,7 @@
           <a:p>
             <a:fld id="{CEB1479B-2454-8E48-9041-E1255446920F}" type="datetimeFigureOut">
               <a:rPr lang="en-US" smtClean="0"/>
-              <a:t>7/8/13</a:t>
+              <a:t>7/9/13</a:t>
             </a:fld>
             <a:endParaRPr lang="en-US"/>
           </a:p>
@@ -817,7 +1465,7 @@
           <a:p>
             <a:fld id="{CEB1479B-2454-8E48-9041-E1255446920F}" type="datetimeFigureOut">
               <a:rPr lang="en-US" smtClean="0"/>
-              <a:t>7/8/13</a:t>
+              <a:t>7/9/13</a:t>
             </a:fld>
             <a:endParaRPr lang="en-US"/>
           </a:p>
@@ -1063,7 +1711,7 @@
           <a:p>
             <a:fld id="{CEB1479B-2454-8E48-9041-E1255446920F}" type="datetimeFigureOut">
               <a:rPr lang="en-US" smtClean="0"/>
-              <a:t>7/8/13</a:t>
+              <a:t>7/9/13</a:t>
             </a:fld>
             <a:endParaRPr lang="en-US"/>
           </a:p>
@@ -1351,7 +1999,7 @@
           <a:p>
             <a:fld id="{CEB1479B-2454-8E48-9041-E1255446920F}" type="datetimeFigureOut">
               <a:rPr lang="en-US" smtClean="0"/>
-              <a:t>7/8/13</a:t>
+              <a:t>7/9/13</a:t>
             </a:fld>
             <a:endParaRPr lang="en-US"/>
           </a:p>
@@ -1773,7 +2421,7 @@
           <a:p>
             <a:fld id="{CEB1479B-2454-8E48-9041-E1255446920F}" type="datetimeFigureOut">
               <a:rPr lang="en-US" smtClean="0"/>
-              <a:t>7/8/13</a:t>
+              <a:t>7/9/13</a:t>
             </a:fld>
             <a:endParaRPr lang="en-US"/>
           </a:p>
@@ -1891,7 +2539,7 @@
           <a:p>
             <a:fld id="{CEB1479B-2454-8E48-9041-E1255446920F}" type="datetimeFigureOut">
               <a:rPr lang="en-US" smtClean="0"/>
-              <a:t>7/8/13</a:t>
+              <a:t>7/9/13</a:t>
             </a:fld>
             <a:endParaRPr lang="en-US"/>
           </a:p>
@@ -1986,7 +2634,7 @@
           <a:p>
             <a:fld id="{CEB1479B-2454-8E48-9041-E1255446920F}" type="datetimeFigureOut">
               <a:rPr lang="en-US" smtClean="0"/>
-              <a:t>7/8/13</a:t>
+              <a:t>7/9/13</a:t>
             </a:fld>
             <a:endParaRPr lang="en-US"/>
           </a:p>
@@ -2263,7 +2911,7 @@
           <a:p>
             <a:fld id="{CEB1479B-2454-8E48-9041-E1255446920F}" type="datetimeFigureOut">
               <a:rPr lang="en-US" smtClean="0"/>
-              <a:t>7/8/13</a:t>
+              <a:t>7/9/13</a:t>
             </a:fld>
             <a:endParaRPr lang="en-US"/>
           </a:p>
@@ -2516,7 +3164,7 @@
           <a:p>
             <a:fld id="{CEB1479B-2454-8E48-9041-E1255446920F}" type="datetimeFigureOut">
               <a:rPr lang="en-US" smtClean="0"/>
-              <a:t>7/8/13</a:t>
+              <a:t>7/9/13</a:t>
             </a:fld>
             <a:endParaRPr lang="en-US"/>
           </a:p>
@@ -2729,7 +3377,7 @@
           <a:p>
             <a:fld id="{CEB1479B-2454-8E48-9041-E1255446920F}" type="datetimeFigureOut">
               <a:rPr lang="en-US" smtClean="0"/>
-              <a:t>7/8/13</a:t>
+              <a:t>7/9/13</a:t>
             </a:fld>
             <a:endParaRPr lang="en-US"/>
           </a:p>
@@ -3304,7 +3952,7 @@
           <a:p>
             <a:r>
               <a:rPr lang="en-US" dirty="0" smtClean="0"/>
-              <a:t>Additional Info</a:t>
+              <a:t>Version Control</a:t>
             </a:r>
             <a:endParaRPr lang="en-US" dirty="0"/>
           </a:p>
@@ -3320,81 +3968,881 @@
             <p:ph idx="1"/>
           </p:nvPr>
         </p:nvSpPr>
-        <p:spPr/>
+        <p:spPr>
+          <a:xfrm>
+            <a:off x="457200" y="1200151"/>
+            <a:ext cx="8394548" cy="3394472"/>
+          </a:xfrm>
+        </p:spPr>
         <p:txBody>
           <a:bodyPr>
-            <a:normAutofit/>
+            <a:normAutofit fontScale="92500" lnSpcReduction="10000"/>
           </a:bodyPr>
           <a:lstStyle/>
           <a:p>
             <a:r>
               <a:rPr lang="en-US" dirty="0" smtClean="0"/>
-              <a:t>Vagrant Site</a:t>
+              <a:t>Source Code Control for your </a:t>
+            </a:r>
+            <a:r>
+              <a:rPr lang="en-US" dirty="0" err="1" smtClean="0"/>
+              <a:t>Vagrantfile</a:t>
+            </a:r>
+            <a:endParaRPr lang="en-US" dirty="0" smtClean="0"/>
+          </a:p>
+          <a:p>
+            <a:pPr lvl="1"/>
+            <a:r>
+              <a:rPr lang="en-US" dirty="0" err="1" smtClean="0"/>
+              <a:t>Git</a:t>
+            </a:r>
+            <a:r>
+              <a:rPr lang="en-US" dirty="0" smtClean="0"/>
+              <a:t>, SVN, etc.</a:t>
+            </a:r>
+          </a:p>
+          <a:p>
+            <a:r>
+              <a:rPr lang="en-US" dirty="0" smtClean="0"/>
+              <a:t>Online collaboration</a:t>
+            </a:r>
+          </a:p>
+          <a:p>
+            <a:pPr lvl="1"/>
+            <a:r>
+              <a:rPr lang="en-US" dirty="0" err="1" smtClean="0"/>
+              <a:t>GitHub</a:t>
+            </a:r>
+            <a:r>
+              <a:rPr lang="en-US" dirty="0" smtClean="0"/>
+              <a:t>, </a:t>
+            </a:r>
+            <a:r>
+              <a:rPr lang="en-US" dirty="0" err="1" smtClean="0"/>
+              <a:t>BitBucket</a:t>
+            </a:r>
+            <a:r>
+              <a:rPr lang="en-US" dirty="0" smtClean="0"/>
+              <a:t>, etc.</a:t>
+            </a:r>
+          </a:p>
+          <a:p>
+            <a:r>
+              <a:rPr lang="en-US" dirty="0" smtClean="0"/>
+              <a:t>This presentation and example code can </a:t>
             </a:r>
             <a:r>
               <a:rPr lang="en-US" dirty="0"/>
-              <a:t>: </a:t>
+              <a:t>be found at: </a:t>
             </a:r>
             <a:r>
               <a:rPr lang="en-US" dirty="0">
                 <a:hlinkClick r:id="rId2"/>
               </a:rPr>
-              <a:t>http://docs.vagrantup.com/v2</a:t>
+              <a:t>https://github.com/VMTrooper/</a:t>
             </a:r>
             <a:r>
               <a:rPr lang="en-US" dirty="0" smtClean="0">
                 <a:hlinkClick r:id="rId2"/>
               </a:rPr>
+              <a:t>VagrantBrownBag</a:t>
+            </a:r>
+            <a:endParaRPr lang="en-US" dirty="0" smtClean="0"/>
+          </a:p>
+          <a:p>
+            <a:endParaRPr lang="en-US" dirty="0"/>
+          </a:p>
+        </p:txBody>
+      </p:sp>
+    </p:spTree>
+    <p:extLst>
+      <p:ext uri="{BB962C8B-B14F-4D97-AF65-F5344CB8AC3E}">
+        <p14:creationId xmlns:p14="http://schemas.microsoft.com/office/powerpoint/2010/main" val="1044355244"/>
+      </p:ext>
+    </p:extLst>
+  </p:cSld>
+  <p:clrMapOvr>
+    <a:masterClrMapping/>
+  </p:clrMapOvr>
+</p:sld>
+</file>
+
+<file path=ppt/slides/slide11.xml><?xml version="1.0" encoding="utf-8"?>
+<p:sld xmlns:a="http://schemas.openxmlformats.org/drawingml/2006/main" xmlns:r="http://schemas.openxmlformats.org/officeDocument/2006/relationships" xmlns:p="http://schemas.openxmlformats.org/presentationml/2006/main">
+  <p:cSld>
+    <p:spTree>
+      <p:nvGrpSpPr>
+        <p:cNvPr id="1" name=""/>
+        <p:cNvGrpSpPr/>
+        <p:nvPr/>
+      </p:nvGrpSpPr>
+      <p:grpSpPr>
+        <a:xfrm>
+          <a:off x="0" y="0"/>
+          <a:ext cx="0" cy="0"/>
+          <a:chOff x="0" y="0"/>
+          <a:chExt cx="0" cy="0"/>
+        </a:xfrm>
+      </p:grpSpPr>
+      <p:sp>
+        <p:nvSpPr>
+          <p:cNvPr id="2" name="Title 1"/>
+          <p:cNvSpPr>
+            <a:spLocks noGrp="1"/>
+          </p:cNvSpPr>
+          <p:nvPr>
+            <p:ph type="title"/>
+          </p:nvPr>
+        </p:nvSpPr>
+        <p:spPr/>
+        <p:txBody>
+          <a:bodyPr/>
+          <a:lstStyle/>
+          <a:p>
+            <a:r>
+              <a:rPr lang="en-US" dirty="0" smtClean="0"/>
+              <a:t>Customize Your VM</a:t>
+            </a:r>
+            <a:endParaRPr lang="en-US" dirty="0"/>
+          </a:p>
+        </p:txBody>
+      </p:sp>
+      <p:sp>
+        <p:nvSpPr>
+          <p:cNvPr id="3" name="Content Placeholder 2"/>
+          <p:cNvSpPr>
+            <a:spLocks noGrp="1"/>
+          </p:cNvSpPr>
+          <p:nvPr>
+            <p:ph idx="1"/>
+          </p:nvPr>
+        </p:nvSpPr>
+        <p:spPr/>
+        <p:txBody>
+          <a:bodyPr/>
+          <a:lstStyle/>
+          <a:p>
+            <a:r>
+              <a:rPr lang="en-US" dirty="0" smtClean="0"/>
+              <a:t>Hostname</a:t>
+            </a:r>
+          </a:p>
+          <a:p>
+            <a:pPr lvl="1"/>
+            <a:r>
+              <a:rPr lang="en-US" dirty="0" err="1" smtClean="0"/>
+              <a:t>config.vm.hostname</a:t>
+            </a:r>
+            <a:r>
+              <a:rPr lang="en-US" dirty="0" smtClean="0"/>
+              <a:t> </a:t>
+            </a:r>
+            <a:r>
+              <a:rPr lang="en-US" dirty="0"/>
+              <a:t>= "controller"</a:t>
+            </a:r>
+            <a:endParaRPr lang="en-US" dirty="0" smtClean="0"/>
+          </a:p>
+          <a:p>
+            <a:r>
+              <a:rPr lang="en-US" dirty="0" smtClean="0"/>
+              <a:t>IP Address</a:t>
+            </a:r>
+          </a:p>
+          <a:p>
+            <a:pPr lvl="1"/>
+            <a:r>
+              <a:rPr lang="en-US" dirty="0" err="1" smtClean="0"/>
+              <a:t>config.vm.network</a:t>
+            </a:r>
+            <a:r>
+              <a:rPr lang="en-US" dirty="0" smtClean="0"/>
+              <a:t> </a:t>
+            </a:r>
+            <a:r>
+              <a:rPr lang="en-US" dirty="0"/>
+              <a:t>:</a:t>
+            </a:r>
+            <a:r>
+              <a:rPr lang="en-US" dirty="0" err="1"/>
+              <a:t>private_network</a:t>
+            </a:r>
+            <a:r>
+              <a:rPr lang="en-US" dirty="0"/>
+              <a:t>, </a:t>
+            </a:r>
+            <a:r>
+              <a:rPr lang="en-US" dirty="0" err="1"/>
+              <a:t>ip</a:t>
+            </a:r>
+            <a:r>
+              <a:rPr lang="en-US" dirty="0"/>
+              <a:t>: </a:t>
+            </a:r>
+            <a:r>
+              <a:rPr lang="en-US" dirty="0" smtClean="0"/>
+              <a:t>178.16.172.200</a:t>
+            </a:r>
+          </a:p>
+          <a:p>
+            <a:pPr marL="0" indent="0">
+              <a:buNone/>
+            </a:pPr>
+            <a:r>
+              <a:rPr lang="en-US" dirty="0" smtClean="0"/>
+              <a:t>NOTE:</a:t>
+            </a:r>
+            <a:endParaRPr lang="en-US" dirty="0"/>
+          </a:p>
+        </p:txBody>
+      </p:sp>
+    </p:spTree>
+    <p:extLst>
+      <p:ext uri="{BB962C8B-B14F-4D97-AF65-F5344CB8AC3E}">
+        <p14:creationId xmlns:p14="http://schemas.microsoft.com/office/powerpoint/2010/main" val="1818989877"/>
+      </p:ext>
+    </p:extLst>
+  </p:cSld>
+  <p:clrMapOvr>
+    <a:masterClrMapping/>
+  </p:clrMapOvr>
+</p:sld>
+</file>
+
+<file path=ppt/slides/slide12.xml><?xml version="1.0" encoding="utf-8"?>
+<p:sld xmlns:a="http://schemas.openxmlformats.org/drawingml/2006/main" xmlns:r="http://schemas.openxmlformats.org/officeDocument/2006/relationships" xmlns:p="http://schemas.openxmlformats.org/presentationml/2006/main">
+  <p:cSld>
+    <p:spTree>
+      <p:nvGrpSpPr>
+        <p:cNvPr id="1" name=""/>
+        <p:cNvGrpSpPr/>
+        <p:nvPr/>
+      </p:nvGrpSpPr>
+      <p:grpSpPr>
+        <a:xfrm>
+          <a:off x="0" y="0"/>
+          <a:ext cx="0" cy="0"/>
+          <a:chOff x="0" y="0"/>
+          <a:chExt cx="0" cy="0"/>
+        </a:xfrm>
+      </p:grpSpPr>
+      <p:sp>
+        <p:nvSpPr>
+          <p:cNvPr id="2" name="Title 1"/>
+          <p:cNvSpPr>
+            <a:spLocks noGrp="1"/>
+          </p:cNvSpPr>
+          <p:nvPr>
+            <p:ph type="title"/>
+          </p:nvPr>
+        </p:nvSpPr>
+        <p:spPr/>
+        <p:txBody>
+          <a:bodyPr/>
+          <a:lstStyle/>
+          <a:p>
+            <a:r>
+              <a:rPr lang="en-US" dirty="0" smtClean="0"/>
+              <a:t>Customize Your VM</a:t>
+            </a:r>
+            <a:endParaRPr lang="en-US" dirty="0"/>
+          </a:p>
+        </p:txBody>
+      </p:sp>
+      <p:sp>
+        <p:nvSpPr>
+          <p:cNvPr id="3" name="Content Placeholder 2"/>
+          <p:cNvSpPr>
+            <a:spLocks noGrp="1"/>
+          </p:cNvSpPr>
+          <p:nvPr>
+            <p:ph idx="1"/>
+          </p:nvPr>
+        </p:nvSpPr>
+        <p:spPr/>
+        <p:txBody>
+          <a:bodyPr>
+            <a:normAutofit fontScale="62500" lnSpcReduction="20000"/>
+          </a:bodyPr>
+          <a:lstStyle/>
+          <a:p>
+            <a:r>
+              <a:rPr lang="en-US" sz="4600" dirty="0" smtClean="0"/>
+              <a:t>Memory</a:t>
+            </a:r>
+          </a:p>
+          <a:p>
+            <a:pPr marL="0" indent="0">
+              <a:buNone/>
+            </a:pPr>
+            <a:endParaRPr lang="en-US" dirty="0" smtClean="0"/>
+          </a:p>
+          <a:p>
+            <a:pPr marL="0" indent="0">
+              <a:buNone/>
+            </a:pPr>
+            <a:r>
+              <a:rPr lang="en-US" dirty="0" smtClean="0"/>
+              <a:t># </a:t>
+            </a:r>
+            <a:r>
+              <a:rPr lang="en-US" dirty="0"/>
+              <a:t>If using Fusion</a:t>
+            </a:r>
+            <a:endParaRPr lang="en-US" dirty="0" smtClean="0"/>
+          </a:p>
+          <a:p>
+            <a:pPr marL="0" indent="0">
+              <a:buNone/>
+            </a:pPr>
+            <a:r>
+              <a:rPr lang="en-US" dirty="0" err="1" smtClean="0"/>
+              <a:t>config.vm.provider</a:t>
+            </a:r>
+            <a:r>
+              <a:rPr lang="en-US" dirty="0" smtClean="0"/>
+              <a:t> </a:t>
+            </a:r>
+            <a:r>
+              <a:rPr lang="en-US" dirty="0"/>
+              <a:t>:</a:t>
+            </a:r>
+            <a:r>
+              <a:rPr lang="en-US" dirty="0" err="1"/>
+              <a:t>vmware_fusion</a:t>
+            </a:r>
+            <a:r>
+              <a:rPr lang="en-US" dirty="0"/>
+              <a:t> do |v|</a:t>
+            </a:r>
+          </a:p>
+          <a:p>
+            <a:pPr marL="0" indent="0">
+              <a:buNone/>
+            </a:pPr>
+            <a:r>
+              <a:rPr lang="en-US" dirty="0"/>
+              <a:t>     </a:t>
+            </a:r>
+            <a:r>
+              <a:rPr lang="en-US" dirty="0" smtClean="0"/>
+              <a:t> </a:t>
+            </a:r>
+            <a:r>
+              <a:rPr lang="en-US" dirty="0" err="1"/>
+              <a:t>v.vmx</a:t>
+            </a:r>
+            <a:r>
+              <a:rPr lang="en-US" dirty="0"/>
+              <a:t>["</a:t>
+            </a:r>
+            <a:r>
+              <a:rPr lang="en-US" dirty="0" err="1"/>
+              <a:t>memsize</a:t>
+            </a:r>
+            <a:r>
+              <a:rPr lang="en-US" dirty="0"/>
+              <a:t>"] = 1024</a:t>
+            </a:r>
+          </a:p>
+          <a:p>
+            <a:pPr marL="0" indent="0">
+              <a:buNone/>
+            </a:pPr>
+            <a:r>
+              <a:rPr lang="en-US" dirty="0" smtClean="0"/>
+              <a:t>end</a:t>
+            </a:r>
+            <a:endParaRPr lang="en-US" dirty="0"/>
+          </a:p>
+          <a:p>
+            <a:pPr marL="0" indent="0">
+              <a:buNone/>
+            </a:pPr>
+            <a:r>
+              <a:rPr lang="en-US" dirty="0" smtClean="0"/>
+              <a:t># </a:t>
+            </a:r>
+            <a:r>
+              <a:rPr lang="en-US" dirty="0"/>
+              <a:t>Otherwise using </a:t>
+            </a:r>
+            <a:r>
+              <a:rPr lang="en-US" dirty="0" err="1"/>
+              <a:t>VirtualBox</a:t>
+            </a:r>
+            <a:endParaRPr lang="en-US" dirty="0"/>
+          </a:p>
+          <a:p>
+            <a:pPr marL="0" indent="0">
+              <a:buNone/>
+            </a:pPr>
+            <a:r>
+              <a:rPr lang="en-US" dirty="0" err="1" smtClean="0"/>
+              <a:t>config.vm.provider</a:t>
+            </a:r>
+            <a:r>
+              <a:rPr lang="en-US" dirty="0" smtClean="0"/>
+              <a:t> </a:t>
+            </a:r>
+            <a:r>
+              <a:rPr lang="en-US" dirty="0"/>
+              <a:t>:</a:t>
+            </a:r>
+            <a:r>
+              <a:rPr lang="en-US" dirty="0" err="1"/>
+              <a:t>virtualbox</a:t>
+            </a:r>
+            <a:r>
+              <a:rPr lang="en-US" dirty="0"/>
+              <a:t> do |</a:t>
+            </a:r>
+            <a:r>
+              <a:rPr lang="en-US" dirty="0" err="1"/>
+              <a:t>vbox</a:t>
+            </a:r>
+            <a:r>
+              <a:rPr lang="en-US" dirty="0"/>
+              <a:t>|</a:t>
+            </a:r>
+          </a:p>
+          <a:p>
+            <a:pPr marL="0" indent="0">
+              <a:buNone/>
+            </a:pPr>
+            <a:r>
+              <a:rPr lang="en-US" dirty="0"/>
+              <a:t>     </a:t>
+            </a:r>
+            <a:r>
+              <a:rPr lang="en-US" dirty="0" err="1" smtClean="0"/>
+              <a:t>vbox.customize</a:t>
+            </a:r>
+            <a:r>
+              <a:rPr lang="en-US" dirty="0" smtClean="0"/>
+              <a:t> </a:t>
+            </a:r>
+            <a:r>
+              <a:rPr lang="en-US" dirty="0"/>
+              <a:t>["</a:t>
+            </a:r>
+            <a:r>
+              <a:rPr lang="en-US" dirty="0" err="1"/>
+              <a:t>modifyvm</a:t>
+            </a:r>
+            <a:r>
+              <a:rPr lang="en-US" dirty="0"/>
+              <a:t>", :id, "--memory", 1024]</a:t>
+            </a:r>
+          </a:p>
+          <a:p>
+            <a:pPr marL="0" indent="0">
+              <a:buNone/>
+            </a:pPr>
+            <a:r>
+              <a:rPr lang="en-US" dirty="0" smtClean="0"/>
+              <a:t>end</a:t>
+            </a:r>
+          </a:p>
+          <a:p>
+            <a:endParaRPr lang="en-US" dirty="0"/>
+          </a:p>
+        </p:txBody>
+      </p:sp>
+    </p:spTree>
+    <p:extLst>
+      <p:ext uri="{BB962C8B-B14F-4D97-AF65-F5344CB8AC3E}">
+        <p14:creationId xmlns:p14="http://schemas.microsoft.com/office/powerpoint/2010/main" val="2877358671"/>
+      </p:ext>
+    </p:extLst>
+  </p:cSld>
+  <p:clrMapOvr>
+    <a:masterClrMapping/>
+  </p:clrMapOvr>
+</p:sld>
+</file>
+
+<file path=ppt/slides/slide13.xml><?xml version="1.0" encoding="utf-8"?>
+<p:sld xmlns:a="http://schemas.openxmlformats.org/drawingml/2006/main" xmlns:r="http://schemas.openxmlformats.org/officeDocument/2006/relationships" xmlns:p="http://schemas.openxmlformats.org/presentationml/2006/main">
+  <p:cSld>
+    <p:spTree>
+      <p:nvGrpSpPr>
+        <p:cNvPr id="1" name=""/>
+        <p:cNvGrpSpPr/>
+        <p:nvPr/>
+      </p:nvGrpSpPr>
+      <p:grpSpPr>
+        <a:xfrm>
+          <a:off x="0" y="0"/>
+          <a:ext cx="0" cy="0"/>
+          <a:chOff x="0" y="0"/>
+          <a:chExt cx="0" cy="0"/>
+        </a:xfrm>
+      </p:grpSpPr>
+      <p:sp>
+        <p:nvSpPr>
+          <p:cNvPr id="2" name="Title 1"/>
+          <p:cNvSpPr>
+            <a:spLocks noGrp="1"/>
+          </p:cNvSpPr>
+          <p:nvPr>
+            <p:ph type="title"/>
+          </p:nvPr>
+        </p:nvSpPr>
+        <p:spPr/>
+        <p:txBody>
+          <a:bodyPr/>
+          <a:lstStyle/>
+          <a:p>
+            <a:r>
+              <a:rPr lang="en-US" dirty="0"/>
+              <a:t>Multi-VM Configuration </a:t>
+            </a:r>
+          </a:p>
+        </p:txBody>
+      </p:sp>
+      <p:sp>
+        <p:nvSpPr>
+          <p:cNvPr id="3" name="Content Placeholder 2"/>
+          <p:cNvSpPr>
+            <a:spLocks noGrp="1"/>
+          </p:cNvSpPr>
+          <p:nvPr>
+            <p:ph idx="1"/>
+          </p:nvPr>
+        </p:nvSpPr>
+        <p:spPr/>
+        <p:txBody>
+          <a:bodyPr/>
+          <a:lstStyle/>
+          <a:p>
+            <a:r>
+              <a:rPr lang="en-US" dirty="0" smtClean="0"/>
+              <a:t>See sample code</a:t>
+            </a:r>
+            <a:endParaRPr lang="en-US" dirty="0"/>
+          </a:p>
+        </p:txBody>
+      </p:sp>
+    </p:spTree>
+    <p:extLst>
+      <p:ext uri="{BB962C8B-B14F-4D97-AF65-F5344CB8AC3E}">
+        <p14:creationId xmlns:p14="http://schemas.microsoft.com/office/powerpoint/2010/main" val="4182006910"/>
+      </p:ext>
+    </p:extLst>
+  </p:cSld>
+  <p:clrMapOvr>
+    <a:masterClrMapping/>
+  </p:clrMapOvr>
+</p:sld>
+</file>
+
+<file path=ppt/slides/slide14.xml><?xml version="1.0" encoding="utf-8"?>
+<p:sld xmlns:a="http://schemas.openxmlformats.org/drawingml/2006/main" xmlns:r="http://schemas.openxmlformats.org/officeDocument/2006/relationships" xmlns:p="http://schemas.openxmlformats.org/presentationml/2006/main">
+  <p:cSld>
+    <p:spTree>
+      <p:nvGrpSpPr>
+        <p:cNvPr id="1" name=""/>
+        <p:cNvGrpSpPr/>
+        <p:nvPr/>
+      </p:nvGrpSpPr>
+      <p:grpSpPr>
+        <a:xfrm>
+          <a:off x="0" y="0"/>
+          <a:ext cx="0" cy="0"/>
+          <a:chOff x="0" y="0"/>
+          <a:chExt cx="0" cy="0"/>
+        </a:xfrm>
+      </p:grpSpPr>
+      <p:sp>
+        <p:nvSpPr>
+          <p:cNvPr id="2" name="Title 1"/>
+          <p:cNvSpPr>
+            <a:spLocks noGrp="1"/>
+          </p:cNvSpPr>
+          <p:nvPr>
+            <p:ph type="title"/>
+          </p:nvPr>
+        </p:nvSpPr>
+        <p:spPr/>
+        <p:txBody>
+          <a:bodyPr/>
+          <a:lstStyle/>
+          <a:p>
+            <a:r>
+              <a:rPr lang="en-US" dirty="0" err="1" smtClean="0"/>
+              <a:t>Provisioners</a:t>
+            </a:r>
+            <a:endParaRPr lang="en-US" dirty="0"/>
+          </a:p>
+        </p:txBody>
+      </p:sp>
+      <p:sp>
+        <p:nvSpPr>
+          <p:cNvPr id="3" name="Content Placeholder 2"/>
+          <p:cNvSpPr>
+            <a:spLocks noGrp="1"/>
+          </p:cNvSpPr>
+          <p:nvPr>
+            <p:ph idx="1"/>
+          </p:nvPr>
+        </p:nvSpPr>
+        <p:spPr/>
+        <p:txBody>
+          <a:bodyPr/>
+          <a:lstStyle/>
+          <a:p>
+            <a:r>
+              <a:rPr lang="en-US" dirty="0" smtClean="0"/>
+              <a:t>Configuration Management</a:t>
+            </a:r>
+          </a:p>
+          <a:p>
+            <a:pPr lvl="1"/>
+            <a:r>
+              <a:rPr lang="en-US" dirty="0" smtClean="0"/>
+              <a:t>Shell Scripts</a:t>
+            </a:r>
+          </a:p>
+          <a:p>
+            <a:pPr lvl="1"/>
+            <a:r>
+              <a:rPr lang="en-US" dirty="0" smtClean="0"/>
+              <a:t>Puppet (Standalone &amp; Agent)</a:t>
+            </a:r>
+          </a:p>
+          <a:p>
+            <a:pPr lvl="1"/>
+            <a:r>
+              <a:rPr lang="en-US" dirty="0" smtClean="0"/>
+              <a:t>Chef (Solo &amp; Client)</a:t>
+            </a:r>
+          </a:p>
+          <a:p>
+            <a:pPr lvl="1"/>
+            <a:r>
+              <a:rPr lang="en-US" dirty="0" err="1" smtClean="0"/>
+              <a:t>Ansible</a:t>
+            </a:r>
+            <a:endParaRPr lang="en-US" dirty="0"/>
+          </a:p>
+        </p:txBody>
+      </p:sp>
+    </p:spTree>
+    <p:extLst>
+      <p:ext uri="{BB962C8B-B14F-4D97-AF65-F5344CB8AC3E}">
+        <p14:creationId xmlns:p14="http://schemas.microsoft.com/office/powerpoint/2010/main" val="2895777034"/>
+      </p:ext>
+    </p:extLst>
+  </p:cSld>
+  <p:clrMapOvr>
+    <a:masterClrMapping/>
+  </p:clrMapOvr>
+  <p:timing>
+    <p:tnLst>
+      <p:par>
+        <p:cTn xmlns:p14="http://schemas.microsoft.com/office/powerpoint/2010/main" id="1" dur="indefinite" restart="never" nodeType="tmRoot"/>
+      </p:par>
+    </p:tnLst>
+  </p:timing>
+</p:sld>
+</file>
+
+<file path=ppt/slides/slide15.xml><?xml version="1.0" encoding="utf-8"?>
+<p:sld xmlns:a="http://schemas.openxmlformats.org/drawingml/2006/main" xmlns:r="http://schemas.openxmlformats.org/officeDocument/2006/relationships" xmlns:p="http://schemas.openxmlformats.org/presentationml/2006/main">
+  <p:cSld>
+    <p:spTree>
+      <p:nvGrpSpPr>
+        <p:cNvPr id="1" name=""/>
+        <p:cNvGrpSpPr/>
+        <p:nvPr/>
+      </p:nvGrpSpPr>
+      <p:grpSpPr>
+        <a:xfrm>
+          <a:off x="0" y="0"/>
+          <a:ext cx="0" cy="0"/>
+          <a:chOff x="0" y="0"/>
+          <a:chExt cx="0" cy="0"/>
+        </a:xfrm>
+      </p:grpSpPr>
+      <p:sp>
+        <p:nvSpPr>
+          <p:cNvPr id="2" name="Title 1"/>
+          <p:cNvSpPr>
+            <a:spLocks noGrp="1"/>
+          </p:cNvSpPr>
+          <p:nvPr>
+            <p:ph type="title"/>
+          </p:nvPr>
+        </p:nvSpPr>
+        <p:spPr/>
+        <p:txBody>
+          <a:bodyPr/>
+          <a:lstStyle/>
+          <a:p>
+            <a:r>
+              <a:rPr lang="en-US" dirty="0" smtClean="0"/>
+              <a:t>Additional Info</a:t>
+            </a:r>
+            <a:endParaRPr lang="en-US" dirty="0"/>
+          </a:p>
+        </p:txBody>
+      </p:sp>
+      <p:sp>
+        <p:nvSpPr>
+          <p:cNvPr id="3" name="Content Placeholder 2"/>
+          <p:cNvSpPr>
+            <a:spLocks noGrp="1"/>
+          </p:cNvSpPr>
+          <p:nvPr>
+            <p:ph idx="1"/>
+          </p:nvPr>
+        </p:nvSpPr>
+        <p:spPr/>
+        <p:txBody>
+          <a:bodyPr>
+            <a:noAutofit/>
+          </a:bodyPr>
+          <a:lstStyle/>
+          <a:p>
+            <a:r>
+              <a:rPr lang="en-US" sz="2400" dirty="0" smtClean="0"/>
+              <a:t>Vagrant Site</a:t>
+            </a:r>
+            <a:r>
+              <a:rPr lang="en-US" sz="2400" dirty="0"/>
+              <a:t>: </a:t>
+            </a:r>
+            <a:r>
+              <a:rPr lang="en-US" sz="2400" dirty="0">
+                <a:hlinkClick r:id="rId2"/>
+              </a:rPr>
+              <a:t>http://docs.vagrantup.com/v2</a:t>
+            </a:r>
+            <a:r>
+              <a:rPr lang="en-US" sz="2400" dirty="0" smtClean="0">
+                <a:hlinkClick r:id="rId2"/>
+              </a:rPr>
               <a:t>/</a:t>
             </a:r>
-            <a:endParaRPr lang="en-US" dirty="0"/>
-          </a:p>
-          <a:p>
-            <a:r>
-              <a:rPr lang="en-US" dirty="0" smtClean="0"/>
+            <a:endParaRPr lang="en-US" sz="2400" dirty="0"/>
+          </a:p>
+          <a:p>
+            <a:r>
+              <a:rPr lang="en-US" sz="2400" dirty="0" smtClean="0"/>
               <a:t>Google Groups: </a:t>
             </a:r>
             <a:r>
-              <a:rPr lang="en-US" dirty="0" smtClean="0">
+              <a:rPr lang="en-US" sz="2400" dirty="0" smtClean="0">
                 <a:hlinkClick r:id="rId3"/>
               </a:rPr>
               <a:t>https</a:t>
             </a:r>
             <a:r>
-              <a:rPr lang="en-US" dirty="0">
+              <a:rPr lang="en-US" sz="2400" dirty="0">
                 <a:hlinkClick r:id="rId3"/>
               </a:rPr>
               <a:t>://groups.google.com/forum/#!forum/vagrant-</a:t>
             </a:r>
             <a:r>
-              <a:rPr lang="en-US" dirty="0" smtClean="0">
+              <a:rPr lang="en-US" sz="2400" dirty="0" smtClean="0">
                 <a:hlinkClick r:id="rId3"/>
               </a:rPr>
               <a:t>up</a:t>
             </a:r>
-            <a:endParaRPr lang="en-US" dirty="0" smtClean="0"/>
-          </a:p>
-          <a:p>
-            <a:r>
-              <a:rPr lang="en-US" dirty="0" smtClean="0"/>
+            <a:endParaRPr lang="en-US" sz="2400" dirty="0" smtClean="0"/>
+          </a:p>
+          <a:p>
+            <a:r>
+              <a:rPr lang="en-US" sz="2400" dirty="0" smtClean="0"/>
               <a:t>IRC</a:t>
             </a:r>
             <a:r>
-              <a:rPr lang="en-US" dirty="0"/>
+              <a:rPr lang="en-US" sz="2400" dirty="0"/>
               <a:t>: #vagrant on </a:t>
             </a:r>
             <a:r>
-              <a:rPr lang="en-US" dirty="0" err="1"/>
+              <a:rPr lang="en-US" sz="2400" dirty="0" err="1" smtClean="0"/>
               <a:t>Freenode</a:t>
             </a:r>
-            <a:endParaRPr lang="en-US" dirty="0" smtClean="0"/>
-          </a:p>
-          <a:p>
-            <a:r>
-              <a:rPr lang="en-US" dirty="0" smtClean="0"/>
-              <a:t>Mitchell’s Book</a:t>
-            </a:r>
-            <a:endParaRPr lang="en-US" dirty="0"/>
+            <a:endParaRPr lang="en-US" sz="2400" dirty="0" smtClean="0"/>
+          </a:p>
+          <a:p>
+            <a:r>
+              <a:rPr lang="en-US" sz="2400" dirty="0" err="1" smtClean="0"/>
+              <a:t>GitHub</a:t>
+            </a:r>
+            <a:r>
+              <a:rPr lang="en-US" sz="2400" dirty="0" smtClean="0"/>
+              <a:t> (Check out </a:t>
+            </a:r>
+            <a:r>
+              <a:rPr lang="en-US" sz="2400" dirty="0" err="1" smtClean="0"/>
+              <a:t>bunchc</a:t>
+            </a:r>
+            <a:r>
+              <a:rPr lang="en-US" sz="2400" dirty="0"/>
+              <a:t>, </a:t>
+            </a:r>
+            <a:r>
+              <a:rPr lang="en-US" sz="2400" dirty="0" err="1" smtClean="0"/>
+              <a:t>bodepd</a:t>
+            </a:r>
+            <a:r>
+              <a:rPr lang="en-US" sz="2400" dirty="0"/>
+              <a:t>, </a:t>
+            </a:r>
+            <a:r>
+              <a:rPr lang="en-US" sz="2400" dirty="0" err="1" smtClean="0"/>
+              <a:t>ody</a:t>
+            </a:r>
+            <a:r>
+              <a:rPr lang="en-US" sz="2400" dirty="0" smtClean="0"/>
+              <a:t>, </a:t>
+            </a:r>
+            <a:r>
+              <a:rPr lang="en-US" sz="2400" dirty="0" err="1" smtClean="0"/>
+              <a:t>etc</a:t>
+            </a:r>
+            <a:r>
+              <a:rPr lang="en-US" sz="2400" dirty="0" smtClean="0"/>
+              <a:t>)</a:t>
+            </a:r>
+            <a:endParaRPr lang="en-US" sz="2400" dirty="0" smtClean="0"/>
+          </a:p>
+          <a:p>
+            <a:r>
+              <a:rPr lang="en-US" sz="2400" dirty="0" smtClean="0"/>
+              <a:t>For Fusion-related tips, I post them as I find them:</a:t>
+            </a:r>
+            <a:endParaRPr lang="en-US" sz="2400" dirty="0"/>
+          </a:p>
+          <a:p>
+            <a:pPr lvl="1"/>
+            <a:r>
+              <a:rPr lang="en-US" sz="2000" dirty="0">
+                <a:hlinkClick r:id="rId4"/>
+              </a:rPr>
+              <a:t>http://vmtrooper.com/category/automation/vagrant</a:t>
+            </a:r>
+            <a:r>
+              <a:rPr lang="en-US" sz="2000" dirty="0" smtClean="0">
+                <a:hlinkClick r:id="rId4"/>
+              </a:rPr>
+              <a:t>/</a:t>
+            </a:r>
+            <a:endParaRPr lang="en-US" sz="2000" dirty="0" smtClean="0"/>
+          </a:p>
+          <a:p>
+            <a:r>
+              <a:rPr lang="en-US" sz="2400" dirty="0" smtClean="0"/>
+              <a:t>Mitchell’s </a:t>
+            </a:r>
+            <a:r>
+              <a:rPr lang="en-US" sz="2400" dirty="0" smtClean="0"/>
+              <a:t>Book</a:t>
+            </a:r>
+            <a:endParaRPr lang="en-US" sz="2400" dirty="0"/>
           </a:p>
         </p:txBody>
       </p:sp>
@@ -3407,15 +4855,15 @@
           <p:nvPr/>
         </p:nvPicPr>
         <p:blipFill>
-          <a:blip r:embed="rId4"/>
+          <a:blip r:embed="rId5"/>
           <a:stretch>
             <a:fillRect/>
           </a:stretch>
         </p:blipFill>
         <p:spPr>
           <a:xfrm>
-            <a:off x="7490486" y="3094670"/>
-            <a:ext cx="1461354" cy="1917787"/>
+            <a:off x="2944168" y="4119417"/>
+            <a:ext cx="792361" cy="1039843"/>
           </a:xfrm>
           <a:prstGeom prst="rect">
             <a:avLst/>
@@ -3432,6 +4880,13 @@
   <p:clrMapOvr>
     <a:masterClrMapping/>
   </p:clrMapOvr>
+  <p:timing>
+    <p:tnLst>
+      <p:par>
+        <p:cTn xmlns:p14="http://schemas.microsoft.com/office/powerpoint/2010/main" id="1" dur="indefinite" restart="never" nodeType="tmRoot"/>
+      </p:par>
+    </p:tnLst>
+  </p:timing>
 </p:sld>
 </file>
 
@@ -3469,7 +4924,7 @@
           <a:p>
             <a:r>
               <a:rPr lang="en-US" dirty="0" smtClean="0"/>
-              <a:t>Step 1: Select your Provider</a:t>
+              <a:t>Introduction</a:t>
             </a:r>
             <a:endParaRPr lang="en-US" dirty="0"/>
           </a:p>
@@ -3487,41 +4942,70 @@
         </p:nvSpPr>
         <p:spPr/>
         <p:txBody>
-          <a:bodyPr/>
-          <a:lstStyle/>
-          <a:p>
-            <a:r>
-              <a:rPr lang="en-US" dirty="0" smtClean="0"/>
-              <a:t>What is a provider?</a:t>
+          <a:bodyPr>
+            <a:normAutofit fontScale="92500" lnSpcReduction="10000"/>
+          </a:bodyPr>
+          <a:lstStyle/>
+          <a:p>
+            <a:r>
+              <a:rPr lang="en-US" dirty="0" smtClean="0"/>
+              <a:t>What is Vagrant?</a:t>
             </a:r>
           </a:p>
           <a:p>
             <a:pPr lvl="1"/>
             <a:r>
               <a:rPr lang="en-US" dirty="0" smtClean="0"/>
-              <a:t>Oracle </a:t>
+              <a:t>Created by Mitchell Hashimoto</a:t>
+            </a:r>
+          </a:p>
+          <a:p>
+            <a:pPr lvl="1"/>
+            <a:r>
+              <a:rPr lang="en-US" dirty="0" smtClean="0"/>
+              <a:t>Provisioning Tool for </a:t>
             </a:r>
             <a:r>
               <a:rPr lang="en-US" dirty="0" err="1" smtClean="0"/>
-              <a:t>VirtualBox</a:t>
-            </a:r>
-            <a:r>
-              <a:rPr lang="en-US" dirty="0" smtClean="0"/>
-              <a:t> (Free)</a:t>
+              <a:t>Dev</a:t>
+            </a:r>
+            <a:r>
+              <a:rPr lang="en-US" dirty="0" smtClean="0"/>
+              <a:t> &amp; Test Environments</a:t>
+            </a:r>
+          </a:p>
+          <a:p>
+            <a:r>
+              <a:rPr lang="en-US" dirty="0" smtClean="0"/>
+              <a:t>Why use Vagrant?</a:t>
             </a:r>
           </a:p>
           <a:p>
             <a:pPr lvl="1"/>
             <a:r>
               <a:rPr lang="en-US" dirty="0" smtClean="0"/>
-              <a:t>VMware Fusion or Workstation ($)</a:t>
+              <a:t>Quick</a:t>
             </a:r>
           </a:p>
           <a:p>
             <a:pPr lvl="1"/>
             <a:r>
               <a:rPr lang="en-US" dirty="0" smtClean="0"/>
-              <a:t>Roll your own (AWS, Rackspace, etc.)</a:t>
+              <a:t>Easily replicate production on a </a:t>
+            </a:r>
+            <a:r>
+              <a:rPr lang="en-US" dirty="0" err="1" smtClean="0"/>
+              <a:t>Dev</a:t>
+            </a:r>
+            <a:r>
+              <a:rPr lang="en-US" dirty="0" smtClean="0"/>
+              <a:t> box</a:t>
+            </a:r>
+          </a:p>
+          <a:p>
+            <a:r>
+              <a:rPr lang="en-US" dirty="0" smtClean="0"/>
+              <a:t>How do I get started? </a:t>
             </a:r>
             <a:endParaRPr lang="en-US" dirty="0"/>
           </a:p>
@@ -3530,20 +5014,13 @@
     </p:spTree>
     <p:extLst>
       <p:ext uri="{BB962C8B-B14F-4D97-AF65-F5344CB8AC3E}">
-        <p14:creationId xmlns:p14="http://schemas.microsoft.com/office/powerpoint/2010/main" val="2981584085"/>
+        <p14:creationId xmlns:p14="http://schemas.microsoft.com/office/powerpoint/2010/main" val="1038783077"/>
       </p:ext>
     </p:extLst>
   </p:cSld>
   <p:clrMapOvr>
     <a:masterClrMapping/>
   </p:clrMapOvr>
-  <p:timing>
-    <p:tnLst>
-      <p:par>
-        <p:cTn xmlns:p14="http://schemas.microsoft.com/office/powerpoint/2010/main" id="1" dur="indefinite" restart="never" nodeType="tmRoot"/>
-      </p:par>
-    </p:tnLst>
-  </p:timing>
 </p:sld>
 </file>
 
@@ -3581,7 +5058,7 @@
           <a:p>
             <a:r>
               <a:rPr lang="en-US" dirty="0" smtClean="0"/>
-              <a:t>Step 2: Install Vagrant</a:t>
+              <a:t>Step 1: Select your Provider</a:t>
             </a:r>
             <a:endParaRPr lang="en-US" dirty="0"/>
           </a:p>
@@ -3603,19 +5080,50 @@
           <a:lstStyle/>
           <a:p>
             <a:r>
-              <a:rPr lang="en-US" dirty="0" smtClean="0">
-                <a:hlinkClick r:id="rId2"/>
-              </a:rPr>
-              <a:t>http://downloads.vagrant.com</a:t>
-            </a:r>
-            <a:endParaRPr lang="en-US" dirty="0" smtClean="0"/>
+              <a:rPr lang="en-US" dirty="0" smtClean="0"/>
+              <a:t>What is a provider?</a:t>
+            </a:r>
+          </a:p>
+          <a:p>
+            <a:pPr lvl="1"/>
+            <a:r>
+              <a:rPr lang="en-US" dirty="0" smtClean="0"/>
+              <a:t>Oracle </a:t>
+            </a:r>
+            <a:r>
+              <a:rPr lang="en-US" dirty="0" err="1" smtClean="0"/>
+              <a:t>VirtualBox</a:t>
+            </a:r>
+            <a:r>
+              <a:rPr lang="en-US" dirty="0" smtClean="0"/>
+              <a:t> (Free)</a:t>
+            </a:r>
+          </a:p>
+          <a:p>
+            <a:pPr lvl="1"/>
+            <a:r>
+              <a:rPr lang="en-US" dirty="0" smtClean="0"/>
+              <a:t>VMware Fusion or Workstation ($)</a:t>
+            </a:r>
+          </a:p>
+          <a:p>
+            <a:pPr lvl="1"/>
+            <a:r>
+              <a:rPr lang="en-US" dirty="0" smtClean="0"/>
+              <a:t>Build </a:t>
+            </a:r>
+            <a:r>
+              <a:rPr lang="en-US" dirty="0" smtClean="0"/>
+              <a:t>your own (AWS, Rackspace, etc.)</a:t>
+            </a:r>
+            <a:endParaRPr lang="en-US" dirty="0"/>
           </a:p>
         </p:txBody>
       </p:sp>
     </p:spTree>
     <p:extLst>
       <p:ext uri="{BB962C8B-B14F-4D97-AF65-F5344CB8AC3E}">
-        <p14:creationId xmlns:p14="http://schemas.microsoft.com/office/powerpoint/2010/main" val="819453780"/>
+        <p14:creationId xmlns:p14="http://schemas.microsoft.com/office/powerpoint/2010/main" val="2981584085"/>
       </p:ext>
     </p:extLst>
   </p:cSld>
@@ -3666,7 +5174,7 @@
           <a:p>
             <a:r>
               <a:rPr lang="en-US" dirty="0" smtClean="0"/>
-              <a:t>Step 3: Download a box</a:t>
+              <a:t>Step 2: Install Vagrant</a:t>
             </a:r>
             <a:endParaRPr lang="en-US" dirty="0"/>
           </a:p>
@@ -3684,77 +5192,36 @@
         </p:nvSpPr>
         <p:spPr/>
         <p:txBody>
-          <a:bodyPr>
-            <a:normAutofit lnSpcReduction="10000"/>
-          </a:bodyPr>
-          <a:lstStyle/>
-          <a:p>
-            <a:r>
-              <a:rPr lang="en-US" dirty="0" smtClean="0"/>
-              <a:t>VMware Fusion: </a:t>
-            </a:r>
+          <a:bodyPr/>
+          <a:lstStyle/>
+          <a:p>
             <a:r>
               <a:rPr lang="en-US" dirty="0" smtClean="0">
                 <a:hlinkClick r:id="rId2"/>
               </a:rPr>
-              <a:t>http://files.vagrantup.com/precise64_vmware.box</a:t>
+              <a:t>http://downloads.vagrantup.com</a:t>
             </a:r>
             <a:endParaRPr lang="en-US" dirty="0" smtClean="0"/>
-          </a:p>
-          <a:p>
-            <a:r>
-              <a:rPr lang="en-US" dirty="0" err="1" smtClean="0"/>
-              <a:t>VirtualBox</a:t>
-            </a:r>
-            <a:r>
-              <a:rPr lang="en-US" dirty="0" smtClean="0"/>
-              <a:t>: </a:t>
-            </a:r>
-            <a:r>
-              <a:rPr lang="en-US" dirty="0">
-                <a:hlinkClick r:id="rId3"/>
-              </a:rPr>
-              <a:t>http://files.vagrantup.com/</a:t>
-            </a:r>
-            <a:r>
-              <a:rPr lang="en-US" dirty="0" smtClean="0">
-                <a:hlinkClick r:id="rId3"/>
-              </a:rPr>
-              <a:t>precise64.box</a:t>
-            </a:r>
-            <a:endParaRPr lang="en-US" dirty="0"/>
-          </a:p>
-          <a:p>
-            <a:r>
-              <a:rPr lang="en-US" dirty="0" smtClean="0"/>
-              <a:t>Roll your own or use others: </a:t>
-            </a:r>
-            <a:r>
-              <a:rPr lang="en-US" dirty="0" smtClean="0">
-                <a:hlinkClick r:id="rId4"/>
-              </a:rPr>
-              <a:t>http://www.vagrantbox.es/</a:t>
-            </a:r>
-            <a:endParaRPr lang="en-US" dirty="0" smtClean="0"/>
-          </a:p>
-          <a:p>
-            <a:pPr marL="0" indent="0">
-              <a:buNone/>
-            </a:pPr>
-            <a:endParaRPr lang="en-US" dirty="0"/>
           </a:p>
         </p:txBody>
       </p:sp>
     </p:spTree>
     <p:extLst>
       <p:ext uri="{BB962C8B-B14F-4D97-AF65-F5344CB8AC3E}">
-        <p14:creationId xmlns:p14="http://schemas.microsoft.com/office/powerpoint/2010/main" val="1600999557"/>
+        <p14:creationId xmlns:p14="http://schemas.microsoft.com/office/powerpoint/2010/main" val="819453780"/>
       </p:ext>
     </p:extLst>
   </p:cSld>
   <p:clrMapOvr>
     <a:masterClrMapping/>
   </p:clrMapOvr>
+  <p:timing>
+    <p:tnLst>
+      <p:par>
+        <p:cTn xmlns:p14="http://schemas.microsoft.com/office/powerpoint/2010/main" id="1" dur="indefinite" restart="never" nodeType="tmRoot"/>
+      </p:par>
+    </p:tnLst>
+  </p:timing>
 </p:sld>
 </file>
 
@@ -3792,43 +5259,93 @@
           <a:p>
             <a:r>
               <a:rPr lang="en-US" dirty="0" smtClean="0"/>
-              <a:t>Step 4: Vagrant </a:t>
-            </a:r>
+              <a:t>Step 3: Download a box</a:t>
+            </a:r>
+            <a:endParaRPr lang="en-US" dirty="0"/>
+          </a:p>
+        </p:txBody>
+      </p:sp>
+      <p:sp>
+        <p:nvSpPr>
+          <p:cNvPr id="3" name="Content Placeholder 2"/>
+          <p:cNvSpPr>
+            <a:spLocks noGrp="1"/>
+          </p:cNvSpPr>
+          <p:nvPr>
+            <p:ph idx="1"/>
+          </p:nvPr>
+        </p:nvSpPr>
+        <p:spPr/>
+        <p:txBody>
+          <a:bodyPr>
+            <a:normAutofit lnSpcReduction="10000"/>
+          </a:bodyPr>
+          <a:lstStyle/>
+          <a:p>
+            <a:r>
+              <a:rPr lang="en-US" dirty="0" smtClean="0"/>
+              <a:t>VMware Fusion: </a:t>
+            </a:r>
+            <a:r>
+              <a:rPr lang="en-US" dirty="0" smtClean="0">
+                <a:hlinkClick r:id="rId3"/>
+              </a:rPr>
+              <a:t>http://files.vagrantup.com/precise64_vmware.box</a:t>
+            </a:r>
+            <a:endParaRPr lang="en-US" dirty="0" smtClean="0"/>
+          </a:p>
+          <a:p>
             <a:r>
               <a:rPr lang="en-US" dirty="0" err="1" smtClean="0"/>
-              <a:t>Init</a:t>
-            </a:r>
-            <a:r>
-              <a:rPr lang="en-US" dirty="0" smtClean="0"/>
-              <a:t> &amp; Up </a:t>
+              <a:t>VirtualBox</a:t>
+            </a:r>
+            <a:r>
+              <a:rPr lang="en-US" dirty="0" smtClean="0"/>
+              <a:t>: </a:t>
+            </a:r>
+            <a:r>
+              <a:rPr lang="en-US" dirty="0">
+                <a:hlinkClick r:id="rId4"/>
+              </a:rPr>
+              <a:t>http://files.vagrantup.com/</a:t>
+            </a:r>
+            <a:r>
+              <a:rPr lang="en-US" dirty="0" smtClean="0">
+                <a:hlinkClick r:id="rId4"/>
+              </a:rPr>
+              <a:t>precise64.box</a:t>
             </a:r>
             <a:endParaRPr lang="en-US" dirty="0"/>
           </a:p>
-        </p:txBody>
-      </p:sp>
-      <p:sp>
-        <p:nvSpPr>
-          <p:cNvPr id="3" name="Content Placeholder 2"/>
-          <p:cNvSpPr>
-            <a:spLocks noGrp="1"/>
-          </p:cNvSpPr>
-          <p:nvPr>
-            <p:ph idx="1"/>
-          </p:nvPr>
-        </p:nvSpPr>
-        <p:spPr/>
-        <p:txBody>
-          <a:bodyPr/>
-          <a:lstStyle/>
-          <a:p>
-            <a:endParaRPr lang="en-US"/>
+          <a:p>
+            <a:r>
+              <a:rPr lang="en-US" dirty="0" smtClean="0"/>
+              <a:t>Build </a:t>
+            </a:r>
+            <a:r>
+              <a:rPr lang="en-US" dirty="0" smtClean="0"/>
+              <a:t>your own or use others: </a:t>
+            </a:r>
+            <a:r>
+              <a:rPr lang="en-US" dirty="0" smtClean="0">
+                <a:hlinkClick r:id="rId5"/>
+              </a:rPr>
+              <a:t>http://www.vagrantbox.es/</a:t>
+            </a:r>
+            <a:endParaRPr lang="en-US" dirty="0" smtClean="0"/>
+          </a:p>
+          <a:p>
+            <a:pPr marL="0" indent="0">
+              <a:buNone/>
+            </a:pPr>
+            <a:endParaRPr lang="en-US" dirty="0"/>
           </a:p>
         </p:txBody>
       </p:sp>
     </p:spTree>
     <p:extLst>
       <p:ext uri="{BB962C8B-B14F-4D97-AF65-F5344CB8AC3E}">
-        <p14:creationId xmlns:p14="http://schemas.microsoft.com/office/powerpoint/2010/main" val="3341478902"/>
+        <p14:creationId xmlns:p14="http://schemas.microsoft.com/office/powerpoint/2010/main" val="1600999557"/>
       </p:ext>
     </p:extLst>
   </p:cSld>
@@ -3872,6 +5389,121 @@
           <a:p>
             <a:r>
               <a:rPr lang="en-US" dirty="0" smtClean="0"/>
+              <a:t>Step 4: Vagrant </a:t>
+            </a:r>
+            <a:r>
+              <a:rPr lang="en-US" dirty="0" err="1" smtClean="0"/>
+              <a:t>Init</a:t>
+            </a:r>
+            <a:r>
+              <a:rPr lang="en-US" dirty="0" smtClean="0"/>
+              <a:t> &amp; Up </a:t>
+            </a:r>
+            <a:endParaRPr lang="en-US" dirty="0"/>
+          </a:p>
+        </p:txBody>
+      </p:sp>
+      <p:sp>
+        <p:nvSpPr>
+          <p:cNvPr id="3" name="Content Placeholder 2"/>
+          <p:cNvSpPr>
+            <a:spLocks noGrp="1"/>
+          </p:cNvSpPr>
+          <p:nvPr>
+            <p:ph idx="1"/>
+          </p:nvPr>
+        </p:nvSpPr>
+        <p:spPr/>
+        <p:txBody>
+          <a:bodyPr/>
+          <a:lstStyle/>
+          <a:p>
+            <a:pPr marL="0" indent="0">
+              <a:buNone/>
+            </a:pPr>
+            <a:r>
+              <a:rPr lang="en-US" dirty="0" smtClean="0"/>
+              <a:t>Terminal Window in the directory for your test lab:</a:t>
+            </a:r>
+          </a:p>
+          <a:p>
+            <a:r>
+              <a:rPr lang="en-US" dirty="0" smtClean="0"/>
+              <a:t>vagrant </a:t>
+            </a:r>
+            <a:r>
+              <a:rPr lang="en-US" dirty="0" err="1" smtClean="0"/>
+              <a:t>init</a:t>
+            </a:r>
+            <a:endParaRPr lang="en-US" dirty="0" smtClean="0"/>
+          </a:p>
+          <a:p>
+            <a:r>
+              <a:rPr lang="en-US" dirty="0" smtClean="0"/>
+              <a:t>Edit the resulting </a:t>
+            </a:r>
+            <a:r>
+              <a:rPr lang="en-US" dirty="0" err="1" smtClean="0"/>
+              <a:t>Vagrantfile</a:t>
+            </a:r>
+            <a:endParaRPr lang="en-US" dirty="0" smtClean="0"/>
+          </a:p>
+          <a:p>
+            <a:r>
+              <a:rPr lang="en-US" dirty="0" smtClean="0"/>
+              <a:t>vagrant up</a:t>
+            </a:r>
+            <a:endParaRPr lang="en-US" dirty="0"/>
+          </a:p>
+        </p:txBody>
+      </p:sp>
+    </p:spTree>
+    <p:extLst>
+      <p:ext uri="{BB962C8B-B14F-4D97-AF65-F5344CB8AC3E}">
+        <p14:creationId xmlns:p14="http://schemas.microsoft.com/office/powerpoint/2010/main" val="3341478902"/>
+      </p:ext>
+    </p:extLst>
+  </p:cSld>
+  <p:clrMapOvr>
+    <a:masterClrMapping/>
+  </p:clrMapOvr>
+</p:sld>
+</file>
+
+<file path=ppt/slides/slide7.xml><?xml version="1.0" encoding="utf-8"?>
+<p:sld xmlns:a="http://schemas.openxmlformats.org/drawingml/2006/main" xmlns:r="http://schemas.openxmlformats.org/officeDocument/2006/relationships" xmlns:p="http://schemas.openxmlformats.org/presentationml/2006/main">
+  <p:cSld>
+    <p:spTree>
+      <p:nvGrpSpPr>
+        <p:cNvPr id="1" name=""/>
+        <p:cNvGrpSpPr/>
+        <p:nvPr/>
+      </p:nvGrpSpPr>
+      <p:grpSpPr>
+        <a:xfrm>
+          <a:off x="0" y="0"/>
+          <a:ext cx="0" cy="0"/>
+          <a:chOff x="0" y="0"/>
+          <a:chExt cx="0" cy="0"/>
+        </a:xfrm>
+      </p:grpSpPr>
+      <p:sp>
+        <p:nvSpPr>
+          <p:cNvPr id="2" name="Title 1"/>
+          <p:cNvSpPr>
+            <a:spLocks noGrp="1"/>
+          </p:cNvSpPr>
+          <p:nvPr>
+            <p:ph type="title"/>
+          </p:nvPr>
+        </p:nvSpPr>
+        <p:spPr/>
+        <p:txBody>
+          <a:bodyPr/>
+          <a:lstStyle/>
+          <a:p>
+            <a:r>
+              <a:rPr lang="en-US" dirty="0" smtClean="0"/>
               <a:t>Step 5: Vagrant SSH</a:t>
             </a:r>
             <a:endParaRPr lang="en-US" dirty="0"/>
@@ -3893,7 +5525,24 @@
           <a:bodyPr/>
           <a:lstStyle/>
           <a:p>
-            <a:endParaRPr lang="en-US"/>
+            <a:pPr marL="0" indent="0">
+              <a:buNone/>
+            </a:pPr>
+            <a:r>
+              <a:rPr lang="en-US" dirty="0" smtClean="0"/>
+              <a:t>Login to the VM using vagrant CLI:</a:t>
+            </a:r>
+          </a:p>
+          <a:p>
+            <a:r>
+              <a:rPr lang="en-US" dirty="0" smtClean="0"/>
+              <a:t>vagrant </a:t>
+            </a:r>
+            <a:r>
+              <a:rPr lang="en-US" dirty="0" err="1" smtClean="0"/>
+              <a:t>ssh</a:t>
+            </a:r>
+            <a:endParaRPr lang="en-US" dirty="0" smtClean="0"/>
           </a:p>
         </p:txBody>
       </p:sp>
@@ -3910,7 +5559,7 @@
 </p:sld>
 </file>
 
-<file path=ppt/slides/slide7.xml><?xml version="1.0" encoding="utf-8"?>
+<file path=ppt/slides/slide8.xml><?xml version="1.0" encoding="utf-8"?>
 <p:sld xmlns:a="http://schemas.openxmlformats.org/drawingml/2006/main" xmlns:r="http://schemas.openxmlformats.org/officeDocument/2006/relationships" xmlns:p="http://schemas.openxmlformats.org/presentationml/2006/main">
   <p:cSld>
     <p:spTree>
@@ -3993,119 +5642,6 @@
 </p:sld>
 </file>
 
-<file path=ppt/slides/slide8.xml><?xml version="1.0" encoding="utf-8"?>
-<p:sld xmlns:a="http://schemas.openxmlformats.org/drawingml/2006/main" xmlns:r="http://schemas.openxmlformats.org/officeDocument/2006/relationships" xmlns:p="http://schemas.openxmlformats.org/presentationml/2006/main">
-  <p:cSld>
-    <p:spTree>
-      <p:nvGrpSpPr>
-        <p:cNvPr id="1" name=""/>
-        <p:cNvGrpSpPr/>
-        <p:nvPr/>
-      </p:nvGrpSpPr>
-      <p:grpSpPr>
-        <a:xfrm>
-          <a:off x="0" y="0"/>
-          <a:ext cx="0" cy="0"/>
-          <a:chOff x="0" y="0"/>
-          <a:chExt cx="0" cy="0"/>
-        </a:xfrm>
-      </p:grpSpPr>
-      <p:sp>
-        <p:nvSpPr>
-          <p:cNvPr id="2" name="Title 1"/>
-          <p:cNvSpPr>
-            <a:spLocks noGrp="1"/>
-          </p:cNvSpPr>
-          <p:nvPr>
-            <p:ph type="title"/>
-          </p:nvPr>
-        </p:nvSpPr>
-        <p:spPr/>
-        <p:txBody>
-          <a:bodyPr/>
-          <a:lstStyle/>
-          <a:p>
-            <a:r>
-              <a:rPr lang="en-US" dirty="0" smtClean="0"/>
-              <a:t>But wait, there’s more…</a:t>
-            </a:r>
-            <a:endParaRPr lang="en-US" dirty="0"/>
-          </a:p>
-        </p:txBody>
-      </p:sp>
-      <p:sp>
-        <p:nvSpPr>
-          <p:cNvPr id="3" name="Content Placeholder 2"/>
-          <p:cNvSpPr>
-            <a:spLocks noGrp="1"/>
-          </p:cNvSpPr>
-          <p:nvPr>
-            <p:ph idx="1"/>
-          </p:nvPr>
-        </p:nvSpPr>
-        <p:spPr/>
-        <p:txBody>
-          <a:bodyPr/>
-          <a:lstStyle/>
-          <a:p>
-            <a:r>
-              <a:rPr lang="en-US" dirty="0" smtClean="0"/>
-              <a:t>Version Control</a:t>
-            </a:r>
-          </a:p>
-          <a:p>
-            <a:r>
-              <a:rPr lang="en-US" dirty="0" smtClean="0"/>
-              <a:t>Custom IP Addresses</a:t>
-            </a:r>
-          </a:p>
-          <a:p>
-            <a:r>
-              <a:rPr lang="en-US" dirty="0" smtClean="0"/>
-              <a:t>Multi-VM </a:t>
-            </a:r>
-            <a:r>
-              <a:rPr lang="en-US" dirty="0" smtClean="0"/>
-              <a:t>Configuration (Static &amp; Dynamic)</a:t>
-            </a:r>
-            <a:endParaRPr lang="en-US" dirty="0" smtClean="0"/>
-          </a:p>
-          <a:p>
-            <a:r>
-              <a:rPr lang="en-US" dirty="0" smtClean="0"/>
-              <a:t>Shell, Puppet </a:t>
-            </a:r>
-            <a:r>
-              <a:rPr lang="en-US" dirty="0" smtClean="0"/>
-              <a:t>&amp; Chef </a:t>
-            </a:r>
-            <a:r>
-              <a:rPr lang="en-US" dirty="0" smtClean="0"/>
-              <a:t>Provisioning</a:t>
-            </a:r>
-            <a:endParaRPr lang="en-US" dirty="0" smtClean="0"/>
-          </a:p>
-          <a:p>
-            <a:r>
-              <a:rPr lang="en-US" dirty="0" smtClean="0"/>
-              <a:t>Squid Proxy</a:t>
-            </a:r>
-          </a:p>
-        </p:txBody>
-      </p:sp>
-    </p:spTree>
-    <p:extLst>
-      <p:ext uri="{BB962C8B-B14F-4D97-AF65-F5344CB8AC3E}">
-        <p14:creationId xmlns:p14="http://schemas.microsoft.com/office/powerpoint/2010/main" val="1199135339"/>
-      </p:ext>
-    </p:extLst>
-  </p:cSld>
-  <p:clrMapOvr>
-    <a:masterClrMapping/>
-  </p:clrMapOvr>
-</p:sld>
-</file>
-
 <file path=ppt/slides/slide9.xml><?xml version="1.0" encoding="utf-8"?>
 <p:sld xmlns:a="http://schemas.openxmlformats.org/drawingml/2006/main" xmlns:r="http://schemas.openxmlformats.org/officeDocument/2006/relationships" xmlns:p="http://schemas.openxmlformats.org/presentationml/2006/main">
   <p:cSld>
@@ -4140,7 +5676,7 @@
           <a:p>
             <a:r>
               <a:rPr lang="en-US" dirty="0" smtClean="0"/>
-              <a:t>Chef Integration</a:t>
+              <a:t>But wait, there’s more…</a:t>
             </a:r>
             <a:endParaRPr lang="en-US" dirty="0"/>
           </a:p>
@@ -4161,14 +5697,47 @@
           <a:bodyPr/>
           <a:lstStyle/>
           <a:p>
-            <a:endParaRPr lang="en-US"/>
+            <a:r>
+              <a:rPr lang="en-US" dirty="0" smtClean="0"/>
+              <a:t>Version Control</a:t>
+            </a:r>
+          </a:p>
+          <a:p>
+            <a:r>
+              <a:rPr lang="en-US" dirty="0" smtClean="0"/>
+              <a:t>Customize Your VM</a:t>
+            </a:r>
+            <a:endParaRPr lang="en-US" dirty="0" smtClean="0"/>
+          </a:p>
+          <a:p>
+            <a:r>
+              <a:rPr lang="en-US" dirty="0" smtClean="0"/>
+              <a:t>Multi-VM Configuration (Static &amp; Dynamic)</a:t>
+            </a:r>
+          </a:p>
+          <a:p>
+            <a:r>
+              <a:rPr lang="en-US" dirty="0" smtClean="0"/>
+              <a:t>VM </a:t>
+            </a:r>
+            <a:r>
+              <a:rPr lang="en-US" dirty="0" err="1" smtClean="0"/>
+              <a:t>Provisioners</a:t>
+            </a:r>
+            <a:endParaRPr lang="en-US" dirty="0" smtClean="0"/>
+          </a:p>
+          <a:p>
+            <a:r>
+              <a:rPr lang="en-US" dirty="0" smtClean="0"/>
+              <a:t>Squid Proxy</a:t>
+            </a:r>
           </a:p>
         </p:txBody>
       </p:sp>
     </p:spTree>
     <p:extLst>
       <p:ext uri="{BB962C8B-B14F-4D97-AF65-F5344CB8AC3E}">
-        <p14:creationId xmlns:p14="http://schemas.microsoft.com/office/powerpoint/2010/main" val="2318046783"/>
+        <p14:creationId xmlns:p14="http://schemas.microsoft.com/office/powerpoint/2010/main" val="1199135339"/>
       </p:ext>
     </p:extLst>
   </p:cSld>
@@ -4496,4 +6065,324 @@
   </a:objectDefaults>
   <a:extraClrSchemeLst/>
 </a:theme>
+</file>
+
+<file path=ppt/theme/theme2.xml><?xml version="1.0" encoding="utf-8"?>
+<a:theme xmlns:a="http://schemas.openxmlformats.org/drawingml/2006/main" name="Office Theme">
+  <a:themeElements>
+    <a:clrScheme name="Office">
+      <a:dk1>
+        <a:sysClr val="windowText" lastClr="000000"/>
+      </a:dk1>
+      <a:lt1>
+        <a:sysClr val="window" lastClr="FFFFFF"/>
+      </a:lt1>
+      <a:dk2>
+        <a:srgbClr val="1F497D"/>
+      </a:dk2>
+      <a:lt2>
+        <a:srgbClr val="EEECE1"/>
+      </a:lt2>
+      <a:accent1>
+        <a:srgbClr val="4F81BD"/>
+      </a:accent1>
+      <a:accent2>
+        <a:srgbClr val="C0504D"/>
+      </a:accent2>
+      <a:accent3>
+        <a:srgbClr val="9BBB59"/>
+      </a:accent3>
+      <a:accent4>
+        <a:srgbClr val="8064A2"/>
+      </a:accent4>
+      <a:accent5>
+        <a:srgbClr val="4BACC6"/>
+      </a:accent5>
+      <a:accent6>
+        <a:srgbClr val="F79646"/>
+      </a:accent6>
+      <a:hlink>
+        <a:srgbClr val="0000FF"/>
+      </a:hlink>
+      <a:folHlink>
+        <a:srgbClr val="800080"/>
+      </a:folHlink>
+    </a:clrScheme>
+    <a:fontScheme name="Office">
+      <a:majorFont>
+        <a:latin typeface="Calibri"/>
+        <a:ea typeface=""/>
+        <a:cs typeface=""/>
+        <a:font script="Jpan" typeface="ＭＳ Ｐゴシック"/>
+        <a:font script="Hang" typeface="맑은 고딕"/>
+        <a:font script="Hans" typeface="宋体"/>
+        <a:font script="Hant" typeface="新細明體"/>
+        <a:font script="Arab" typeface="Times New Roman"/>
+        <a:font script="Hebr" typeface="Times New Roman"/>
+        <a:font script="Thai" typeface="Angsana New"/>
+        <a:font script="Ethi" typeface="Nyala"/>
+        <a:font script="Beng" typeface="Vrinda"/>
+        <a:font script="Gujr" typeface="Shruti"/>
+        <a:font script="Khmr" typeface="MoolBoran"/>
+        <a:font script="Knda" typeface="Tunga"/>
+        <a:font script="Guru" typeface="Raavi"/>
+        <a:font script="Cans" typeface="Euphemia"/>
+        <a:font script="Cher" typeface="Plantagenet Cherokee"/>
+        <a:font script="Yiii" typeface="Microsoft Yi Baiti"/>
+        <a:font script="Tibt" typeface="Microsoft Himalaya"/>
+        <a:font script="Thaa" typeface="MV Boli"/>
+        <a:font script="Deva" typeface="Mangal"/>
+        <a:font script="Telu" typeface="Gautami"/>
+        <a:font script="Taml" typeface="Latha"/>
+        <a:font script="Syrc" typeface="Estrangelo Edessa"/>
+        <a:font script="Orya" typeface="Kalinga"/>
+        <a:font script="Mlym" typeface="Kartika"/>
+        <a:font script="Laoo" typeface="DokChampa"/>
+        <a:font script="Sinh" typeface="Iskoola Pota"/>
+        <a:font script="Mong" typeface="Mongolian Baiti"/>
+        <a:font script="Viet" typeface="Times New Roman"/>
+        <a:font script="Uigh" typeface="Microsoft Uighur"/>
+        <a:font script="Geor" typeface="Sylfaen"/>
+      </a:majorFont>
+      <a:minorFont>
+        <a:latin typeface="Calibri"/>
+        <a:ea typeface=""/>
+        <a:cs typeface=""/>
+        <a:font script="Jpan" typeface="ＭＳ Ｐゴシック"/>
+        <a:font script="Hang" typeface="맑은 고딕"/>
+        <a:font script="Hans" typeface="宋体"/>
+        <a:font script="Hant" typeface="新細明體"/>
+        <a:font script="Arab" typeface="Arial"/>
+        <a:font script="Hebr" typeface="Arial"/>
+        <a:font script="Thai" typeface="Cordia New"/>
+        <a:font script="Ethi" typeface="Nyala"/>
+        <a:font script="Beng" typeface="Vrinda"/>
+        <a:font script="Gujr" typeface="Shruti"/>
+        <a:font script="Khmr" typeface="DaunPenh"/>
+        <a:font script="Knda" typeface="Tunga"/>
+        <a:font script="Guru" typeface="Raavi"/>
+        <a:font script="Cans" typeface="Euphemia"/>
+        <a:font script="Cher" typeface="Plantagenet Cherokee"/>
+        <a:font script="Yiii" typeface="Microsoft Yi Baiti"/>
+        <a:font script="Tibt" typeface="Microsoft Himalaya"/>
+        <a:font script="Thaa" typeface="MV Boli"/>
+        <a:font script="Deva" typeface="Mangal"/>
+        <a:font script="Telu" typeface="Gautami"/>
+        <a:font script="Taml" typeface="Latha"/>
+        <a:font script="Syrc" typeface="Estrangelo Edessa"/>
+        <a:font script="Orya" typeface="Kalinga"/>
+        <a:font script="Mlym" typeface="Kartika"/>
+        <a:font script="Laoo" typeface="DokChampa"/>
+        <a:font script="Sinh" typeface="Iskoola Pota"/>
+        <a:font script="Mong" typeface="Mongolian Baiti"/>
+        <a:font script="Viet" typeface="Arial"/>
+        <a:font script="Uigh" typeface="Microsoft Uighur"/>
+        <a:font script="Geor" typeface="Sylfaen"/>
+      </a:minorFont>
+    </a:fontScheme>
+    <a:fmtScheme name="Office">
+      <a:fillStyleLst>
+        <a:solidFill>
+          <a:schemeClr val="phClr"/>
+        </a:solidFill>
+        <a:gradFill rotWithShape="1">
+          <a:gsLst>
+            <a:gs pos="0">
+              <a:schemeClr val="phClr">
+                <a:tint val="50000"/>
+                <a:satMod val="300000"/>
+              </a:schemeClr>
+            </a:gs>
+            <a:gs pos="35000">
+              <a:schemeClr val="phClr">
+                <a:tint val="37000"/>
+                <a:satMod val="300000"/>
+              </a:schemeClr>
+            </a:gs>
+            <a:gs pos="100000">
+              <a:schemeClr val="phClr">
+                <a:tint val="15000"/>
+                <a:satMod val="350000"/>
+              </a:schemeClr>
+            </a:gs>
+          </a:gsLst>
+          <a:lin ang="16200000" scaled="1"/>
+        </a:gradFill>
+        <a:gradFill rotWithShape="1">
+          <a:gsLst>
+            <a:gs pos="0">
+              <a:schemeClr val="phClr">
+                <a:tint val="100000"/>
+                <a:shade val="100000"/>
+                <a:satMod val="130000"/>
+              </a:schemeClr>
+            </a:gs>
+            <a:gs pos="100000">
+              <a:schemeClr val="phClr">
+                <a:tint val="50000"/>
+                <a:shade val="100000"/>
+                <a:satMod val="350000"/>
+              </a:schemeClr>
+            </a:gs>
+          </a:gsLst>
+          <a:lin ang="16200000" scaled="0"/>
+        </a:gradFill>
+      </a:fillStyleLst>
+      <a:lnStyleLst>
+        <a:ln w="9525" cap="flat" cmpd="sng" algn="ctr">
+          <a:solidFill>
+            <a:schemeClr val="phClr">
+              <a:shade val="95000"/>
+              <a:satMod val="105000"/>
+            </a:schemeClr>
+          </a:solidFill>
+          <a:prstDash val="solid"/>
+        </a:ln>
+        <a:ln w="25400" cap="flat" cmpd="sng" algn="ctr">
+          <a:solidFill>
+            <a:schemeClr val="phClr"/>
+          </a:solidFill>
+          <a:prstDash val="solid"/>
+        </a:ln>
+        <a:ln w="38100" cap="flat" cmpd="sng" algn="ctr">
+          <a:solidFill>
+            <a:schemeClr val="phClr"/>
+          </a:solidFill>
+          <a:prstDash val="solid"/>
+        </a:ln>
+      </a:lnStyleLst>
+      <a:effectStyleLst>
+        <a:effectStyle>
+          <a:effectLst>
+            <a:outerShdw blurRad="40000" dist="20000" dir="5400000" rotWithShape="0">
+              <a:srgbClr val="000000">
+                <a:alpha val="38000"/>
+              </a:srgbClr>
+            </a:outerShdw>
+          </a:effectLst>
+        </a:effectStyle>
+        <a:effectStyle>
+          <a:effectLst>
+            <a:outerShdw blurRad="40000" dist="23000" dir="5400000" rotWithShape="0">
+              <a:srgbClr val="000000">
+                <a:alpha val="35000"/>
+              </a:srgbClr>
+            </a:outerShdw>
+          </a:effectLst>
+        </a:effectStyle>
+        <a:effectStyle>
+          <a:effectLst>
+            <a:outerShdw blurRad="40000" dist="23000" dir="5400000" rotWithShape="0">
+              <a:srgbClr val="000000">
+                <a:alpha val="35000"/>
+              </a:srgbClr>
+            </a:outerShdw>
+          </a:effectLst>
+          <a:scene3d>
+            <a:camera prst="orthographicFront">
+              <a:rot lat="0" lon="0" rev="0"/>
+            </a:camera>
+            <a:lightRig rig="threePt" dir="t">
+              <a:rot lat="0" lon="0" rev="1200000"/>
+            </a:lightRig>
+          </a:scene3d>
+          <a:sp3d>
+            <a:bevelT w="63500" h="25400"/>
+          </a:sp3d>
+        </a:effectStyle>
+      </a:effectStyleLst>
+      <a:bgFillStyleLst>
+        <a:solidFill>
+          <a:schemeClr val="phClr"/>
+        </a:solidFill>
+        <a:gradFill rotWithShape="1">
+          <a:gsLst>
+            <a:gs pos="0">
+              <a:schemeClr val="phClr">
+                <a:tint val="40000"/>
+                <a:satMod val="350000"/>
+              </a:schemeClr>
+            </a:gs>
+            <a:gs pos="40000">
+              <a:schemeClr val="phClr">
+                <a:tint val="45000"/>
+                <a:shade val="99000"/>
+                <a:satMod val="350000"/>
+              </a:schemeClr>
+            </a:gs>
+            <a:gs pos="100000">
+              <a:schemeClr val="phClr">
+                <a:shade val="20000"/>
+                <a:satMod val="255000"/>
+              </a:schemeClr>
+            </a:gs>
+          </a:gsLst>
+          <a:path path="circle">
+            <a:fillToRect l="50000" t="-80000" r="50000" b="180000"/>
+          </a:path>
+        </a:gradFill>
+        <a:gradFill rotWithShape="1">
+          <a:gsLst>
+            <a:gs pos="0">
+              <a:schemeClr val="phClr">
+                <a:tint val="80000"/>
+                <a:satMod val="300000"/>
+              </a:schemeClr>
+            </a:gs>
+            <a:gs pos="100000">
+              <a:schemeClr val="phClr">
+                <a:shade val="30000"/>
+                <a:satMod val="200000"/>
+              </a:schemeClr>
+            </a:gs>
+          </a:gsLst>
+          <a:path path="circle">
+            <a:fillToRect l="50000" t="50000" r="50000" b="50000"/>
+          </a:path>
+        </a:gradFill>
+      </a:bgFillStyleLst>
+    </a:fmtScheme>
+  </a:themeElements>
+  <a:objectDefaults>
+    <a:spDef>
+      <a:spPr/>
+      <a:bodyPr/>
+      <a:lstStyle/>
+      <a:style>
+        <a:lnRef idx="1">
+          <a:schemeClr val="accent1"/>
+        </a:lnRef>
+        <a:fillRef idx="3">
+          <a:schemeClr val="accent1"/>
+        </a:fillRef>
+        <a:effectRef idx="2">
+          <a:schemeClr val="accent1"/>
+        </a:effectRef>
+        <a:fontRef idx="minor">
+          <a:schemeClr val="lt1"/>
+        </a:fontRef>
+      </a:style>
+    </a:spDef>
+    <a:lnDef>
+      <a:spPr/>
+      <a:bodyPr/>
+      <a:lstStyle/>
+      <a:style>
+        <a:lnRef idx="2">
+          <a:schemeClr val="accent1"/>
+        </a:lnRef>
+        <a:fillRef idx="0">
+          <a:schemeClr val="accent1"/>
+        </a:fillRef>
+        <a:effectRef idx="1">
+          <a:schemeClr val="accent1"/>
+        </a:effectRef>
+        <a:fontRef idx="minor">
+          <a:schemeClr val="tx1"/>
+        </a:fontRef>
+      </a:style>
+    </a:lnDef>
+  </a:objectDefaults>
+  <a:extraClrSchemeLst/>
+</a:theme>
 </file>
</xml_diff>

<commit_message>
Clean up to match latest Vagrant syntax.  Plus, presentation now en PDF for non-Microsoft folks
</commit_message>
<xml_diff>
--- a/Vagrant.pptx
+++ b/Vagrant.pptx
@@ -5,7 +5,7 @@
     <p:sldMasterId id="2147483741" r:id="rId1"/>
   </p:sldMasterIdLst>
   <p:notesMasterIdLst>
-    <p:notesMasterId r:id="rId17"/>
+    <p:notesMasterId r:id="rId18"/>
   </p:notesMasterIdLst>
   <p:sldIdLst>
     <p:sldId id="265" r:id="rId2"/>
@@ -19,10 +19,11 @@
     <p:sldId id="263" r:id="rId10"/>
     <p:sldId id="269" r:id="rId11"/>
     <p:sldId id="270" r:id="rId12"/>
-    <p:sldId id="273" r:id="rId13"/>
-    <p:sldId id="271" r:id="rId14"/>
-    <p:sldId id="272" r:id="rId15"/>
-    <p:sldId id="267" r:id="rId16"/>
+    <p:sldId id="274" r:id="rId13"/>
+    <p:sldId id="273" r:id="rId14"/>
+    <p:sldId id="271" r:id="rId15"/>
+    <p:sldId id="272" r:id="rId16"/>
+    <p:sldId id="267" r:id="rId17"/>
   </p:sldIdLst>
   <p:sldSz cx="9144000" cy="5143500" type="screen16x9"/>
   <p:notesSz cx="6858000" cy="9144000"/>
@@ -206,7 +207,7 @@
           <a:p>
             <a:fld id="{B00F5C8E-F62F-C949-B810-B238A690792F}" type="datetimeFigureOut">
               <a:rPr lang="en-US" smtClean="0"/>
-              <a:t>7/9/13</a:t>
+              <a:t>5/6/14</a:t>
             </a:fld>
             <a:endParaRPr lang="en-US"/>
           </a:p>
@@ -501,12 +502,7 @@
             <p:ph type="sldImg"/>
           </p:nvPr>
         </p:nvSpPr>
-        <p:spPr>
-          <a:xfrm>
-            <a:off x="381000" y="685800"/>
-            <a:ext cx="6096000" cy="3429000"/>
-          </a:xfrm>
-        </p:spPr>
+        <p:spPr/>
       </p:sp>
       <p:sp>
         <p:nvSpPr>
@@ -523,7 +519,7 @@
           <a:bodyPr/>
           <a:lstStyle/>
           <a:p>
-            <a:endParaRPr lang="en-US" dirty="0"/>
+            <a:endParaRPr lang="en-US"/>
           </a:p>
         </p:txBody>
       </p:sp>
@@ -544,7 +540,7 @@
           <a:p>
             <a:fld id="{8D55EAEB-36BD-FF4D-B4A1-0D75FFEDD0E3}" type="slidenum">
               <a:rPr lang="en-US" smtClean="0"/>
-              <a:t>5</a:t>
+              <a:t>1</a:t>
             </a:fld>
             <a:endParaRPr lang="en-US"/>
           </a:p>
@@ -553,7 +549,767 @@
     </p:spTree>
     <p:extLst>
       <p:ext uri="{BB962C8B-B14F-4D97-AF65-F5344CB8AC3E}">
-        <p14:creationId xmlns:p14="http://schemas.microsoft.com/office/powerpoint/2010/main" val="3084299111"/>
+        <p14:creationId xmlns:p14="http://schemas.microsoft.com/office/powerpoint/2010/main" val="732841281"/>
+      </p:ext>
+    </p:extLst>
+  </p:cSld>
+  <p:clrMapOvr>
+    <a:masterClrMapping/>
+  </p:clrMapOvr>
+</p:notes>
+</file>
+
+<file path=ppt/notesSlides/notesSlide10.xml><?xml version="1.0" encoding="utf-8"?>
+<p:notes xmlns:a="http://schemas.openxmlformats.org/drawingml/2006/main" xmlns:r="http://schemas.openxmlformats.org/officeDocument/2006/relationships" xmlns:p="http://schemas.openxmlformats.org/presentationml/2006/main">
+  <p:cSld>
+    <p:spTree>
+      <p:nvGrpSpPr>
+        <p:cNvPr id="1" name=""/>
+        <p:cNvGrpSpPr/>
+        <p:nvPr/>
+      </p:nvGrpSpPr>
+      <p:grpSpPr>
+        <a:xfrm>
+          <a:off x="0" y="0"/>
+          <a:ext cx="0" cy="0"/>
+          <a:chOff x="0" y="0"/>
+          <a:chExt cx="0" cy="0"/>
+        </a:xfrm>
+      </p:grpSpPr>
+      <p:sp>
+        <p:nvSpPr>
+          <p:cNvPr id="2" name="Slide Image Placeholder 1"/>
+          <p:cNvSpPr>
+            <a:spLocks noGrp="1" noRot="1" noChangeAspect="1"/>
+          </p:cNvSpPr>
+          <p:nvPr>
+            <p:ph type="sldImg"/>
+          </p:nvPr>
+        </p:nvSpPr>
+        <p:spPr/>
+      </p:sp>
+      <p:sp>
+        <p:nvSpPr>
+          <p:cNvPr id="3" name="Notes Placeholder 2"/>
+          <p:cNvSpPr>
+            <a:spLocks noGrp="1"/>
+          </p:cNvSpPr>
+          <p:nvPr>
+            <p:ph type="body" idx="1"/>
+          </p:nvPr>
+        </p:nvSpPr>
+        <p:spPr/>
+        <p:txBody>
+          <a:bodyPr/>
+          <a:lstStyle/>
+          <a:p>
+            <a:endParaRPr lang="en-US"/>
+          </a:p>
+        </p:txBody>
+      </p:sp>
+      <p:sp>
+        <p:nvSpPr>
+          <p:cNvPr id="4" name="Slide Number Placeholder 3"/>
+          <p:cNvSpPr>
+            <a:spLocks noGrp="1"/>
+          </p:cNvSpPr>
+          <p:nvPr>
+            <p:ph type="sldNum" sz="quarter" idx="10"/>
+          </p:nvPr>
+        </p:nvSpPr>
+        <p:spPr/>
+        <p:txBody>
+          <a:bodyPr/>
+          <a:lstStyle/>
+          <a:p>
+            <a:fld id="{8D55EAEB-36BD-FF4D-B4A1-0D75FFEDD0E3}" type="slidenum">
+              <a:rPr lang="en-US" smtClean="0"/>
+              <a:t>10</a:t>
+            </a:fld>
+            <a:endParaRPr lang="en-US"/>
+          </a:p>
+        </p:txBody>
+      </p:sp>
+    </p:spTree>
+    <p:extLst>
+      <p:ext uri="{BB962C8B-B14F-4D97-AF65-F5344CB8AC3E}">
+        <p14:creationId xmlns:p14="http://schemas.microsoft.com/office/powerpoint/2010/main" val="3373531089"/>
+      </p:ext>
+    </p:extLst>
+  </p:cSld>
+  <p:clrMapOvr>
+    <a:masterClrMapping/>
+  </p:clrMapOvr>
+</p:notes>
+</file>
+
+<file path=ppt/notesSlides/notesSlide11.xml><?xml version="1.0" encoding="utf-8"?>
+<p:notes xmlns:a="http://schemas.openxmlformats.org/drawingml/2006/main" xmlns:r="http://schemas.openxmlformats.org/officeDocument/2006/relationships" xmlns:p="http://schemas.openxmlformats.org/presentationml/2006/main">
+  <p:cSld>
+    <p:spTree>
+      <p:nvGrpSpPr>
+        <p:cNvPr id="1" name=""/>
+        <p:cNvGrpSpPr/>
+        <p:nvPr/>
+      </p:nvGrpSpPr>
+      <p:grpSpPr>
+        <a:xfrm>
+          <a:off x="0" y="0"/>
+          <a:ext cx="0" cy="0"/>
+          <a:chOff x="0" y="0"/>
+          <a:chExt cx="0" cy="0"/>
+        </a:xfrm>
+      </p:grpSpPr>
+      <p:sp>
+        <p:nvSpPr>
+          <p:cNvPr id="2" name="Slide Image Placeholder 1"/>
+          <p:cNvSpPr>
+            <a:spLocks noGrp="1" noRot="1" noChangeAspect="1"/>
+          </p:cNvSpPr>
+          <p:nvPr>
+            <p:ph type="sldImg"/>
+          </p:nvPr>
+        </p:nvSpPr>
+        <p:spPr/>
+      </p:sp>
+      <p:sp>
+        <p:nvSpPr>
+          <p:cNvPr id="3" name="Notes Placeholder 2"/>
+          <p:cNvSpPr>
+            <a:spLocks noGrp="1"/>
+          </p:cNvSpPr>
+          <p:nvPr>
+            <p:ph type="body" idx="1"/>
+          </p:nvPr>
+        </p:nvSpPr>
+        <p:spPr/>
+        <p:txBody>
+          <a:bodyPr/>
+          <a:lstStyle/>
+          <a:p>
+            <a:r>
+              <a:rPr lang="en-US" dirty="0" smtClean="0"/>
+              <a:t>For :</a:t>
+            </a:r>
+            <a:r>
+              <a:rPr lang="en-US" dirty="0" err="1" smtClean="0"/>
+              <a:t>public_network</a:t>
+            </a:r>
+            <a:r>
+              <a:rPr lang="en-US" baseline="0" dirty="0" smtClean="0"/>
+              <a:t>, see http://</a:t>
+            </a:r>
+            <a:r>
+              <a:rPr lang="en-US" baseline="0" dirty="0" err="1" smtClean="0"/>
+              <a:t>vmtrooper.com</a:t>
+            </a:r>
+            <a:r>
+              <a:rPr lang="en-US" baseline="0" dirty="0" smtClean="0"/>
+              <a:t>/vagrant-static-external-ip-addresses-with-the-vmware-fusion-provider/</a:t>
+            </a:r>
+          </a:p>
+          <a:p>
+            <a:endParaRPr lang="en-US" dirty="0"/>
+          </a:p>
+        </p:txBody>
+      </p:sp>
+      <p:sp>
+        <p:nvSpPr>
+          <p:cNvPr id="4" name="Slide Number Placeholder 3"/>
+          <p:cNvSpPr>
+            <a:spLocks noGrp="1"/>
+          </p:cNvSpPr>
+          <p:nvPr>
+            <p:ph type="sldNum" sz="quarter" idx="10"/>
+          </p:nvPr>
+        </p:nvSpPr>
+        <p:spPr/>
+        <p:txBody>
+          <a:bodyPr/>
+          <a:lstStyle/>
+          <a:p>
+            <a:fld id="{8D55EAEB-36BD-FF4D-B4A1-0D75FFEDD0E3}" type="slidenum">
+              <a:rPr lang="en-US" smtClean="0"/>
+              <a:t>11</a:t>
+            </a:fld>
+            <a:endParaRPr lang="en-US"/>
+          </a:p>
+        </p:txBody>
+      </p:sp>
+    </p:spTree>
+    <p:extLst>
+      <p:ext uri="{BB962C8B-B14F-4D97-AF65-F5344CB8AC3E}">
+        <p14:creationId xmlns:p14="http://schemas.microsoft.com/office/powerpoint/2010/main" val="1612631474"/>
+      </p:ext>
+    </p:extLst>
+  </p:cSld>
+  <p:clrMapOvr>
+    <a:masterClrMapping/>
+  </p:clrMapOvr>
+</p:notes>
+</file>
+
+<file path=ppt/notesSlides/notesSlide12.xml><?xml version="1.0" encoding="utf-8"?>
+<p:notes xmlns:a="http://schemas.openxmlformats.org/drawingml/2006/main" xmlns:r="http://schemas.openxmlformats.org/officeDocument/2006/relationships" xmlns:p="http://schemas.openxmlformats.org/presentationml/2006/main">
+  <p:cSld>
+    <p:spTree>
+      <p:nvGrpSpPr>
+        <p:cNvPr id="1" name=""/>
+        <p:cNvGrpSpPr/>
+        <p:nvPr/>
+      </p:nvGrpSpPr>
+      <p:grpSpPr>
+        <a:xfrm>
+          <a:off x="0" y="0"/>
+          <a:ext cx="0" cy="0"/>
+          <a:chOff x="0" y="0"/>
+          <a:chExt cx="0" cy="0"/>
+        </a:xfrm>
+      </p:grpSpPr>
+      <p:sp>
+        <p:nvSpPr>
+          <p:cNvPr id="2" name="Slide Image Placeholder 1"/>
+          <p:cNvSpPr>
+            <a:spLocks noGrp="1" noRot="1" noChangeAspect="1"/>
+          </p:cNvSpPr>
+          <p:nvPr>
+            <p:ph type="sldImg"/>
+          </p:nvPr>
+        </p:nvSpPr>
+        <p:spPr/>
+      </p:sp>
+      <p:sp>
+        <p:nvSpPr>
+          <p:cNvPr id="3" name="Notes Placeholder 2"/>
+          <p:cNvSpPr>
+            <a:spLocks noGrp="1"/>
+          </p:cNvSpPr>
+          <p:nvPr>
+            <p:ph type="body" idx="1"/>
+          </p:nvPr>
+        </p:nvSpPr>
+        <p:spPr/>
+        <p:txBody>
+          <a:bodyPr/>
+          <a:lstStyle/>
+          <a:p>
+            <a:r>
+              <a:rPr lang="en-US" dirty="0" smtClean="0"/>
+              <a:t>For :</a:t>
+            </a:r>
+            <a:r>
+              <a:rPr lang="en-US" dirty="0" err="1" smtClean="0"/>
+              <a:t>public_network</a:t>
+            </a:r>
+            <a:r>
+              <a:rPr lang="en-US" baseline="0" dirty="0" smtClean="0"/>
+              <a:t>, see http://</a:t>
+            </a:r>
+            <a:r>
+              <a:rPr lang="en-US" baseline="0" dirty="0" err="1" smtClean="0"/>
+              <a:t>vmtrooper.com</a:t>
+            </a:r>
+            <a:r>
+              <a:rPr lang="en-US" baseline="0" dirty="0" smtClean="0"/>
+              <a:t>/vagrant-static-external-ip-addresses-with-the-vmware-fusion-provider/</a:t>
+            </a:r>
+          </a:p>
+          <a:p>
+            <a:endParaRPr lang="en-US" dirty="0"/>
+          </a:p>
+        </p:txBody>
+      </p:sp>
+      <p:sp>
+        <p:nvSpPr>
+          <p:cNvPr id="4" name="Slide Number Placeholder 3"/>
+          <p:cNvSpPr>
+            <a:spLocks noGrp="1"/>
+          </p:cNvSpPr>
+          <p:nvPr>
+            <p:ph type="sldNum" sz="quarter" idx="10"/>
+          </p:nvPr>
+        </p:nvSpPr>
+        <p:spPr/>
+        <p:txBody>
+          <a:bodyPr/>
+          <a:lstStyle/>
+          <a:p>
+            <a:fld id="{8D55EAEB-36BD-FF4D-B4A1-0D75FFEDD0E3}" type="slidenum">
+              <a:rPr lang="en-US" smtClean="0"/>
+              <a:t>12</a:t>
+            </a:fld>
+            <a:endParaRPr lang="en-US"/>
+          </a:p>
+        </p:txBody>
+      </p:sp>
+    </p:spTree>
+    <p:extLst>
+      <p:ext uri="{BB962C8B-B14F-4D97-AF65-F5344CB8AC3E}">
+        <p14:creationId xmlns:p14="http://schemas.microsoft.com/office/powerpoint/2010/main" val="1612631474"/>
+      </p:ext>
+    </p:extLst>
+  </p:cSld>
+  <p:clrMapOvr>
+    <a:masterClrMapping/>
+  </p:clrMapOvr>
+</p:notes>
+</file>
+
+<file path=ppt/notesSlides/notesSlide13.xml><?xml version="1.0" encoding="utf-8"?>
+<p:notes xmlns:a="http://schemas.openxmlformats.org/drawingml/2006/main" xmlns:r="http://schemas.openxmlformats.org/officeDocument/2006/relationships" xmlns:p="http://schemas.openxmlformats.org/presentationml/2006/main">
+  <p:cSld>
+    <p:spTree>
+      <p:nvGrpSpPr>
+        <p:cNvPr id="1" name=""/>
+        <p:cNvGrpSpPr/>
+        <p:nvPr/>
+      </p:nvGrpSpPr>
+      <p:grpSpPr>
+        <a:xfrm>
+          <a:off x="0" y="0"/>
+          <a:ext cx="0" cy="0"/>
+          <a:chOff x="0" y="0"/>
+          <a:chExt cx="0" cy="0"/>
+        </a:xfrm>
+      </p:grpSpPr>
+      <p:sp>
+        <p:nvSpPr>
+          <p:cNvPr id="2" name="Slide Image Placeholder 1"/>
+          <p:cNvSpPr>
+            <a:spLocks noGrp="1" noRot="1" noChangeAspect="1"/>
+          </p:cNvSpPr>
+          <p:nvPr>
+            <p:ph type="sldImg"/>
+          </p:nvPr>
+        </p:nvSpPr>
+        <p:spPr/>
+      </p:sp>
+      <p:sp>
+        <p:nvSpPr>
+          <p:cNvPr id="3" name="Notes Placeholder 2"/>
+          <p:cNvSpPr>
+            <a:spLocks noGrp="1"/>
+          </p:cNvSpPr>
+          <p:nvPr>
+            <p:ph type="body" idx="1"/>
+          </p:nvPr>
+        </p:nvSpPr>
+        <p:spPr/>
+        <p:txBody>
+          <a:bodyPr/>
+          <a:lstStyle/>
+          <a:p>
+            <a:endParaRPr lang="en-US"/>
+          </a:p>
+        </p:txBody>
+      </p:sp>
+      <p:sp>
+        <p:nvSpPr>
+          <p:cNvPr id="4" name="Slide Number Placeholder 3"/>
+          <p:cNvSpPr>
+            <a:spLocks noGrp="1"/>
+          </p:cNvSpPr>
+          <p:nvPr>
+            <p:ph type="sldNum" sz="quarter" idx="10"/>
+          </p:nvPr>
+        </p:nvSpPr>
+        <p:spPr/>
+        <p:txBody>
+          <a:bodyPr/>
+          <a:lstStyle/>
+          <a:p>
+            <a:fld id="{8D55EAEB-36BD-FF4D-B4A1-0D75FFEDD0E3}" type="slidenum">
+              <a:rPr lang="en-US" smtClean="0"/>
+              <a:t>13</a:t>
+            </a:fld>
+            <a:endParaRPr lang="en-US"/>
+          </a:p>
+        </p:txBody>
+      </p:sp>
+    </p:spTree>
+    <p:extLst>
+      <p:ext uri="{BB962C8B-B14F-4D97-AF65-F5344CB8AC3E}">
+        <p14:creationId xmlns:p14="http://schemas.microsoft.com/office/powerpoint/2010/main" val="2868313165"/>
+      </p:ext>
+    </p:extLst>
+  </p:cSld>
+  <p:clrMapOvr>
+    <a:masterClrMapping/>
+  </p:clrMapOvr>
+</p:notes>
+</file>
+
+<file path=ppt/notesSlides/notesSlide14.xml><?xml version="1.0" encoding="utf-8"?>
+<p:notes xmlns:a="http://schemas.openxmlformats.org/drawingml/2006/main" xmlns:r="http://schemas.openxmlformats.org/officeDocument/2006/relationships" xmlns:p="http://schemas.openxmlformats.org/presentationml/2006/main">
+  <p:cSld>
+    <p:spTree>
+      <p:nvGrpSpPr>
+        <p:cNvPr id="1" name=""/>
+        <p:cNvGrpSpPr/>
+        <p:nvPr/>
+      </p:nvGrpSpPr>
+      <p:grpSpPr>
+        <a:xfrm>
+          <a:off x="0" y="0"/>
+          <a:ext cx="0" cy="0"/>
+          <a:chOff x="0" y="0"/>
+          <a:chExt cx="0" cy="0"/>
+        </a:xfrm>
+      </p:grpSpPr>
+      <p:sp>
+        <p:nvSpPr>
+          <p:cNvPr id="2" name="Slide Image Placeholder 1"/>
+          <p:cNvSpPr>
+            <a:spLocks noGrp="1" noRot="1" noChangeAspect="1"/>
+          </p:cNvSpPr>
+          <p:nvPr>
+            <p:ph type="sldImg"/>
+          </p:nvPr>
+        </p:nvSpPr>
+        <p:spPr/>
+      </p:sp>
+      <p:sp>
+        <p:nvSpPr>
+          <p:cNvPr id="3" name="Notes Placeholder 2"/>
+          <p:cNvSpPr>
+            <a:spLocks noGrp="1"/>
+          </p:cNvSpPr>
+          <p:nvPr>
+            <p:ph type="body" idx="1"/>
+          </p:nvPr>
+        </p:nvSpPr>
+        <p:spPr/>
+        <p:txBody>
+          <a:bodyPr/>
+          <a:lstStyle/>
+          <a:p>
+            <a:r>
+              <a:rPr lang="en-US" b="1" dirty="0" smtClean="0"/>
+              <a:t>NOTE:</a:t>
+            </a:r>
+          </a:p>
+          <a:p>
+            <a:r>
+              <a:rPr lang="en-US" b="1" dirty="0" smtClean="0"/>
+              <a:t>vagrant ssh</a:t>
+            </a:r>
+            <a:r>
+              <a:rPr lang="en-US" dirty="0" smtClean="0"/>
+              <a:t> without a VM name will not work since Vagrant is aware</a:t>
+            </a:r>
+            <a:r>
+              <a:rPr lang="en-US" baseline="0" dirty="0" smtClean="0"/>
+              <a:t> you created multiple VMs.</a:t>
+            </a:r>
+          </a:p>
+          <a:p>
+            <a:endParaRPr lang="en-US" baseline="0" dirty="0" smtClean="0"/>
+          </a:p>
+          <a:p>
+            <a:r>
+              <a:rPr lang="en-US" baseline="0" dirty="0" smtClean="0"/>
+              <a:t>Use the vagrant status command to get your </a:t>
+            </a:r>
+            <a:r>
+              <a:rPr lang="en-US" baseline="0" dirty="0" err="1" smtClean="0"/>
+              <a:t>vm</a:t>
+            </a:r>
+            <a:r>
+              <a:rPr lang="en-US" baseline="0" dirty="0" smtClean="0"/>
+              <a:t> names:</a:t>
+            </a:r>
+          </a:p>
+          <a:p>
+            <a:r>
+              <a:rPr lang="en-US" dirty="0" smtClean="0"/>
+              <a:t>bash-3.2$ vagrant status</a:t>
+            </a:r>
+          </a:p>
+          <a:p>
+            <a:r>
+              <a:rPr lang="en-US" dirty="0" smtClean="0"/>
+              <a:t>Current machine states:</a:t>
+            </a:r>
+          </a:p>
+          <a:p>
+            <a:endParaRPr lang="en-US" dirty="0" smtClean="0"/>
+          </a:p>
+          <a:p>
+            <a:r>
+              <a:rPr lang="en-US" dirty="0" smtClean="0"/>
+              <a:t>controller                running (</a:t>
+            </a:r>
+            <a:r>
+              <a:rPr lang="en-US" dirty="0" err="1" smtClean="0"/>
+              <a:t>virtualbox</a:t>
+            </a:r>
+            <a:r>
+              <a:rPr lang="en-US" dirty="0" smtClean="0"/>
+              <a:t>)</a:t>
+            </a:r>
+          </a:p>
+          <a:p>
+            <a:r>
+              <a:rPr lang="en-US" dirty="0" smtClean="0"/>
+              <a:t>compute                   running (</a:t>
+            </a:r>
+            <a:r>
+              <a:rPr lang="en-US" dirty="0" err="1" smtClean="0"/>
+              <a:t>virtualbox</a:t>
+            </a:r>
+            <a:r>
+              <a:rPr lang="en-US" dirty="0" smtClean="0"/>
+              <a:t>)</a:t>
+            </a:r>
+          </a:p>
+          <a:p>
+            <a:endParaRPr lang="en-US" dirty="0" smtClean="0"/>
+          </a:p>
+          <a:p>
+            <a:r>
+              <a:rPr lang="en-US" dirty="0" smtClean="0"/>
+              <a:t>This environment represents multiple VMs. The VMs are all listed</a:t>
+            </a:r>
+          </a:p>
+          <a:p>
+            <a:r>
+              <a:rPr lang="en-US" dirty="0" smtClean="0"/>
+              <a:t>above with their current state. For more information about a specific</a:t>
+            </a:r>
+          </a:p>
+          <a:p>
+            <a:r>
+              <a:rPr lang="en-US" dirty="0" smtClean="0"/>
+              <a:t>VM, run `vagrant status NAME`.</a:t>
+            </a:r>
+          </a:p>
+          <a:p>
+            <a:endParaRPr lang="en-US" dirty="0" smtClean="0"/>
+          </a:p>
+          <a:p>
+            <a:r>
+              <a:rPr lang="en-US" dirty="0" smtClean="0"/>
+              <a:t>THEN, use the command </a:t>
+            </a:r>
+            <a:r>
+              <a:rPr lang="en-US" b="1" dirty="0" smtClean="0"/>
+              <a:t>vagrant ssh &lt;</a:t>
+            </a:r>
+            <a:r>
+              <a:rPr lang="en-US" b="1" dirty="0" err="1" smtClean="0"/>
+              <a:t>vmname</a:t>
+            </a:r>
+            <a:r>
+              <a:rPr lang="en-US" b="1" dirty="0" smtClean="0"/>
+              <a:t>&gt; </a:t>
+            </a:r>
+            <a:r>
+              <a:rPr lang="en-US" dirty="0" smtClean="0"/>
+              <a:t>ex: </a:t>
+            </a:r>
+            <a:r>
+              <a:rPr lang="en-US" b="1" dirty="0" smtClean="0"/>
+              <a:t>vagrant ssh compute</a:t>
+            </a:r>
+            <a:endParaRPr lang="en-US" b="1" dirty="0"/>
+          </a:p>
+        </p:txBody>
+      </p:sp>
+      <p:sp>
+        <p:nvSpPr>
+          <p:cNvPr id="4" name="Slide Number Placeholder 3"/>
+          <p:cNvSpPr>
+            <a:spLocks noGrp="1"/>
+          </p:cNvSpPr>
+          <p:nvPr>
+            <p:ph type="sldNum" sz="quarter" idx="10"/>
+          </p:nvPr>
+        </p:nvSpPr>
+        <p:spPr/>
+        <p:txBody>
+          <a:bodyPr/>
+          <a:lstStyle/>
+          <a:p>
+            <a:fld id="{8D55EAEB-36BD-FF4D-B4A1-0D75FFEDD0E3}" type="slidenum">
+              <a:rPr lang="en-US" smtClean="0"/>
+              <a:t>14</a:t>
+            </a:fld>
+            <a:endParaRPr lang="en-US"/>
+          </a:p>
+        </p:txBody>
+      </p:sp>
+    </p:spTree>
+    <p:extLst>
+      <p:ext uri="{BB962C8B-B14F-4D97-AF65-F5344CB8AC3E}">
+        <p14:creationId xmlns:p14="http://schemas.microsoft.com/office/powerpoint/2010/main" val="2926676067"/>
+      </p:ext>
+    </p:extLst>
+  </p:cSld>
+  <p:clrMapOvr>
+    <a:masterClrMapping/>
+  </p:clrMapOvr>
+</p:notes>
+</file>
+
+<file path=ppt/notesSlides/notesSlide15.xml><?xml version="1.0" encoding="utf-8"?>
+<p:notes xmlns:a="http://schemas.openxmlformats.org/drawingml/2006/main" xmlns:r="http://schemas.openxmlformats.org/officeDocument/2006/relationships" xmlns:p="http://schemas.openxmlformats.org/presentationml/2006/main">
+  <p:cSld>
+    <p:spTree>
+      <p:nvGrpSpPr>
+        <p:cNvPr id="1" name=""/>
+        <p:cNvGrpSpPr/>
+        <p:nvPr/>
+      </p:nvGrpSpPr>
+      <p:grpSpPr>
+        <a:xfrm>
+          <a:off x="0" y="0"/>
+          <a:ext cx="0" cy="0"/>
+          <a:chOff x="0" y="0"/>
+          <a:chExt cx="0" cy="0"/>
+        </a:xfrm>
+      </p:grpSpPr>
+      <p:sp>
+        <p:nvSpPr>
+          <p:cNvPr id="2" name="Slide Image Placeholder 1"/>
+          <p:cNvSpPr>
+            <a:spLocks noGrp="1" noRot="1" noChangeAspect="1"/>
+          </p:cNvSpPr>
+          <p:nvPr>
+            <p:ph type="sldImg"/>
+          </p:nvPr>
+        </p:nvSpPr>
+        <p:spPr/>
+      </p:sp>
+      <p:sp>
+        <p:nvSpPr>
+          <p:cNvPr id="3" name="Notes Placeholder 2"/>
+          <p:cNvSpPr>
+            <a:spLocks noGrp="1"/>
+          </p:cNvSpPr>
+          <p:nvPr>
+            <p:ph type="body" idx="1"/>
+          </p:nvPr>
+        </p:nvSpPr>
+        <p:spPr/>
+        <p:txBody>
+          <a:bodyPr/>
+          <a:lstStyle/>
+          <a:p>
+            <a:endParaRPr lang="en-US"/>
+          </a:p>
+        </p:txBody>
+      </p:sp>
+      <p:sp>
+        <p:nvSpPr>
+          <p:cNvPr id="4" name="Slide Number Placeholder 3"/>
+          <p:cNvSpPr>
+            <a:spLocks noGrp="1"/>
+          </p:cNvSpPr>
+          <p:nvPr>
+            <p:ph type="sldNum" sz="quarter" idx="10"/>
+          </p:nvPr>
+        </p:nvSpPr>
+        <p:spPr/>
+        <p:txBody>
+          <a:bodyPr/>
+          <a:lstStyle/>
+          <a:p>
+            <a:fld id="{8D55EAEB-36BD-FF4D-B4A1-0D75FFEDD0E3}" type="slidenum">
+              <a:rPr lang="en-US" smtClean="0"/>
+              <a:t>15</a:t>
+            </a:fld>
+            <a:endParaRPr lang="en-US"/>
+          </a:p>
+        </p:txBody>
+      </p:sp>
+    </p:spTree>
+    <p:extLst>
+      <p:ext uri="{BB962C8B-B14F-4D97-AF65-F5344CB8AC3E}">
+        <p14:creationId xmlns:p14="http://schemas.microsoft.com/office/powerpoint/2010/main" val="3451566379"/>
+      </p:ext>
+    </p:extLst>
+  </p:cSld>
+  <p:clrMapOvr>
+    <a:masterClrMapping/>
+  </p:clrMapOvr>
+</p:notes>
+</file>
+
+<file path=ppt/notesSlides/notesSlide16.xml><?xml version="1.0" encoding="utf-8"?>
+<p:notes xmlns:a="http://schemas.openxmlformats.org/drawingml/2006/main" xmlns:r="http://schemas.openxmlformats.org/officeDocument/2006/relationships" xmlns:p="http://schemas.openxmlformats.org/presentationml/2006/main">
+  <p:cSld>
+    <p:spTree>
+      <p:nvGrpSpPr>
+        <p:cNvPr id="1" name=""/>
+        <p:cNvGrpSpPr/>
+        <p:nvPr/>
+      </p:nvGrpSpPr>
+      <p:grpSpPr>
+        <a:xfrm>
+          <a:off x="0" y="0"/>
+          <a:ext cx="0" cy="0"/>
+          <a:chOff x="0" y="0"/>
+          <a:chExt cx="0" cy="0"/>
+        </a:xfrm>
+      </p:grpSpPr>
+      <p:sp>
+        <p:nvSpPr>
+          <p:cNvPr id="2" name="Slide Image Placeholder 1"/>
+          <p:cNvSpPr>
+            <a:spLocks noGrp="1" noRot="1" noChangeAspect="1"/>
+          </p:cNvSpPr>
+          <p:nvPr>
+            <p:ph type="sldImg"/>
+          </p:nvPr>
+        </p:nvSpPr>
+        <p:spPr/>
+      </p:sp>
+      <p:sp>
+        <p:nvSpPr>
+          <p:cNvPr id="3" name="Notes Placeholder 2"/>
+          <p:cNvSpPr>
+            <a:spLocks noGrp="1"/>
+          </p:cNvSpPr>
+          <p:nvPr>
+            <p:ph type="body" idx="1"/>
+          </p:nvPr>
+        </p:nvSpPr>
+        <p:spPr/>
+        <p:txBody>
+          <a:bodyPr/>
+          <a:lstStyle/>
+          <a:p>
+            <a:endParaRPr lang="en-US"/>
+          </a:p>
+        </p:txBody>
+      </p:sp>
+      <p:sp>
+        <p:nvSpPr>
+          <p:cNvPr id="4" name="Slide Number Placeholder 3"/>
+          <p:cNvSpPr>
+            <a:spLocks noGrp="1"/>
+          </p:cNvSpPr>
+          <p:nvPr>
+            <p:ph type="sldNum" sz="quarter" idx="10"/>
+          </p:nvPr>
+        </p:nvSpPr>
+        <p:spPr/>
+        <p:txBody>
+          <a:bodyPr/>
+          <a:lstStyle/>
+          <a:p>
+            <a:fld id="{8D55EAEB-36BD-FF4D-B4A1-0D75FFEDD0E3}" type="slidenum">
+              <a:rPr lang="en-US" smtClean="0"/>
+              <a:t>16</a:t>
+            </a:fld>
+            <a:endParaRPr lang="en-US"/>
+          </a:p>
+        </p:txBody>
+      </p:sp>
+    </p:spTree>
+    <p:extLst>
+      <p:ext uri="{BB962C8B-B14F-4D97-AF65-F5344CB8AC3E}">
+        <p14:creationId xmlns:p14="http://schemas.microsoft.com/office/powerpoint/2010/main" val="226410779"/>
       </p:ext>
     </p:extLst>
   </p:cSld>
@@ -590,12 +1346,7 @@
             <p:ph type="sldImg"/>
           </p:nvPr>
         </p:nvSpPr>
-        <p:spPr>
-          <a:xfrm>
-            <a:off x="381000" y="685800"/>
-            <a:ext cx="6096000" cy="3429000"/>
-          </a:xfrm>
-        </p:spPr>
+        <p:spPr/>
       </p:sp>
       <p:sp>
         <p:nvSpPr>
@@ -612,143 +1363,7 @@
           <a:bodyPr/>
           <a:lstStyle/>
           <a:p>
-            <a:pPr marL="0" marR="0" indent="0" algn="l" defTabSz="457200" rtl="0" eaLnBrk="1" fontAlgn="auto" latinLnBrk="0" hangingPunct="1">
-              <a:lnSpc>
-                <a:spcPct val="100000"/>
-              </a:lnSpc>
-              <a:spcBef>
-                <a:spcPts val="0"/>
-              </a:spcBef>
-              <a:spcAft>
-                <a:spcPts val="0"/>
-              </a:spcAft>
-              <a:buClrTx/>
-              <a:buSzTx/>
-              <a:buFontTx/>
-              <a:buNone/>
-              <a:tabLst/>
-              <a:defRPr/>
-            </a:pPr>
-            <a:r>
-              <a:rPr lang="en-US" dirty="0" smtClean="0"/>
-              <a:t>Alternatively first line could be…</a:t>
-            </a:r>
-          </a:p>
-          <a:p>
-            <a:pPr marL="0" marR="0" indent="0" algn="l" defTabSz="457200" rtl="0" eaLnBrk="1" fontAlgn="auto" latinLnBrk="0" hangingPunct="1">
-              <a:lnSpc>
-                <a:spcPct val="100000"/>
-              </a:lnSpc>
-              <a:spcBef>
-                <a:spcPts val="0"/>
-              </a:spcBef>
-              <a:spcAft>
-                <a:spcPts val="0"/>
-              </a:spcAft>
-              <a:buClrTx/>
-              <a:buSzTx/>
-              <a:buFontTx/>
-              <a:buNone/>
-              <a:tabLst/>
-              <a:defRPr/>
-            </a:pPr>
-            <a:r>
-              <a:rPr lang="en-US" dirty="0" smtClean="0"/>
-              <a:t>For Fusion: </a:t>
-            </a:r>
-          </a:p>
-          <a:p>
-            <a:pPr marL="0" marR="0" indent="0" algn="l" defTabSz="457200" rtl="0" eaLnBrk="1" fontAlgn="auto" latinLnBrk="0" hangingPunct="1">
-              <a:lnSpc>
-                <a:spcPct val="100000"/>
-              </a:lnSpc>
-              <a:spcBef>
-                <a:spcPts val="0"/>
-              </a:spcBef>
-              <a:spcAft>
-                <a:spcPts val="0"/>
-              </a:spcAft>
-              <a:buClrTx/>
-              <a:buSzTx/>
-              <a:buFontTx/>
-              <a:buNone/>
-              <a:tabLst/>
-              <a:defRPr/>
-            </a:pPr>
-            <a:r>
-              <a:rPr lang="en-US" dirty="0" smtClean="0"/>
-              <a:t>vagrant </a:t>
-            </a:r>
-            <a:r>
-              <a:rPr lang="en-US" dirty="0" err="1" smtClean="0"/>
-              <a:t>init</a:t>
-            </a:r>
-            <a:r>
-              <a:rPr lang="en-US" baseline="0" dirty="0" smtClean="0"/>
-              <a:t> precise64 </a:t>
-            </a:r>
-            <a:r>
-              <a:rPr lang="en-US" dirty="0" smtClean="0">
-                <a:hlinkClick r:id="rId3"/>
-              </a:rPr>
-              <a:t>http://files.vagrantup.com/precise64_vmware.box</a:t>
-            </a:r>
-            <a:endParaRPr lang="en-US" dirty="0" smtClean="0"/>
-          </a:p>
-          <a:p>
-            <a:endParaRPr lang="en-US" dirty="0" smtClean="0"/>
-          </a:p>
-          <a:p>
-            <a:r>
-              <a:rPr lang="en-US" dirty="0" smtClean="0"/>
-              <a:t>For </a:t>
-            </a:r>
-            <a:r>
-              <a:rPr lang="en-US" dirty="0" err="1" smtClean="0"/>
-              <a:t>VirtualBox</a:t>
-            </a:r>
-            <a:r>
-              <a:rPr lang="en-US" dirty="0" smtClean="0"/>
-              <a:t>:</a:t>
-            </a:r>
-          </a:p>
-          <a:p>
-            <a:r>
-              <a:rPr lang="en-US" dirty="0" smtClean="0"/>
-              <a:t>vagrant </a:t>
-            </a:r>
-            <a:r>
-              <a:rPr lang="en-US" dirty="0" err="1" smtClean="0"/>
-              <a:t>init</a:t>
-            </a:r>
-            <a:r>
-              <a:rPr lang="en-US" dirty="0" smtClean="0"/>
-              <a:t> precise64 </a:t>
-            </a:r>
-            <a:r>
-              <a:rPr lang="en-US" dirty="0" smtClean="0">
-                <a:hlinkClick r:id="rId4"/>
-              </a:rPr>
-              <a:t>http://files.vagrantup.com/precise64.box</a:t>
-            </a:r>
-            <a:endParaRPr lang="en-US" dirty="0" smtClean="0"/>
-          </a:p>
-          <a:p>
-            <a:endParaRPr lang="en-US" dirty="0" smtClean="0"/>
-          </a:p>
-          <a:p>
-            <a:endParaRPr lang="en-US" dirty="0" smtClean="0"/>
-          </a:p>
-          <a:p>
-            <a:r>
-              <a:rPr lang="en-US" dirty="0" smtClean="0"/>
-              <a:t>It will automatically configure</a:t>
-            </a:r>
-            <a:r>
-              <a:rPr lang="en-US" baseline="0" dirty="0" smtClean="0"/>
-              <a:t> the name of the Vagrant box that you are using and </a:t>
-            </a:r>
-            <a:endParaRPr lang="en-US" dirty="0"/>
+            <a:endParaRPr lang="en-US"/>
           </a:p>
         </p:txBody>
       </p:sp>
@@ -769,7 +1384,7 @@
           <a:p>
             <a:fld id="{8D55EAEB-36BD-FF4D-B4A1-0D75FFEDD0E3}" type="slidenum">
               <a:rPr lang="en-US" smtClean="0"/>
-              <a:t>6</a:t>
+              <a:t>2</a:t>
             </a:fld>
             <a:endParaRPr lang="en-US"/>
           </a:p>
@@ -778,7 +1393,7 @@
     </p:spTree>
     <p:extLst>
       <p:ext uri="{BB962C8B-B14F-4D97-AF65-F5344CB8AC3E}">
-        <p14:creationId xmlns:p14="http://schemas.microsoft.com/office/powerpoint/2010/main" val="2624913008"/>
+        <p14:creationId xmlns:p14="http://schemas.microsoft.com/office/powerpoint/2010/main" val="1469712665"/>
       </p:ext>
     </p:extLst>
   </p:cSld>
@@ -832,25 +1447,7 @@
           <a:bodyPr/>
           <a:lstStyle/>
           <a:p>
-            <a:r>
-              <a:rPr lang="en-US" dirty="0" smtClean="0"/>
-              <a:t>For NAT</a:t>
-            </a:r>
-            <a:r>
-              <a:rPr lang="en-US" baseline="0" dirty="0" smtClean="0"/>
-              <a:t>, see http://</a:t>
-            </a:r>
-            <a:r>
-              <a:rPr lang="en-US" baseline="0" dirty="0" err="1" smtClean="0"/>
-              <a:t>vmtrooper.com</a:t>
-            </a:r>
-            <a:r>
-              <a:rPr lang="en-US" baseline="0" dirty="0" smtClean="0"/>
-              <a:t>/vagrant-static-external-ip-addresses-with-the-vmware-fusion-provider/</a:t>
-            </a:r>
-          </a:p>
-          <a:p>
-            <a:endParaRPr lang="en-US" dirty="0"/>
+            <a:endParaRPr lang="en-US"/>
           </a:p>
         </p:txBody>
       </p:sp>
@@ -871,7 +1468,7 @@
           <a:p>
             <a:fld id="{8D55EAEB-36BD-FF4D-B4A1-0D75FFEDD0E3}" type="slidenum">
               <a:rPr lang="en-US" smtClean="0"/>
-              <a:t>11</a:t>
+              <a:t>3</a:t>
             </a:fld>
             <a:endParaRPr lang="en-US"/>
           </a:p>
@@ -880,7 +1477,585 @@
     </p:spTree>
     <p:extLst>
       <p:ext uri="{BB962C8B-B14F-4D97-AF65-F5344CB8AC3E}">
-        <p14:creationId xmlns:p14="http://schemas.microsoft.com/office/powerpoint/2010/main" val="1612631474"/>
+        <p14:creationId xmlns:p14="http://schemas.microsoft.com/office/powerpoint/2010/main" val="3667348477"/>
+      </p:ext>
+    </p:extLst>
+  </p:cSld>
+  <p:clrMapOvr>
+    <a:masterClrMapping/>
+  </p:clrMapOvr>
+</p:notes>
+</file>
+
+<file path=ppt/notesSlides/notesSlide4.xml><?xml version="1.0" encoding="utf-8"?>
+<p:notes xmlns:a="http://schemas.openxmlformats.org/drawingml/2006/main" xmlns:r="http://schemas.openxmlformats.org/officeDocument/2006/relationships" xmlns:p="http://schemas.openxmlformats.org/presentationml/2006/main">
+  <p:cSld>
+    <p:spTree>
+      <p:nvGrpSpPr>
+        <p:cNvPr id="1" name=""/>
+        <p:cNvGrpSpPr/>
+        <p:nvPr/>
+      </p:nvGrpSpPr>
+      <p:grpSpPr>
+        <a:xfrm>
+          <a:off x="0" y="0"/>
+          <a:ext cx="0" cy="0"/>
+          <a:chOff x="0" y="0"/>
+          <a:chExt cx="0" cy="0"/>
+        </a:xfrm>
+      </p:grpSpPr>
+      <p:sp>
+        <p:nvSpPr>
+          <p:cNvPr id="2" name="Slide Image Placeholder 1"/>
+          <p:cNvSpPr>
+            <a:spLocks noGrp="1" noRot="1" noChangeAspect="1"/>
+          </p:cNvSpPr>
+          <p:nvPr>
+            <p:ph type="sldImg"/>
+          </p:nvPr>
+        </p:nvSpPr>
+        <p:spPr/>
+      </p:sp>
+      <p:sp>
+        <p:nvSpPr>
+          <p:cNvPr id="3" name="Notes Placeholder 2"/>
+          <p:cNvSpPr>
+            <a:spLocks noGrp="1"/>
+          </p:cNvSpPr>
+          <p:nvPr>
+            <p:ph type="body" idx="1"/>
+          </p:nvPr>
+        </p:nvSpPr>
+        <p:spPr/>
+        <p:txBody>
+          <a:bodyPr/>
+          <a:lstStyle/>
+          <a:p>
+            <a:endParaRPr lang="en-US"/>
+          </a:p>
+        </p:txBody>
+      </p:sp>
+      <p:sp>
+        <p:nvSpPr>
+          <p:cNvPr id="4" name="Slide Number Placeholder 3"/>
+          <p:cNvSpPr>
+            <a:spLocks noGrp="1"/>
+          </p:cNvSpPr>
+          <p:nvPr>
+            <p:ph type="sldNum" sz="quarter" idx="10"/>
+          </p:nvPr>
+        </p:nvSpPr>
+        <p:spPr/>
+        <p:txBody>
+          <a:bodyPr/>
+          <a:lstStyle/>
+          <a:p>
+            <a:fld id="{8D55EAEB-36BD-FF4D-B4A1-0D75FFEDD0E3}" type="slidenum">
+              <a:rPr lang="en-US" smtClean="0"/>
+              <a:t>4</a:t>
+            </a:fld>
+            <a:endParaRPr lang="en-US"/>
+          </a:p>
+        </p:txBody>
+      </p:sp>
+    </p:spTree>
+    <p:extLst>
+      <p:ext uri="{BB962C8B-B14F-4D97-AF65-F5344CB8AC3E}">
+        <p14:creationId xmlns:p14="http://schemas.microsoft.com/office/powerpoint/2010/main" val="2931443679"/>
+      </p:ext>
+    </p:extLst>
+  </p:cSld>
+  <p:clrMapOvr>
+    <a:masterClrMapping/>
+  </p:clrMapOvr>
+</p:notes>
+</file>
+
+<file path=ppt/notesSlides/notesSlide5.xml><?xml version="1.0" encoding="utf-8"?>
+<p:notes xmlns:a="http://schemas.openxmlformats.org/drawingml/2006/main" xmlns:r="http://schemas.openxmlformats.org/officeDocument/2006/relationships" xmlns:p="http://schemas.openxmlformats.org/presentationml/2006/main">
+  <p:cSld>
+    <p:spTree>
+      <p:nvGrpSpPr>
+        <p:cNvPr id="1" name=""/>
+        <p:cNvGrpSpPr/>
+        <p:nvPr/>
+      </p:nvGrpSpPr>
+      <p:grpSpPr>
+        <a:xfrm>
+          <a:off x="0" y="0"/>
+          <a:ext cx="0" cy="0"/>
+          <a:chOff x="0" y="0"/>
+          <a:chExt cx="0" cy="0"/>
+        </a:xfrm>
+      </p:grpSpPr>
+      <p:sp>
+        <p:nvSpPr>
+          <p:cNvPr id="2" name="Slide Image Placeholder 1"/>
+          <p:cNvSpPr>
+            <a:spLocks noGrp="1" noRot="1" noChangeAspect="1"/>
+          </p:cNvSpPr>
+          <p:nvPr>
+            <p:ph type="sldImg"/>
+          </p:nvPr>
+        </p:nvSpPr>
+        <p:spPr>
+          <a:xfrm>
+            <a:off x="381000" y="685800"/>
+            <a:ext cx="6096000" cy="3429000"/>
+          </a:xfrm>
+        </p:spPr>
+      </p:sp>
+      <p:sp>
+        <p:nvSpPr>
+          <p:cNvPr id="3" name="Notes Placeholder 2"/>
+          <p:cNvSpPr>
+            <a:spLocks noGrp="1"/>
+          </p:cNvSpPr>
+          <p:nvPr>
+            <p:ph type="body" idx="1"/>
+          </p:nvPr>
+        </p:nvSpPr>
+        <p:spPr/>
+        <p:txBody>
+          <a:bodyPr/>
+          <a:lstStyle/>
+          <a:p>
+            <a:r>
+              <a:rPr lang="en-US" dirty="0" smtClean="0"/>
+              <a:t>We will use </a:t>
+            </a:r>
+            <a:r>
+              <a:rPr lang="en-US" b="1" dirty="0" err="1" smtClean="0"/>
+              <a:t>hashicorp</a:t>
+            </a:r>
+            <a:r>
+              <a:rPr lang="en-US" b="1" dirty="0" smtClean="0"/>
+              <a:t>/precise64 </a:t>
+            </a:r>
+            <a:r>
+              <a:rPr lang="en-US" dirty="0" smtClean="0"/>
+              <a:t>since it is built</a:t>
+            </a:r>
+            <a:r>
+              <a:rPr lang="en-US" baseline="0" dirty="0" smtClean="0"/>
+              <a:t> for </a:t>
+            </a:r>
+            <a:r>
+              <a:rPr lang="en-US" baseline="0" dirty="0" err="1" smtClean="0"/>
+              <a:t>Virtualbox</a:t>
+            </a:r>
+            <a:r>
+              <a:rPr lang="en-US" baseline="0" dirty="0" smtClean="0"/>
+              <a:t> and VMware </a:t>
+            </a:r>
+            <a:endParaRPr lang="en-US" dirty="0"/>
+          </a:p>
+        </p:txBody>
+      </p:sp>
+      <p:sp>
+        <p:nvSpPr>
+          <p:cNvPr id="4" name="Slide Number Placeholder 3"/>
+          <p:cNvSpPr>
+            <a:spLocks noGrp="1"/>
+          </p:cNvSpPr>
+          <p:nvPr>
+            <p:ph type="sldNum" sz="quarter" idx="10"/>
+          </p:nvPr>
+        </p:nvSpPr>
+        <p:spPr/>
+        <p:txBody>
+          <a:bodyPr/>
+          <a:lstStyle/>
+          <a:p>
+            <a:fld id="{8D55EAEB-36BD-FF4D-B4A1-0D75FFEDD0E3}" type="slidenum">
+              <a:rPr lang="en-US" smtClean="0"/>
+              <a:t>5</a:t>
+            </a:fld>
+            <a:endParaRPr lang="en-US"/>
+          </a:p>
+        </p:txBody>
+      </p:sp>
+    </p:spTree>
+    <p:extLst>
+      <p:ext uri="{BB962C8B-B14F-4D97-AF65-F5344CB8AC3E}">
+        <p14:creationId xmlns:p14="http://schemas.microsoft.com/office/powerpoint/2010/main" val="3084299111"/>
+      </p:ext>
+    </p:extLst>
+  </p:cSld>
+  <p:clrMapOvr>
+    <a:masterClrMapping/>
+  </p:clrMapOvr>
+</p:notes>
+</file>
+
+<file path=ppt/notesSlides/notesSlide6.xml><?xml version="1.0" encoding="utf-8"?>
+<p:notes xmlns:a="http://schemas.openxmlformats.org/drawingml/2006/main" xmlns:r="http://schemas.openxmlformats.org/officeDocument/2006/relationships" xmlns:p="http://schemas.openxmlformats.org/presentationml/2006/main">
+  <p:cSld>
+    <p:spTree>
+      <p:nvGrpSpPr>
+        <p:cNvPr id="1" name=""/>
+        <p:cNvGrpSpPr/>
+        <p:nvPr/>
+      </p:nvGrpSpPr>
+      <p:grpSpPr>
+        <a:xfrm>
+          <a:off x="0" y="0"/>
+          <a:ext cx="0" cy="0"/>
+          <a:chOff x="0" y="0"/>
+          <a:chExt cx="0" cy="0"/>
+        </a:xfrm>
+      </p:grpSpPr>
+      <p:sp>
+        <p:nvSpPr>
+          <p:cNvPr id="2" name="Slide Image Placeholder 1"/>
+          <p:cNvSpPr>
+            <a:spLocks noGrp="1" noRot="1" noChangeAspect="1"/>
+          </p:cNvSpPr>
+          <p:nvPr>
+            <p:ph type="sldImg"/>
+          </p:nvPr>
+        </p:nvSpPr>
+        <p:spPr>
+          <a:xfrm>
+            <a:off x="381000" y="685800"/>
+            <a:ext cx="6096000" cy="3429000"/>
+          </a:xfrm>
+        </p:spPr>
+      </p:sp>
+      <p:sp>
+        <p:nvSpPr>
+          <p:cNvPr id="3" name="Notes Placeholder 2"/>
+          <p:cNvSpPr>
+            <a:spLocks noGrp="1"/>
+          </p:cNvSpPr>
+          <p:nvPr>
+            <p:ph type="body" idx="1"/>
+          </p:nvPr>
+        </p:nvSpPr>
+        <p:spPr/>
+        <p:txBody>
+          <a:bodyPr/>
+          <a:lstStyle/>
+          <a:p>
+            <a:pPr marL="0" marR="0" indent="0" algn="l" defTabSz="457200" rtl="0" eaLnBrk="1" fontAlgn="auto" latinLnBrk="0" hangingPunct="1">
+              <a:lnSpc>
+                <a:spcPct val="100000"/>
+              </a:lnSpc>
+              <a:spcBef>
+                <a:spcPts val="0"/>
+              </a:spcBef>
+              <a:spcAft>
+                <a:spcPts val="0"/>
+              </a:spcAft>
+              <a:buClrTx/>
+              <a:buSzTx/>
+              <a:buFontTx/>
+              <a:buNone/>
+              <a:tabLst/>
+              <a:defRPr/>
+            </a:pPr>
+            <a:r>
+              <a:rPr lang="en-US" dirty="0" smtClean="0"/>
+              <a:t>vagrant up --provider=</a:t>
+            </a:r>
+            <a:r>
+              <a:rPr lang="en-US" dirty="0" err="1" smtClean="0"/>
+              <a:t>vmware_fusion</a:t>
+            </a:r>
+            <a:r>
+              <a:rPr lang="en-US" dirty="0" smtClean="0"/>
+              <a:t> or vagrant up --provider=</a:t>
+            </a:r>
+            <a:r>
+              <a:rPr lang="en-US" dirty="0" err="1" smtClean="0"/>
+              <a:t>vmware_workstation</a:t>
+            </a:r>
+            <a:r>
+              <a:rPr lang="en-US" dirty="0" smtClean="0"/>
+              <a:t> (VMware)</a:t>
+            </a:r>
+          </a:p>
+        </p:txBody>
+      </p:sp>
+      <p:sp>
+        <p:nvSpPr>
+          <p:cNvPr id="4" name="Slide Number Placeholder 3"/>
+          <p:cNvSpPr>
+            <a:spLocks noGrp="1"/>
+          </p:cNvSpPr>
+          <p:nvPr>
+            <p:ph type="sldNum" sz="quarter" idx="10"/>
+          </p:nvPr>
+        </p:nvSpPr>
+        <p:spPr/>
+        <p:txBody>
+          <a:bodyPr/>
+          <a:lstStyle/>
+          <a:p>
+            <a:fld id="{8D55EAEB-36BD-FF4D-B4A1-0D75FFEDD0E3}" type="slidenum">
+              <a:rPr lang="en-US" smtClean="0"/>
+              <a:t>6</a:t>
+            </a:fld>
+            <a:endParaRPr lang="en-US"/>
+          </a:p>
+        </p:txBody>
+      </p:sp>
+    </p:spTree>
+    <p:extLst>
+      <p:ext uri="{BB962C8B-B14F-4D97-AF65-F5344CB8AC3E}">
+        <p14:creationId xmlns:p14="http://schemas.microsoft.com/office/powerpoint/2010/main" val="2624913008"/>
+      </p:ext>
+    </p:extLst>
+  </p:cSld>
+  <p:clrMapOvr>
+    <a:masterClrMapping/>
+  </p:clrMapOvr>
+</p:notes>
+</file>
+
+<file path=ppt/notesSlides/notesSlide7.xml><?xml version="1.0" encoding="utf-8"?>
+<p:notes xmlns:a="http://schemas.openxmlformats.org/drawingml/2006/main" xmlns:r="http://schemas.openxmlformats.org/officeDocument/2006/relationships" xmlns:p="http://schemas.openxmlformats.org/presentationml/2006/main">
+  <p:cSld>
+    <p:spTree>
+      <p:nvGrpSpPr>
+        <p:cNvPr id="1" name=""/>
+        <p:cNvGrpSpPr/>
+        <p:nvPr/>
+      </p:nvGrpSpPr>
+      <p:grpSpPr>
+        <a:xfrm>
+          <a:off x="0" y="0"/>
+          <a:ext cx="0" cy="0"/>
+          <a:chOff x="0" y="0"/>
+          <a:chExt cx="0" cy="0"/>
+        </a:xfrm>
+      </p:grpSpPr>
+      <p:sp>
+        <p:nvSpPr>
+          <p:cNvPr id="2" name="Slide Image Placeholder 1"/>
+          <p:cNvSpPr>
+            <a:spLocks noGrp="1" noRot="1" noChangeAspect="1"/>
+          </p:cNvSpPr>
+          <p:nvPr>
+            <p:ph type="sldImg"/>
+          </p:nvPr>
+        </p:nvSpPr>
+        <p:spPr/>
+      </p:sp>
+      <p:sp>
+        <p:nvSpPr>
+          <p:cNvPr id="3" name="Notes Placeholder 2"/>
+          <p:cNvSpPr>
+            <a:spLocks noGrp="1"/>
+          </p:cNvSpPr>
+          <p:nvPr>
+            <p:ph type="body" idx="1"/>
+          </p:nvPr>
+        </p:nvSpPr>
+        <p:spPr/>
+        <p:txBody>
+          <a:bodyPr/>
+          <a:lstStyle/>
+          <a:p>
+            <a:endParaRPr lang="en-US"/>
+          </a:p>
+        </p:txBody>
+      </p:sp>
+      <p:sp>
+        <p:nvSpPr>
+          <p:cNvPr id="4" name="Slide Number Placeholder 3"/>
+          <p:cNvSpPr>
+            <a:spLocks noGrp="1"/>
+          </p:cNvSpPr>
+          <p:nvPr>
+            <p:ph type="sldNum" sz="quarter" idx="10"/>
+          </p:nvPr>
+        </p:nvSpPr>
+        <p:spPr/>
+        <p:txBody>
+          <a:bodyPr/>
+          <a:lstStyle/>
+          <a:p>
+            <a:fld id="{8D55EAEB-36BD-FF4D-B4A1-0D75FFEDD0E3}" type="slidenum">
+              <a:rPr lang="en-US" smtClean="0"/>
+              <a:t>7</a:t>
+            </a:fld>
+            <a:endParaRPr lang="en-US"/>
+          </a:p>
+        </p:txBody>
+      </p:sp>
+    </p:spTree>
+    <p:extLst>
+      <p:ext uri="{BB962C8B-B14F-4D97-AF65-F5344CB8AC3E}">
+        <p14:creationId xmlns:p14="http://schemas.microsoft.com/office/powerpoint/2010/main" val="1458586622"/>
+      </p:ext>
+    </p:extLst>
+  </p:cSld>
+  <p:clrMapOvr>
+    <a:masterClrMapping/>
+  </p:clrMapOvr>
+</p:notes>
+</file>
+
+<file path=ppt/notesSlides/notesSlide8.xml><?xml version="1.0" encoding="utf-8"?>
+<p:notes xmlns:a="http://schemas.openxmlformats.org/drawingml/2006/main" xmlns:r="http://schemas.openxmlformats.org/officeDocument/2006/relationships" xmlns:p="http://schemas.openxmlformats.org/presentationml/2006/main">
+  <p:cSld>
+    <p:spTree>
+      <p:nvGrpSpPr>
+        <p:cNvPr id="1" name=""/>
+        <p:cNvGrpSpPr/>
+        <p:nvPr/>
+      </p:nvGrpSpPr>
+      <p:grpSpPr>
+        <a:xfrm>
+          <a:off x="0" y="0"/>
+          <a:ext cx="0" cy="0"/>
+          <a:chOff x="0" y="0"/>
+          <a:chExt cx="0" cy="0"/>
+        </a:xfrm>
+      </p:grpSpPr>
+      <p:sp>
+        <p:nvSpPr>
+          <p:cNvPr id="2" name="Slide Image Placeholder 1"/>
+          <p:cNvSpPr>
+            <a:spLocks noGrp="1" noRot="1" noChangeAspect="1"/>
+          </p:cNvSpPr>
+          <p:nvPr>
+            <p:ph type="sldImg"/>
+          </p:nvPr>
+        </p:nvSpPr>
+        <p:spPr/>
+      </p:sp>
+      <p:sp>
+        <p:nvSpPr>
+          <p:cNvPr id="3" name="Notes Placeholder 2"/>
+          <p:cNvSpPr>
+            <a:spLocks noGrp="1"/>
+          </p:cNvSpPr>
+          <p:nvPr>
+            <p:ph type="body" idx="1"/>
+          </p:nvPr>
+        </p:nvSpPr>
+        <p:spPr/>
+        <p:txBody>
+          <a:bodyPr/>
+          <a:lstStyle/>
+          <a:p>
+            <a:endParaRPr lang="en-US"/>
+          </a:p>
+        </p:txBody>
+      </p:sp>
+      <p:sp>
+        <p:nvSpPr>
+          <p:cNvPr id="4" name="Slide Number Placeholder 3"/>
+          <p:cNvSpPr>
+            <a:spLocks noGrp="1"/>
+          </p:cNvSpPr>
+          <p:nvPr>
+            <p:ph type="sldNum" sz="quarter" idx="10"/>
+          </p:nvPr>
+        </p:nvSpPr>
+        <p:spPr/>
+        <p:txBody>
+          <a:bodyPr/>
+          <a:lstStyle/>
+          <a:p>
+            <a:fld id="{8D55EAEB-36BD-FF4D-B4A1-0D75FFEDD0E3}" type="slidenum">
+              <a:rPr lang="en-US" smtClean="0"/>
+              <a:t>8</a:t>
+            </a:fld>
+            <a:endParaRPr lang="en-US"/>
+          </a:p>
+        </p:txBody>
+      </p:sp>
+    </p:spTree>
+    <p:extLst>
+      <p:ext uri="{BB962C8B-B14F-4D97-AF65-F5344CB8AC3E}">
+        <p14:creationId xmlns:p14="http://schemas.microsoft.com/office/powerpoint/2010/main" val="319987458"/>
+      </p:ext>
+    </p:extLst>
+  </p:cSld>
+  <p:clrMapOvr>
+    <a:masterClrMapping/>
+  </p:clrMapOvr>
+</p:notes>
+</file>
+
+<file path=ppt/notesSlides/notesSlide9.xml><?xml version="1.0" encoding="utf-8"?>
+<p:notes xmlns:a="http://schemas.openxmlformats.org/drawingml/2006/main" xmlns:r="http://schemas.openxmlformats.org/officeDocument/2006/relationships" xmlns:p="http://schemas.openxmlformats.org/presentationml/2006/main">
+  <p:cSld>
+    <p:spTree>
+      <p:nvGrpSpPr>
+        <p:cNvPr id="1" name=""/>
+        <p:cNvGrpSpPr/>
+        <p:nvPr/>
+      </p:nvGrpSpPr>
+      <p:grpSpPr>
+        <a:xfrm>
+          <a:off x="0" y="0"/>
+          <a:ext cx="0" cy="0"/>
+          <a:chOff x="0" y="0"/>
+          <a:chExt cx="0" cy="0"/>
+        </a:xfrm>
+      </p:grpSpPr>
+      <p:sp>
+        <p:nvSpPr>
+          <p:cNvPr id="2" name="Slide Image Placeholder 1"/>
+          <p:cNvSpPr>
+            <a:spLocks noGrp="1" noRot="1" noChangeAspect="1"/>
+          </p:cNvSpPr>
+          <p:nvPr>
+            <p:ph type="sldImg"/>
+          </p:nvPr>
+        </p:nvSpPr>
+        <p:spPr/>
+      </p:sp>
+      <p:sp>
+        <p:nvSpPr>
+          <p:cNvPr id="3" name="Notes Placeholder 2"/>
+          <p:cNvSpPr>
+            <a:spLocks noGrp="1"/>
+          </p:cNvSpPr>
+          <p:nvPr>
+            <p:ph type="body" idx="1"/>
+          </p:nvPr>
+        </p:nvSpPr>
+        <p:spPr/>
+        <p:txBody>
+          <a:bodyPr/>
+          <a:lstStyle/>
+          <a:p>
+            <a:endParaRPr lang="en-US"/>
+          </a:p>
+        </p:txBody>
+      </p:sp>
+      <p:sp>
+        <p:nvSpPr>
+          <p:cNvPr id="4" name="Slide Number Placeholder 3"/>
+          <p:cNvSpPr>
+            <a:spLocks noGrp="1"/>
+          </p:cNvSpPr>
+          <p:nvPr>
+            <p:ph type="sldNum" sz="quarter" idx="10"/>
+          </p:nvPr>
+        </p:nvSpPr>
+        <p:spPr/>
+        <p:txBody>
+          <a:bodyPr/>
+          <a:lstStyle/>
+          <a:p>
+            <a:fld id="{8D55EAEB-36BD-FF4D-B4A1-0D75FFEDD0E3}" type="slidenum">
+              <a:rPr lang="en-US" smtClean="0"/>
+              <a:t>9</a:t>
+            </a:fld>
+            <a:endParaRPr lang="en-US"/>
+          </a:p>
+        </p:txBody>
+      </p:sp>
+    </p:spTree>
+    <p:extLst>
+      <p:ext uri="{BB962C8B-B14F-4D97-AF65-F5344CB8AC3E}">
+        <p14:creationId xmlns:p14="http://schemas.microsoft.com/office/powerpoint/2010/main" val="554988671"/>
       </p:ext>
     </p:extLst>
   </p:cSld>
@@ -1112,7 +2287,7 @@
           <a:p>
             <a:fld id="{CEB1479B-2454-8E48-9041-E1255446920F}" type="datetimeFigureOut">
               <a:rPr lang="en-US" smtClean="0"/>
-              <a:t>7/9/13</a:t>
+              <a:t>5/6/14</a:t>
             </a:fld>
             <a:endParaRPr lang="en-US"/>
           </a:p>
@@ -1305,7 +2480,7 @@
           <a:p>
             <a:fld id="{CEB1479B-2454-8E48-9041-E1255446920F}" type="datetimeFigureOut">
               <a:rPr lang="en-US" smtClean="0"/>
-              <a:t>7/9/13</a:t>
+              <a:t>5/6/14</a:t>
             </a:fld>
             <a:endParaRPr lang="en-US"/>
           </a:p>
@@ -1574,7 +2749,7 @@
           <a:p>
             <a:fld id="{CEB1479B-2454-8E48-9041-E1255446920F}" type="datetimeFigureOut">
               <a:rPr lang="en-US" smtClean="0"/>
-              <a:t>7/9/13</a:t>
+              <a:t>5/6/14</a:t>
             </a:fld>
             <a:endParaRPr lang="en-US"/>
           </a:p>
@@ -1753,7 +2928,7 @@
           <a:p>
             <a:fld id="{CEB1479B-2454-8E48-9041-E1255446920F}" type="datetimeFigureOut">
               <a:rPr lang="en-US" smtClean="0"/>
-              <a:t>7/9/13</a:t>
+              <a:t>5/6/14</a:t>
             </a:fld>
             <a:endParaRPr lang="en-US"/>
           </a:p>
@@ -1922,7 +3097,7 @@
           <a:p>
             <a:fld id="{CEB1479B-2454-8E48-9041-E1255446920F}" type="datetimeFigureOut">
               <a:rPr lang="en-US" smtClean="0"/>
-              <a:t>7/9/13</a:t>
+              <a:t>5/6/14</a:t>
             </a:fld>
             <a:endParaRPr lang="en-US"/>
           </a:p>
@@ -2164,7 +3339,7 @@
           <a:p>
             <a:fld id="{CEB1479B-2454-8E48-9041-E1255446920F}" type="datetimeFigureOut">
               <a:rPr lang="en-US" smtClean="0"/>
-              <a:t>7/9/13</a:t>
+              <a:t>5/6/14</a:t>
             </a:fld>
             <a:endParaRPr lang="en-US"/>
           </a:p>
@@ -2487,7 +3662,7 @@
           <a:p>
             <a:fld id="{CEB1479B-2454-8E48-9041-E1255446920F}" type="datetimeFigureOut">
               <a:rPr lang="en-US" smtClean="0"/>
-              <a:t>7/9/13</a:t>
+              <a:t>5/6/14</a:t>
             </a:fld>
             <a:endParaRPr lang="en-US"/>
           </a:p>
@@ -2785,7 +3960,7 @@
           <a:p>
             <a:fld id="{CEB1479B-2454-8E48-9041-E1255446920F}" type="datetimeFigureOut">
               <a:rPr lang="en-US" smtClean="0"/>
-              <a:t>7/9/13</a:t>
+              <a:t>5/6/14</a:t>
             </a:fld>
             <a:endParaRPr lang="en-US"/>
           </a:p>
@@ -3241,7 +4416,7 @@
           <a:p>
             <a:fld id="{CEB1479B-2454-8E48-9041-E1255446920F}" type="datetimeFigureOut">
               <a:rPr lang="en-US" smtClean="0"/>
-              <a:t>7/9/13</a:t>
+              <a:t>5/6/14</a:t>
             </a:fld>
             <a:endParaRPr lang="en-US"/>
           </a:p>
@@ -3354,7 +4529,7 @@
           <a:p>
             <a:fld id="{CEB1479B-2454-8E48-9041-E1255446920F}" type="datetimeFigureOut">
               <a:rPr lang="en-US" smtClean="0"/>
-              <a:t>7/9/13</a:t>
+              <a:t>5/6/14</a:t>
             </a:fld>
             <a:endParaRPr lang="en-US"/>
           </a:p>
@@ -3444,7 +4619,7 @@
           <a:p>
             <a:fld id="{CEB1479B-2454-8E48-9041-E1255446920F}" type="datetimeFigureOut">
               <a:rPr lang="en-US" smtClean="0"/>
-              <a:t>7/9/13</a:t>
+              <a:t>5/6/14</a:t>
             </a:fld>
             <a:endParaRPr lang="en-US"/>
           </a:p>
@@ -3726,7 +4901,7 @@
           <a:p>
             <a:fld id="{CEB1479B-2454-8E48-9041-E1255446920F}" type="datetimeFigureOut">
               <a:rPr lang="en-US" smtClean="0"/>
-              <a:t>7/9/13</a:t>
+              <a:t>5/6/14</a:t>
             </a:fld>
             <a:endParaRPr lang="en-US"/>
           </a:p>
@@ -3933,7 +5108,7 @@
           <a:p>
             <a:fld id="{CEB1479B-2454-8E48-9041-E1255446920F}" type="datetimeFigureOut">
               <a:rPr lang="en-US" smtClean="0"/>
-              <a:t>7/9/13</a:t>
+              <a:t>5/6/14</a:t>
             </a:fld>
             <a:endParaRPr lang="en-US"/>
           </a:p>
@@ -4445,29 +5620,6 @@
             </a:r>
             <a:endParaRPr lang="en-US" dirty="0" smtClean="0"/>
           </a:p>
-          <a:p>
-            <a:endParaRPr lang="en-US" dirty="0" smtClean="0"/>
-          </a:p>
-          <a:p>
-            <a:r>
-              <a:rPr lang="en-US" dirty="0" smtClean="0"/>
-              <a:t>Cody Bunch</a:t>
-            </a:r>
-          </a:p>
-          <a:p>
-            <a:r>
-              <a:rPr lang="en-US" dirty="0" smtClean="0"/>
-              <a:t>@</a:t>
-            </a:r>
-            <a:r>
-              <a:rPr lang="en-US" dirty="0" err="1" smtClean="0"/>
-              <a:t>cody_bunch</a:t>
-            </a:r>
-            <a:endParaRPr lang="en-US" dirty="0" smtClean="0"/>
-          </a:p>
-          <a:p>
-            <a:endParaRPr lang="en-US" dirty="0"/>
-          </a:p>
         </p:txBody>
       </p:sp>
       <p:pic>
@@ -4479,7 +5631,7 @@
           <p:nvPr/>
         </p:nvPicPr>
         <p:blipFill>
-          <a:blip r:embed="rId2">
+          <a:blip r:embed="rId3">
             <a:extLst>
               <a:ext uri="{28A0092B-C50C-407E-A947-70E740481C1C}">
                 <a14:useLocalDpi xmlns:a14="http://schemas.microsoft.com/office/drawing/2010/main" val="0"/>
@@ -4509,7 +5661,7 @@
           <p:nvPr/>
         </p:nvPicPr>
         <p:blipFill>
-          <a:blip r:embed="rId3">
+          <a:blip r:embed="rId4">
             <a:extLst>
               <a:ext uri="{28A0092B-C50C-407E-A947-70E740481C1C}">
                 <a14:useLocalDpi xmlns:a14="http://schemas.microsoft.com/office/drawing/2010/main" val="0"/>
@@ -4669,13 +5821,13 @@
             </a:r>
             <a:r>
               <a:rPr lang="en-US" dirty="0">
-                <a:hlinkClick r:id="rId2"/>
+                <a:hlinkClick r:id="rId3"/>
               </a:rPr>
               <a:t>https://github.com/VMTrooper/</a:t>
             </a:r>
             <a:r>
               <a:rPr lang="en-US" dirty="0" smtClean="0">
-                <a:hlinkClick r:id="rId2"/>
+                <a:hlinkClick r:id="rId3"/>
               </a:rPr>
               <a:t>VagrantBrownBag</a:t>
             </a:r>
@@ -4829,15 +5981,19 @@
             </a:pPr>
             <a:r>
               <a:rPr lang="en-US" dirty="0" smtClean="0"/>
-              <a:t>NOTE: for NAT addresses (i.e. :</a:t>
+              <a:t>NOTE: For the :</a:t>
             </a:r>
             <a:r>
               <a:rPr lang="en-US" dirty="0" err="1" smtClean="0"/>
               <a:t>public_network</a:t>
             </a:r>
             <a:r>
-              <a:rPr lang="en-US" dirty="0" smtClean="0"/>
-              <a:t>), you will need to do some extra work involving DHCP</a:t>
+              <a:rPr lang="en-US" dirty="0"/>
+              <a:t> </a:t>
+            </a:r>
+            <a:r>
+              <a:rPr lang="en-US" dirty="0" smtClean="0"/>
+              <a:t>option, you will need to do some extra work involving DHCP</a:t>
             </a:r>
             <a:endParaRPr lang="en-US" dirty="0"/>
           </a:p>
@@ -4906,234 +6062,67 @@
             <p:ph idx="1"/>
           </p:nvPr>
         </p:nvSpPr>
-        <p:spPr/>
+        <p:spPr>
+          <a:xfrm>
+            <a:off x="549274" y="1200151"/>
+            <a:ext cx="8446889" cy="3257550"/>
+          </a:xfrm>
+        </p:spPr>
         <p:txBody>
           <a:bodyPr>
-            <a:normAutofit fontScale="25000" lnSpcReduction="20000"/>
+            <a:normAutofit/>
           </a:bodyPr>
           <a:lstStyle/>
           <a:p>
             <a:r>
-              <a:rPr lang="en-US" sz="9600" dirty="0" smtClean="0"/>
-              <a:t>Memory</a:t>
-            </a:r>
-          </a:p>
-          <a:p>
-            <a:endParaRPr lang="en-US" sz="9600" dirty="0" smtClean="0"/>
-          </a:p>
-          <a:p>
-            <a:pPr marL="0" indent="0">
-              <a:spcBef>
-                <a:spcPts val="0"/>
-              </a:spcBef>
-              <a:buNone/>
-            </a:pPr>
-            <a:r>
-              <a:rPr lang="en-US" sz="8000" dirty="0" smtClean="0"/>
-              <a:t># </a:t>
-            </a:r>
-            <a:r>
-              <a:rPr lang="en-US" sz="8000" dirty="0"/>
-              <a:t>If using Fusion</a:t>
-            </a:r>
-            <a:endParaRPr lang="en-US" sz="8000" dirty="0" smtClean="0"/>
-          </a:p>
-          <a:p>
-            <a:pPr marL="0" indent="0">
-              <a:spcBef>
-                <a:spcPts val="0"/>
-              </a:spcBef>
-              <a:buNone/>
-            </a:pPr>
-            <a:r>
-              <a:rPr lang="en-US" sz="8000" dirty="0" err="1" smtClean="0"/>
-              <a:t>config.vm.provider</a:t>
-            </a:r>
-            <a:r>
-              <a:rPr lang="en-US" sz="8000" dirty="0" smtClean="0"/>
-              <a:t> </a:t>
-            </a:r>
-            <a:r>
-              <a:rPr lang="en-US" sz="8000" dirty="0"/>
-              <a:t>:</a:t>
-            </a:r>
-            <a:r>
-              <a:rPr lang="en-US" sz="8000" dirty="0" err="1"/>
-              <a:t>vmware_fusion</a:t>
-            </a:r>
-            <a:r>
-              <a:rPr lang="en-US" sz="8000" dirty="0"/>
-              <a:t> do |v|</a:t>
-            </a:r>
-          </a:p>
-          <a:p>
-            <a:pPr marL="0" indent="0">
-              <a:spcBef>
-                <a:spcPts val="0"/>
-              </a:spcBef>
-              <a:buNone/>
-            </a:pPr>
-            <a:r>
-              <a:rPr lang="en-US" sz="8000" dirty="0"/>
-              <a:t>     </a:t>
-            </a:r>
-            <a:r>
-              <a:rPr lang="en-US" sz="8000" dirty="0" smtClean="0"/>
-              <a:t> </a:t>
-            </a:r>
-            <a:r>
-              <a:rPr lang="en-US" sz="8000" dirty="0" err="1"/>
-              <a:t>v.vmx</a:t>
-            </a:r>
-            <a:r>
-              <a:rPr lang="en-US" sz="8000" dirty="0"/>
-              <a:t>["</a:t>
-            </a:r>
-            <a:r>
-              <a:rPr lang="en-US" sz="8000" dirty="0" err="1"/>
-              <a:t>memsize</a:t>
-            </a:r>
-            <a:r>
-              <a:rPr lang="en-US" sz="8000" dirty="0"/>
-              <a:t>"] = 1024</a:t>
-            </a:r>
-          </a:p>
-          <a:p>
-            <a:pPr marL="0" indent="0">
-              <a:spcBef>
-                <a:spcPts val="0"/>
-              </a:spcBef>
-              <a:buNone/>
-            </a:pPr>
-            <a:r>
-              <a:rPr lang="en-US" sz="8000" dirty="0" smtClean="0"/>
-              <a:t>end</a:t>
-            </a:r>
-          </a:p>
-          <a:p>
-            <a:pPr marL="0" indent="0">
-              <a:spcBef>
-                <a:spcPts val="0"/>
-              </a:spcBef>
-              <a:buNone/>
-            </a:pPr>
-            <a:endParaRPr lang="en-US" sz="8000" dirty="0"/>
-          </a:p>
-          <a:p>
-            <a:pPr marL="0" indent="0">
-              <a:spcBef>
-                <a:spcPts val="0"/>
-              </a:spcBef>
-              <a:buNone/>
-            </a:pPr>
-            <a:r>
-              <a:rPr lang="en-US" sz="8000" dirty="0" smtClean="0"/>
-              <a:t># If </a:t>
-            </a:r>
-            <a:r>
-              <a:rPr lang="en-US" sz="8000" dirty="0"/>
-              <a:t>using </a:t>
-            </a:r>
-            <a:r>
-              <a:rPr lang="en-US" sz="8000" dirty="0" err="1"/>
-              <a:t>VirtualBox</a:t>
-            </a:r>
-            <a:endParaRPr lang="en-US" sz="8000" dirty="0"/>
-          </a:p>
-          <a:p>
-            <a:pPr marL="0" indent="0">
-              <a:spcBef>
-                <a:spcPts val="0"/>
-              </a:spcBef>
-              <a:buNone/>
-            </a:pPr>
-            <a:r>
-              <a:rPr lang="en-US" sz="8000" dirty="0" err="1" smtClean="0"/>
-              <a:t>config.vm.provider</a:t>
-            </a:r>
-            <a:r>
-              <a:rPr lang="en-US" sz="8000" dirty="0" smtClean="0"/>
-              <a:t> </a:t>
-            </a:r>
-            <a:r>
-              <a:rPr lang="en-US" sz="8000" dirty="0"/>
-              <a:t>:</a:t>
-            </a:r>
-            <a:r>
-              <a:rPr lang="en-US" sz="8000" dirty="0" err="1"/>
-              <a:t>virtualbox</a:t>
-            </a:r>
-            <a:r>
-              <a:rPr lang="en-US" sz="8000" dirty="0"/>
-              <a:t> do |</a:t>
-            </a:r>
-            <a:r>
-              <a:rPr lang="en-US" sz="8000" dirty="0" err="1"/>
-              <a:t>vbox</a:t>
-            </a:r>
-            <a:r>
-              <a:rPr lang="en-US" sz="8000" dirty="0"/>
-              <a:t>|</a:t>
-            </a:r>
-          </a:p>
-          <a:p>
-            <a:pPr marL="0" indent="0">
-              <a:spcBef>
-                <a:spcPts val="0"/>
-              </a:spcBef>
-              <a:buNone/>
-            </a:pPr>
-            <a:r>
-              <a:rPr lang="en-US" sz="8000" dirty="0"/>
-              <a:t>     </a:t>
-            </a:r>
-            <a:r>
-              <a:rPr lang="en-US" sz="8000" dirty="0" err="1" smtClean="0"/>
-              <a:t>vbox.customize</a:t>
-            </a:r>
-            <a:r>
-              <a:rPr lang="en-US" sz="8000" dirty="0" smtClean="0"/>
-              <a:t> </a:t>
-            </a:r>
-            <a:r>
-              <a:rPr lang="en-US" sz="8000" dirty="0"/>
-              <a:t>["</a:t>
-            </a:r>
-            <a:r>
-              <a:rPr lang="en-US" sz="8000" dirty="0" err="1"/>
-              <a:t>modifyvm</a:t>
-            </a:r>
-            <a:r>
-              <a:rPr lang="en-US" sz="8000" dirty="0"/>
-              <a:t>", :id, "--memory", 1024]</a:t>
-            </a:r>
-          </a:p>
-          <a:p>
-            <a:pPr marL="0" indent="0">
-              <a:spcBef>
-                <a:spcPts val="0"/>
-              </a:spcBef>
-              <a:buNone/>
-            </a:pPr>
-            <a:r>
-              <a:rPr lang="en-US" sz="8000" dirty="0" smtClean="0"/>
-              <a:t>end</a:t>
-            </a:r>
-          </a:p>
-          <a:p>
-            <a:pPr>
-              <a:spcBef>
-                <a:spcPts val="0"/>
-              </a:spcBef>
-            </a:pPr>
-            <a:endParaRPr lang="en-US" dirty="0"/>
+              <a:rPr lang="en-US" dirty="0" smtClean="0"/>
+              <a:t>IMPORTANT for </a:t>
+            </a:r>
+            <a:r>
+              <a:rPr lang="en-US" dirty="0" err="1" smtClean="0"/>
+              <a:t>Virtualbox</a:t>
+            </a:r>
+            <a:r>
+              <a:rPr lang="en-US" dirty="0" smtClean="0"/>
+              <a:t>!</a:t>
+            </a:r>
+          </a:p>
+          <a:p>
+            <a:pPr lvl="1"/>
+            <a:r>
+              <a:rPr lang="en-US" dirty="0" smtClean="0"/>
+              <a:t>Port forwarding must be used if you want to access a specific port on your VM from your desktop… because, reasons:</a:t>
+            </a:r>
+          </a:p>
+          <a:p>
+            <a:pPr lvl="2"/>
+            <a:r>
+              <a:rPr lang="en-US" dirty="0" err="1"/>
+              <a:t>config.vm.network</a:t>
+            </a:r>
+            <a:r>
+              <a:rPr lang="en-US" dirty="0"/>
+              <a:t> "</a:t>
+            </a:r>
+            <a:r>
+              <a:rPr lang="en-US" dirty="0" err="1"/>
+              <a:t>forwarded_port</a:t>
+            </a:r>
+            <a:r>
+              <a:rPr lang="en-US" dirty="0"/>
+              <a:t>", guest: 80, host: </a:t>
+            </a:r>
+            <a:r>
+              <a:rPr lang="en-US" dirty="0" smtClean="0"/>
+              <a:t>8080</a:t>
+            </a:r>
           </a:p>
         </p:txBody>
       </p:sp>
     </p:spTree>
     <p:extLst>
       <p:ext uri="{BB962C8B-B14F-4D97-AF65-F5344CB8AC3E}">
-        <p14:creationId xmlns:p14="http://schemas.microsoft.com/office/powerpoint/2010/main" val="2877358671"/>
+        <p14:creationId xmlns:p14="http://schemas.microsoft.com/office/powerpoint/2010/main" val="3658704665"/>
       </p:ext>
     </p:extLst>
   </p:cSld>
@@ -5176,9 +6165,10 @@
           <a:lstStyle/>
           <a:p>
             <a:r>
-              <a:rPr lang="en-US" dirty="0"/>
-              <a:t>Multi-VM Configuration </a:t>
-            </a:r>
+              <a:rPr lang="en-US" dirty="0" smtClean="0"/>
+              <a:t>Customize Your VM</a:t>
+            </a:r>
+            <a:endParaRPr lang="en-US" dirty="0"/>
           </a:p>
         </p:txBody>
       </p:sp>
@@ -5194,42 +6184,314 @@
         </p:nvSpPr>
         <p:spPr/>
         <p:txBody>
-          <a:bodyPr/>
-          <a:lstStyle/>
-          <a:p>
-            <a:r>
-              <a:rPr lang="en-US" dirty="0" smtClean="0"/>
-              <a:t>Share files between VMs.</a:t>
-            </a:r>
-          </a:p>
-          <a:p>
-            <a:pPr lvl="1"/>
-            <a:r>
-              <a:rPr lang="en-US" dirty="0" smtClean="0"/>
-              <a:t>The </a:t>
-            </a:r>
-            <a:r>
-              <a:rPr lang="en-US" dirty="0" err="1" smtClean="0"/>
-              <a:t>Vagrantfile’s</a:t>
-            </a:r>
-            <a:r>
-              <a:rPr lang="en-US" dirty="0" smtClean="0"/>
-              <a:t> folder is mounted to </a:t>
-            </a:r>
-            <a:r>
-              <a:rPr lang="en-US" b="1" dirty="0" smtClean="0"/>
-              <a:t>/vagrant</a:t>
-            </a:r>
-            <a:r>
-              <a:rPr lang="en-US" dirty="0" smtClean="0"/>
-              <a:t> on each VM</a:t>
-            </a:r>
-          </a:p>
-          <a:p>
-            <a:r>
-              <a:rPr lang="en-US" dirty="0" smtClean="0"/>
-              <a:t>See sample code</a:t>
-            </a:r>
+          <a:bodyPr>
+            <a:normAutofit fontScale="25000" lnSpcReduction="20000"/>
+          </a:bodyPr>
+          <a:lstStyle/>
+          <a:p>
+            <a:r>
+              <a:rPr lang="en-US" sz="9600" dirty="0" smtClean="0"/>
+              <a:t>Memory</a:t>
+            </a:r>
+            <a:br>
+              <a:rPr lang="en-US" sz="9600" dirty="0" smtClean="0"/>
+            </a:br>
+            <a:endParaRPr lang="en-US" sz="9600" dirty="0" smtClean="0"/>
+          </a:p>
+          <a:p>
+            <a:pPr marL="0" indent="0">
+              <a:spcBef>
+                <a:spcPts val="0"/>
+              </a:spcBef>
+              <a:buNone/>
+            </a:pPr>
+            <a:r>
+              <a:rPr lang="en-US" sz="8000" dirty="0" smtClean="0"/>
+              <a:t># </a:t>
+            </a:r>
+            <a:r>
+              <a:rPr lang="en-US" sz="8000" dirty="0"/>
+              <a:t>If using Fusion</a:t>
+            </a:r>
+            <a:endParaRPr lang="en-US" sz="8000" dirty="0" smtClean="0"/>
+          </a:p>
+          <a:p>
+            <a:pPr marL="0" indent="0">
+              <a:spcBef>
+                <a:spcPts val="0"/>
+              </a:spcBef>
+              <a:buNone/>
+            </a:pPr>
+            <a:r>
+              <a:rPr lang="en-US" sz="8000" dirty="0" err="1" smtClean="0"/>
+              <a:t>config.vm.provider</a:t>
+            </a:r>
+            <a:r>
+              <a:rPr lang="en-US" sz="8000" dirty="0" smtClean="0"/>
+              <a:t> </a:t>
+            </a:r>
+            <a:r>
+              <a:rPr lang="en-US" sz="8000" dirty="0"/>
+              <a:t>:</a:t>
+            </a:r>
+            <a:r>
+              <a:rPr lang="en-US" sz="8000" dirty="0" err="1"/>
+              <a:t>vmware_fusion</a:t>
+            </a:r>
+            <a:r>
+              <a:rPr lang="en-US" sz="8000" dirty="0"/>
+              <a:t> do |v|</a:t>
+            </a:r>
+          </a:p>
+          <a:p>
+            <a:pPr marL="0" indent="0">
+              <a:spcBef>
+                <a:spcPts val="0"/>
+              </a:spcBef>
+              <a:buNone/>
+            </a:pPr>
+            <a:r>
+              <a:rPr lang="en-US" sz="8000" dirty="0"/>
+              <a:t>     </a:t>
+            </a:r>
+            <a:r>
+              <a:rPr lang="en-US" sz="8000" dirty="0" smtClean="0"/>
+              <a:t> </a:t>
+            </a:r>
+            <a:r>
+              <a:rPr lang="en-US" sz="8000" dirty="0" err="1"/>
+              <a:t>v.vmx</a:t>
+            </a:r>
+            <a:r>
+              <a:rPr lang="en-US" sz="8000" dirty="0"/>
+              <a:t>["</a:t>
+            </a:r>
+            <a:r>
+              <a:rPr lang="en-US" sz="8000" dirty="0" err="1"/>
+              <a:t>memsize</a:t>
+            </a:r>
+            <a:r>
+              <a:rPr lang="en-US" sz="8000" dirty="0"/>
+              <a:t>"] = </a:t>
+            </a:r>
+            <a:r>
+              <a:rPr lang="en-US" sz="8000" dirty="0" smtClean="0"/>
+              <a:t>1024</a:t>
+            </a:r>
+          </a:p>
+          <a:p>
+            <a:pPr marL="0" indent="0">
+              <a:spcBef>
+                <a:spcPts val="0"/>
+              </a:spcBef>
+              <a:buNone/>
+            </a:pPr>
+            <a:r>
+              <a:rPr lang="en-US" sz="8000" dirty="0"/>
+              <a:t> </a:t>
+            </a:r>
+            <a:r>
+              <a:rPr lang="en-US" sz="8000" dirty="0" smtClean="0"/>
+              <a:t>    </a:t>
+            </a:r>
+            <a:r>
+              <a:rPr lang="en-US" sz="8000" dirty="0"/>
+              <a:t> </a:t>
+            </a:r>
+            <a:r>
+              <a:rPr lang="en-US" sz="8000" dirty="0" err="1"/>
+              <a:t>v.vmx</a:t>
+            </a:r>
+            <a:r>
+              <a:rPr lang="en-US" sz="8000" dirty="0"/>
+              <a:t>["</a:t>
+            </a:r>
+            <a:r>
+              <a:rPr lang="en-US" sz="8000" dirty="0" err="1"/>
+              <a:t>numvcpus</a:t>
+            </a:r>
+            <a:r>
+              <a:rPr lang="en-US" sz="8000" dirty="0"/>
+              <a:t>"] = 2</a:t>
+            </a:r>
+          </a:p>
+          <a:p>
+            <a:pPr marL="0" indent="0">
+              <a:spcBef>
+                <a:spcPts val="0"/>
+              </a:spcBef>
+              <a:buNone/>
+            </a:pPr>
+            <a:r>
+              <a:rPr lang="en-US" sz="8000" dirty="0" smtClean="0"/>
+              <a:t>end</a:t>
+            </a:r>
+          </a:p>
+          <a:p>
+            <a:pPr marL="0" indent="0">
+              <a:spcBef>
+                <a:spcPts val="0"/>
+              </a:spcBef>
+              <a:buNone/>
+            </a:pPr>
+            <a:endParaRPr lang="en-US" sz="8000" dirty="0"/>
+          </a:p>
+          <a:p>
+            <a:pPr marL="0" indent="0">
+              <a:spcBef>
+                <a:spcPts val="0"/>
+              </a:spcBef>
+              <a:buNone/>
+            </a:pPr>
+            <a:r>
+              <a:rPr lang="en-US" sz="8000" dirty="0" smtClean="0"/>
+              <a:t># If </a:t>
+            </a:r>
+            <a:r>
+              <a:rPr lang="en-US" sz="8000" dirty="0"/>
+              <a:t>using </a:t>
+            </a:r>
+            <a:r>
+              <a:rPr lang="en-US" sz="8000" dirty="0" err="1"/>
+              <a:t>VirtualBox</a:t>
+            </a:r>
+            <a:endParaRPr lang="en-US" sz="8000" dirty="0"/>
+          </a:p>
+          <a:p>
+            <a:pPr marL="0" indent="0">
+              <a:spcBef>
+                <a:spcPts val="0"/>
+              </a:spcBef>
+              <a:buNone/>
+            </a:pPr>
+            <a:r>
+              <a:rPr lang="en-US" sz="8000" dirty="0" err="1" smtClean="0"/>
+              <a:t>config.vm.provider</a:t>
+            </a:r>
+            <a:r>
+              <a:rPr lang="en-US" sz="8000" dirty="0" smtClean="0"/>
+              <a:t> </a:t>
+            </a:r>
+            <a:r>
+              <a:rPr lang="en-US" sz="8000" dirty="0"/>
+              <a:t>:</a:t>
+            </a:r>
+            <a:r>
+              <a:rPr lang="en-US" sz="8000" dirty="0" err="1"/>
+              <a:t>virtualbox</a:t>
+            </a:r>
+            <a:r>
+              <a:rPr lang="en-US" sz="8000" dirty="0"/>
+              <a:t> do |</a:t>
+            </a:r>
+            <a:r>
+              <a:rPr lang="en-US" sz="8000" dirty="0" err="1"/>
+              <a:t>vbox</a:t>
+            </a:r>
+            <a:r>
+              <a:rPr lang="en-US" sz="8000" dirty="0"/>
+              <a:t>|</a:t>
+            </a:r>
+          </a:p>
+          <a:p>
+            <a:pPr marL="0" indent="0">
+              <a:spcBef>
+                <a:spcPts val="0"/>
+              </a:spcBef>
+              <a:buNone/>
+            </a:pPr>
+            <a:r>
+              <a:rPr lang="en-US" sz="8000" dirty="0"/>
+              <a:t>     </a:t>
+            </a:r>
+            <a:r>
+              <a:rPr lang="en-US" sz="8000" dirty="0" err="1" smtClean="0"/>
+              <a:t>vbox.customize</a:t>
+            </a:r>
+            <a:r>
+              <a:rPr lang="en-US" sz="8000" dirty="0" smtClean="0"/>
+              <a:t> </a:t>
+            </a:r>
+            <a:r>
+              <a:rPr lang="en-US" sz="8000" dirty="0"/>
+              <a:t>["</a:t>
+            </a:r>
+            <a:r>
+              <a:rPr lang="en-US" sz="8000" dirty="0" err="1"/>
+              <a:t>modifyvm</a:t>
+            </a:r>
+            <a:r>
+              <a:rPr lang="en-US" sz="8000" dirty="0"/>
+              <a:t>", :id, "--memory", 1024</a:t>
+            </a:r>
+            <a:r>
+              <a:rPr lang="en-US" sz="8000" dirty="0" smtClean="0"/>
+              <a:t>]</a:t>
+            </a:r>
+          </a:p>
+          <a:p>
+            <a:pPr marL="0" indent="0">
+              <a:spcBef>
+                <a:spcPts val="0"/>
+              </a:spcBef>
+              <a:buNone/>
+            </a:pPr>
+            <a:r>
+              <a:rPr lang="en-US" sz="8000" dirty="0" smtClean="0"/>
+              <a:t>     </a:t>
+            </a:r>
+            <a:r>
+              <a:rPr lang="en-US" sz="8000" dirty="0" err="1" smtClean="0"/>
+              <a:t>vbox.customize</a:t>
+            </a:r>
+            <a:r>
+              <a:rPr lang="en-US" sz="8000" dirty="0" smtClean="0"/>
+              <a:t> </a:t>
+            </a:r>
+            <a:r>
+              <a:rPr lang="en-US" sz="8000" dirty="0"/>
+              <a:t>["</a:t>
+            </a:r>
+            <a:r>
+              <a:rPr lang="en-US" sz="8000" dirty="0" err="1"/>
+              <a:t>modifyvm</a:t>
+            </a:r>
+            <a:r>
+              <a:rPr lang="en-US" sz="8000" dirty="0"/>
+              <a:t>", :id, "--</a:t>
+            </a:r>
+            <a:r>
+              <a:rPr lang="en-US" sz="8000" dirty="0" err="1"/>
+              <a:t>cpus</a:t>
+            </a:r>
+            <a:r>
+              <a:rPr lang="en-US" sz="8000" dirty="0"/>
+              <a:t>", 2</a:t>
+            </a:r>
+            <a:r>
+              <a:rPr lang="en-US" sz="8000" dirty="0" smtClean="0"/>
+              <a:t>]</a:t>
+            </a:r>
+            <a:endParaRPr lang="en-US" sz="8000" dirty="0"/>
+          </a:p>
+          <a:p>
+            <a:pPr marL="0" indent="0">
+              <a:spcBef>
+                <a:spcPts val="0"/>
+              </a:spcBef>
+              <a:buNone/>
+            </a:pPr>
+            <a:r>
+              <a:rPr lang="en-US" sz="8000" dirty="0" smtClean="0"/>
+              <a:t>end</a:t>
+            </a:r>
+          </a:p>
+          <a:p>
+            <a:pPr>
+              <a:spcBef>
+                <a:spcPts val="0"/>
+              </a:spcBef>
+            </a:pPr>
             <a:endParaRPr lang="en-US" dirty="0"/>
           </a:p>
         </p:txBody>
@@ -5237,7 +6499,7 @@
     </p:spTree>
     <p:extLst>
       <p:ext uri="{BB962C8B-B14F-4D97-AF65-F5344CB8AC3E}">
-        <p14:creationId xmlns:p14="http://schemas.microsoft.com/office/powerpoint/2010/main" val="4182006910"/>
+        <p14:creationId xmlns:p14="http://schemas.microsoft.com/office/powerpoint/2010/main" val="2877358671"/>
       </p:ext>
     </p:extLst>
   </p:cSld>
@@ -5280,6 +6542,145 @@
           <a:lstStyle/>
           <a:p>
             <a:r>
+              <a:rPr lang="en-US" dirty="0"/>
+              <a:t>Multi-VM Configuration </a:t>
+            </a:r>
+          </a:p>
+        </p:txBody>
+      </p:sp>
+      <p:sp>
+        <p:nvSpPr>
+          <p:cNvPr id="3" name="Content Placeholder 2"/>
+          <p:cNvSpPr>
+            <a:spLocks noGrp="1"/>
+          </p:cNvSpPr>
+          <p:nvPr>
+            <p:ph idx="1"/>
+          </p:nvPr>
+        </p:nvSpPr>
+        <p:spPr/>
+        <p:txBody>
+          <a:bodyPr/>
+          <a:lstStyle/>
+          <a:p>
+            <a:r>
+              <a:rPr lang="en-US" dirty="0" smtClean="0"/>
+              <a:t>Share files between VMs.</a:t>
+            </a:r>
+          </a:p>
+          <a:p>
+            <a:pPr lvl="1"/>
+            <a:r>
+              <a:rPr lang="en-US" dirty="0" smtClean="0"/>
+              <a:t>The </a:t>
+            </a:r>
+            <a:r>
+              <a:rPr lang="en-US" dirty="0" err="1" smtClean="0"/>
+              <a:t>Vagrantfile’s</a:t>
+            </a:r>
+            <a:r>
+              <a:rPr lang="en-US" dirty="0" smtClean="0"/>
+              <a:t> folder is mounted to </a:t>
+            </a:r>
+            <a:r>
+              <a:rPr lang="en-US" b="1" dirty="0" smtClean="0"/>
+              <a:t>/vagrant</a:t>
+            </a:r>
+            <a:r>
+              <a:rPr lang="en-US" dirty="0" smtClean="0"/>
+              <a:t> on each VM</a:t>
+            </a:r>
+          </a:p>
+          <a:p>
+            <a:r>
+              <a:rPr lang="en-US" dirty="0" smtClean="0"/>
+              <a:t>Use Ruby to make multi-VM deployments A LOT simpler (think </a:t>
+            </a:r>
+            <a:r>
+              <a:rPr lang="en-US" dirty="0" smtClean="0"/>
+              <a:t>loops, branching, </a:t>
+            </a:r>
+            <a:r>
+              <a:rPr lang="en-US" dirty="0" smtClean="0"/>
+              <a:t>variables!)</a:t>
+            </a:r>
+          </a:p>
+          <a:p>
+            <a:pPr lvl="1"/>
+            <a:r>
+              <a:rPr lang="en-US" dirty="0" smtClean="0"/>
+              <a:t>Compare sample code in ./</a:t>
+            </a:r>
+            <a:r>
+              <a:rPr lang="en-US" dirty="0" err="1" smtClean="0"/>
+              <a:t>multivmstatic</a:t>
+            </a:r>
+            <a:r>
+              <a:rPr lang="en-US" dirty="0" smtClean="0"/>
+              <a:t> </a:t>
+            </a:r>
+            <a:r>
+              <a:rPr lang="en-US" dirty="0" err="1" smtClean="0"/>
+              <a:t>vs</a:t>
+            </a:r>
+            <a:r>
+              <a:rPr lang="en-US" dirty="0" smtClean="0"/>
+              <a:t> ./</a:t>
+            </a:r>
+            <a:r>
+              <a:rPr lang="en-US" dirty="0" err="1" smtClean="0"/>
+              <a:t>multivmdynamic</a:t>
+            </a:r>
+            <a:endParaRPr lang="en-US" dirty="0"/>
+          </a:p>
+        </p:txBody>
+      </p:sp>
+    </p:spTree>
+    <p:extLst>
+      <p:ext uri="{BB962C8B-B14F-4D97-AF65-F5344CB8AC3E}">
+        <p14:creationId xmlns:p14="http://schemas.microsoft.com/office/powerpoint/2010/main" val="4182006910"/>
+      </p:ext>
+    </p:extLst>
+  </p:cSld>
+  <p:clrMapOvr>
+    <a:masterClrMapping/>
+  </p:clrMapOvr>
+</p:sld>
+</file>
+
+<file path=ppt/slides/slide15.xml><?xml version="1.0" encoding="utf-8"?>
+<p:sld xmlns:a="http://schemas.openxmlformats.org/drawingml/2006/main" xmlns:r="http://schemas.openxmlformats.org/officeDocument/2006/relationships" xmlns:p="http://schemas.openxmlformats.org/presentationml/2006/main">
+  <p:cSld>
+    <p:spTree>
+      <p:nvGrpSpPr>
+        <p:cNvPr id="1" name=""/>
+        <p:cNvGrpSpPr/>
+        <p:nvPr/>
+      </p:nvGrpSpPr>
+      <p:grpSpPr>
+        <a:xfrm>
+          <a:off x="0" y="0"/>
+          <a:ext cx="0" cy="0"/>
+          <a:chOff x="0" y="0"/>
+          <a:chExt cx="0" cy="0"/>
+        </a:xfrm>
+      </p:grpSpPr>
+      <p:sp>
+        <p:nvSpPr>
+          <p:cNvPr id="2" name="Title 1"/>
+          <p:cNvSpPr>
+            <a:spLocks noGrp="1"/>
+          </p:cNvSpPr>
+          <p:nvPr>
+            <p:ph type="title"/>
+          </p:nvPr>
+        </p:nvSpPr>
+        <p:spPr/>
+        <p:txBody>
+          <a:bodyPr/>
+          <a:lstStyle/>
+          <a:p>
+            <a:r>
               <a:rPr lang="en-US" dirty="0" err="1" smtClean="0"/>
               <a:t>Provisioners</a:t>
             </a:r>
@@ -5331,8 +6732,23 @@
           <a:p>
             <a:pPr lvl="1"/>
             <a:r>
+              <a:rPr lang="en-US" dirty="0" smtClean="0"/>
+              <a:t>Ansible</a:t>
+            </a:r>
+          </a:p>
+          <a:p>
+            <a:pPr lvl="1"/>
+            <a:r>
               <a:rPr lang="en-US" dirty="0" err="1" smtClean="0"/>
-              <a:t>Ansible</a:t>
+              <a:t>SaltStack</a:t>
+            </a:r>
+            <a:endParaRPr lang="en-US" dirty="0" smtClean="0"/>
+          </a:p>
+          <a:p>
+            <a:pPr lvl="1"/>
+            <a:r>
+              <a:rPr lang="en-US" dirty="0" err="1" smtClean="0"/>
+              <a:t>CFEngine</a:t>
             </a:r>
             <a:endParaRPr lang="en-US" dirty="0"/>
           </a:p>
@@ -5358,7 +6774,7 @@
 </p:sld>
 </file>
 
-<file path=ppt/slides/slide15.xml><?xml version="1.0" encoding="utf-8"?>
+<file path=ppt/slides/slide16.xml><?xml version="1.0" encoding="utf-8"?>
 <p:sld xmlns:a="http://schemas.openxmlformats.org/drawingml/2006/main" xmlns:r="http://schemas.openxmlformats.org/officeDocument/2006/relationships" xmlns:p="http://schemas.openxmlformats.org/presentationml/2006/main">
   <p:cSld>
     <p:spTree>
@@ -5430,118 +6846,118 @@
             </a:r>
             <a:r>
               <a:rPr lang="en-US" sz="1800" dirty="0">
-                <a:hlinkClick r:id="rId2"/>
+                <a:hlinkClick r:id="rId3"/>
               </a:rPr>
               <a:t>http://docs.vagrantup.com/v2</a:t>
-            </a:r>
-            <a:r>
-              <a:rPr lang="en-US" sz="1800" dirty="0" smtClean="0">
-                <a:hlinkClick r:id="rId2"/>
-              </a:rPr>
-              <a:t>/</a:t>
-            </a:r>
-            <a:endParaRPr lang="en-US" sz="1800" dirty="0"/>
-          </a:p>
-          <a:p>
-            <a:r>
-              <a:rPr lang="en-US" sz="1800" dirty="0" smtClean="0"/>
-              <a:t>Google Groups: </a:t>
             </a:r>
             <a:r>
               <a:rPr lang="en-US" sz="1800" dirty="0" smtClean="0">
                 <a:hlinkClick r:id="rId3"/>
               </a:rPr>
+              <a:t>/</a:t>
+            </a:r>
+            <a:endParaRPr lang="en-US" sz="1800" dirty="0"/>
+          </a:p>
+          <a:p>
+            <a:r>
+              <a:rPr lang="en-US" sz="1800" dirty="0" smtClean="0"/>
+              <a:t>Google Groups: </a:t>
+            </a:r>
+            <a:r>
+              <a:rPr lang="en-US" sz="1800" dirty="0" smtClean="0">
+                <a:hlinkClick r:id="rId4"/>
+              </a:rPr>
               <a:t>https</a:t>
             </a:r>
-            <a:r>
-              <a:rPr lang="en-US" sz="1800" dirty="0">
-                <a:hlinkClick r:id="rId3"/>
-              </a:rPr>
-              <a:t>://groups.google.com/forum/#!forum/vagrant-</a:t>
-            </a:r>
-            <a:r>
-              <a:rPr lang="en-US" sz="1800" dirty="0" smtClean="0">
-                <a:hlinkClick r:id="rId3"/>
-              </a:rPr>
-              <a:t>up</a:t>
-            </a:r>
-            <a:endParaRPr lang="en-US" sz="1800" dirty="0" smtClean="0"/>
-          </a:p>
-          <a:p>
-            <a:r>
-              <a:rPr lang="en-US" sz="1800" dirty="0" smtClean="0"/>
-              <a:t>IRC</a:t>
-            </a:r>
-            <a:r>
-              <a:rPr lang="en-US" sz="1800" dirty="0"/>
-              <a:t>: #vagrant on </a:t>
-            </a:r>
-            <a:r>
-              <a:rPr lang="en-US" sz="1800" dirty="0" err="1" smtClean="0"/>
-              <a:t>Freenode</a:t>
-            </a:r>
-            <a:endParaRPr lang="en-US" sz="1800" dirty="0" smtClean="0"/>
-          </a:p>
-          <a:p>
-            <a:r>
-              <a:rPr lang="en-US" sz="1800" dirty="0" err="1" smtClean="0"/>
-              <a:t>GitHub</a:t>
-            </a:r>
-            <a:r>
-              <a:rPr lang="en-US" sz="1800" dirty="0" smtClean="0"/>
-              <a:t> (Check out </a:t>
-            </a:r>
-            <a:r>
-              <a:rPr lang="en-US" sz="1800" dirty="0" err="1" smtClean="0"/>
-              <a:t>bunchc</a:t>
-            </a:r>
-            <a:r>
-              <a:rPr lang="en-US" sz="1800" dirty="0"/>
-              <a:t>, </a:t>
-            </a:r>
-            <a:r>
-              <a:rPr lang="en-US" sz="1800" dirty="0" err="1" smtClean="0"/>
-              <a:t>bodepd</a:t>
-            </a:r>
-            <a:r>
-              <a:rPr lang="en-US" sz="1800" dirty="0"/>
-              <a:t>, </a:t>
-            </a:r>
-            <a:r>
-              <a:rPr lang="en-US" sz="1800" dirty="0" err="1" smtClean="0"/>
-              <a:t>ody</a:t>
-            </a:r>
-            <a:r>
-              <a:rPr lang="en-US" sz="1800" dirty="0" smtClean="0"/>
-              <a:t>, </a:t>
-            </a:r>
-            <a:r>
-              <a:rPr lang="en-US" sz="1800" dirty="0" err="1" smtClean="0"/>
-              <a:t>etc</a:t>
-            </a:r>
-            <a:r>
-              <a:rPr lang="en-US" sz="1800" dirty="0" smtClean="0"/>
-              <a:t>)</a:t>
-            </a:r>
-          </a:p>
-          <a:p>
-            <a:r>
-              <a:rPr lang="en-US" sz="1800" dirty="0" smtClean="0"/>
-              <a:t>For Fusion-related tips, I post them as I find them:</a:t>
-            </a:r>
-            <a:endParaRPr lang="en-US" sz="1800" dirty="0"/>
-          </a:p>
-          <a:p>
-            <a:pPr lvl="1"/>
             <a:r>
               <a:rPr lang="en-US" sz="1800" dirty="0">
                 <a:hlinkClick r:id="rId4"/>
               </a:rPr>
-              <a:t>http://vmtrooper.com/category/automation/vagrant</a:t>
+              <a:t>://groups.google.com/forum/#!forum/vagrant-</a:t>
             </a:r>
             <a:r>
               <a:rPr lang="en-US" sz="1800" dirty="0" smtClean="0">
                 <a:hlinkClick r:id="rId4"/>
+              </a:rPr>
+              <a:t>up</a:t>
+            </a:r>
+            <a:endParaRPr lang="en-US" sz="1800" dirty="0" smtClean="0"/>
+          </a:p>
+          <a:p>
+            <a:r>
+              <a:rPr lang="en-US" sz="1800" dirty="0" smtClean="0"/>
+              <a:t>IRC</a:t>
+            </a:r>
+            <a:r>
+              <a:rPr lang="en-US" sz="1800" dirty="0"/>
+              <a:t>: #vagrant on </a:t>
+            </a:r>
+            <a:r>
+              <a:rPr lang="en-US" sz="1800" dirty="0" err="1" smtClean="0"/>
+              <a:t>Freenode</a:t>
+            </a:r>
+            <a:endParaRPr lang="en-US" sz="1800" dirty="0" smtClean="0"/>
+          </a:p>
+          <a:p>
+            <a:r>
+              <a:rPr lang="en-US" sz="1800" dirty="0" err="1" smtClean="0"/>
+              <a:t>GitHub</a:t>
+            </a:r>
+            <a:r>
+              <a:rPr lang="en-US" sz="1800" dirty="0" smtClean="0"/>
+              <a:t> (Check out </a:t>
+            </a:r>
+            <a:r>
+              <a:rPr lang="en-US" sz="1800" dirty="0" err="1" smtClean="0"/>
+              <a:t>bunchc</a:t>
+            </a:r>
+            <a:r>
+              <a:rPr lang="en-US" sz="1800" dirty="0"/>
+              <a:t>, </a:t>
+            </a:r>
+            <a:r>
+              <a:rPr lang="en-US" sz="1800" dirty="0" err="1" smtClean="0"/>
+              <a:t>bodepd</a:t>
+            </a:r>
+            <a:r>
+              <a:rPr lang="en-US" sz="1800" dirty="0"/>
+              <a:t>, </a:t>
+            </a:r>
+            <a:r>
+              <a:rPr lang="en-US" sz="1800" dirty="0" err="1" smtClean="0"/>
+              <a:t>ody</a:t>
+            </a:r>
+            <a:r>
+              <a:rPr lang="en-US" sz="1800" dirty="0" smtClean="0"/>
+              <a:t>, </a:t>
+            </a:r>
+            <a:r>
+              <a:rPr lang="en-US" sz="1800" dirty="0" err="1" smtClean="0"/>
+              <a:t>vmtrooper</a:t>
+            </a:r>
+            <a:r>
+              <a:rPr lang="en-US" sz="1800" dirty="0" smtClean="0"/>
+              <a:t> (me!), etc)</a:t>
+            </a:r>
+          </a:p>
+          <a:p>
+            <a:r>
+              <a:rPr lang="en-US" sz="1800" dirty="0" smtClean="0"/>
+              <a:t>For Fusion-related tips, I post them as I find them:</a:t>
+            </a:r>
+            <a:endParaRPr lang="en-US" sz="1800" dirty="0"/>
+          </a:p>
+          <a:p>
+            <a:pPr lvl="1"/>
+            <a:r>
+              <a:rPr lang="en-US" sz="1800" dirty="0">
+                <a:hlinkClick r:id="rId5"/>
+              </a:rPr>
+              <a:t>http://vmtrooper.com/category/automation/vagrant</a:t>
+            </a:r>
+            <a:r>
+              <a:rPr lang="en-US" sz="1800" dirty="0" smtClean="0">
+                <a:hlinkClick r:id="rId5"/>
               </a:rPr>
               <a:t>/</a:t>
             </a:r>
@@ -5565,7 +6981,7 @@
           <p:nvPr/>
         </p:nvPicPr>
         <p:blipFill>
-          <a:blip r:embed="rId5"/>
+          <a:blip r:embed="rId6"/>
           <a:stretch>
             <a:fillRect/>
           </a:stretch>
@@ -5909,10 +7325,20 @@
           <a:lstStyle/>
           <a:p>
             <a:r>
-              <a:rPr lang="en-US" dirty="0" smtClean="0">
-                <a:hlinkClick r:id="rId2"/>
-              </a:rPr>
-              <a:t>http://downloads.vagrantup.com</a:t>
+              <a:rPr lang="en-US" dirty="0"/>
+              <a:t>http://</a:t>
+            </a:r>
+            <a:r>
+              <a:rPr lang="en-US" dirty="0" err="1"/>
+              <a:t>www.vagrantup.com</a:t>
+            </a:r>
+            <a:r>
+              <a:rPr lang="en-US" dirty="0"/>
+              <a:t>/</a:t>
+            </a:r>
+            <a:r>
+              <a:rPr lang="en-US" dirty="0" err="1"/>
+              <a:t>downloads.html</a:t>
             </a:r>
             <a:endParaRPr lang="en-US" dirty="0" smtClean="0"/>
           </a:p>
@@ -5972,7 +7398,7 @@
           <a:p>
             <a:r>
               <a:rPr lang="en-US" dirty="0" smtClean="0"/>
-              <a:t>Step 3: Download a box</a:t>
+              <a:t>Step 3: Select a box</a:t>
             </a:r>
             <a:endParaRPr lang="en-US" dirty="0"/>
           </a:p>
@@ -5991,50 +7417,68 @@
         <p:spPr/>
         <p:txBody>
           <a:bodyPr>
-            <a:normAutofit/>
+            <a:normAutofit fontScale="92500" lnSpcReduction="10000"/>
           </a:bodyPr>
           <a:lstStyle/>
           <a:p>
             <a:r>
-              <a:rPr lang="en-US" dirty="0" err="1" smtClean="0"/>
-              <a:t>VirtualBox</a:t>
-            </a:r>
-            <a:r>
-              <a:rPr lang="en-US" dirty="0" smtClean="0"/>
-              <a:t>: </a:t>
-            </a:r>
+              <a:rPr lang="en-US" dirty="0" smtClean="0"/>
+              <a:t>Vagrant Cloud:</a:t>
+            </a:r>
+          </a:p>
+          <a:p>
+            <a:pPr marL="0" indent="0">
+              <a:buNone/>
+            </a:pPr>
             <a:r>
               <a:rPr lang="en-US" dirty="0">
                 <a:hlinkClick r:id="rId3"/>
               </a:rPr>
-              <a:t>http://files.vagrantup.com/</a:t>
+              <a:t>https://vagrantcloud.com/discover/</a:t>
             </a:r>
             <a:r>
               <a:rPr lang="en-US" dirty="0" smtClean="0">
                 <a:hlinkClick r:id="rId3"/>
               </a:rPr>
-              <a:t>precise64.box</a:t>
+              <a:t>featured</a:t>
             </a:r>
             <a:endParaRPr lang="en-US" dirty="0" smtClean="0"/>
           </a:p>
           <a:p>
             <a:r>
-              <a:rPr lang="en-US" dirty="0"/>
-              <a:t>VMware Fusion: </a:t>
-            </a:r>
+              <a:rPr lang="en-US" dirty="0" smtClean="0"/>
+              <a:t>Build your own:</a:t>
+            </a:r>
+          </a:p>
+          <a:p>
+            <a:pPr marL="0" indent="0">
+              <a:buNone/>
+            </a:pPr>
             <a:r>
               <a:rPr lang="en-US" dirty="0">
                 <a:hlinkClick r:id="rId4"/>
               </a:rPr>
-              <a:t>http://files.vagrantup.com/precise64_vmware.box</a:t>
+              <a:t>http://www.packer.io/docs/post-processors/</a:t>
+            </a:r>
+            <a:r>
+              <a:rPr lang="en-US" dirty="0" smtClean="0">
+                <a:hlinkClick r:id="rId4"/>
+              </a:rPr>
+              <a:t>vagrant.html</a:t>
+            </a:r>
+            <a:endParaRPr lang="en-US" dirty="0" smtClean="0"/>
+          </a:p>
+          <a:p>
+            <a:r>
+              <a:rPr lang="en-US" dirty="0" smtClean="0"/>
+              <a:t> Download and Use Others not on Vagrant Cloud:</a:t>
             </a:r>
             <a:endParaRPr lang="en-US" dirty="0"/>
           </a:p>
           <a:p>
-            <a:r>
-              <a:rPr lang="en-US" dirty="0" smtClean="0"/>
-              <a:t>Build your own or use others: </a:t>
-            </a:r>
+            <a:pPr marL="0" indent="0">
+              <a:buNone/>
+            </a:pPr>
             <a:r>
               <a:rPr lang="en-US" dirty="0" smtClean="0">
                 <a:hlinkClick r:id="rId5"/>
@@ -6151,23 +7595,45 @@
               <a:rPr lang="en-US" dirty="0" err="1" smtClean="0"/>
               <a:t>init</a:t>
             </a:r>
-            <a:endParaRPr lang="en-US" dirty="0" smtClean="0"/>
-          </a:p>
-          <a:p>
-            <a:r>
-              <a:rPr lang="en-US" dirty="0" smtClean="0"/>
-              <a:t>Edit the resulting </a:t>
+            <a:r>
+              <a:rPr lang="en-US" dirty="0" smtClean="0"/>
+              <a:t> </a:t>
             </a:r>
             <a:r>
               <a:rPr lang="en-US" dirty="0" err="1" smtClean="0"/>
-              <a:t>Vagrantfile</a:t>
-            </a:r>
-            <a:endParaRPr lang="en-US" dirty="0" smtClean="0"/>
-          </a:p>
-          <a:p>
-            <a:r>
-              <a:rPr lang="en-US" dirty="0" smtClean="0"/>
-              <a:t>vagrant up</a:t>
+              <a:t>hashicorp</a:t>
+            </a:r>
+            <a:r>
+              <a:rPr lang="en-US" dirty="0" smtClean="0"/>
+              <a:t>/precise64</a:t>
+            </a:r>
+          </a:p>
+          <a:p>
+            <a:r>
+              <a:rPr lang="en-US" dirty="0" smtClean="0"/>
+              <a:t>vagrant up (</a:t>
+            </a:r>
+            <a:r>
+              <a:rPr lang="en-US" dirty="0" err="1" smtClean="0"/>
+              <a:t>Virtualbox</a:t>
+            </a:r>
+            <a:r>
+              <a:rPr lang="en-US" dirty="0" smtClean="0"/>
+              <a:t>)</a:t>
+            </a:r>
+          </a:p>
+          <a:p>
+            <a:r>
+              <a:rPr lang="en-US" dirty="0" smtClean="0"/>
+              <a:t>vagrant up --provider=</a:t>
+            </a:r>
+            <a:r>
+              <a:rPr lang="en-US" dirty="0" err="1" smtClean="0"/>
+              <a:t>vmware_fusion</a:t>
+            </a:r>
+            <a:r>
+              <a:rPr lang="en-US" dirty="0" smtClean="0"/>
+              <a:t> (VMware)</a:t>
             </a:r>
             <a:endParaRPr lang="en-US" dirty="0"/>
           </a:p>
@@ -6340,7 +7806,7 @@
           </p:nvPr>
         </p:nvPicPr>
         <p:blipFill>
-          <a:blip r:embed="rId2">
+          <a:blip r:embed="rId3">
             <a:extLst>
               <a:ext uri="{28A0092B-C50C-407E-A947-70E740481C1C}">
                 <a14:useLocalDpi xmlns:a14="http://schemas.microsoft.com/office/drawing/2010/main" val="0"/>

</xml_diff>